<commit_message>
preparing project for store submission
</commit_message>
<xml_diff>
--- a/docs/PubSub Messenger.pptx
+++ b/docs/PubSub Messenger.pptx
@@ -10,6 +10,7 @@
     <p:sldId id="257" r:id="rId4"/>
     <p:sldId id="258" r:id="rId5"/>
     <p:sldId id="259" r:id="rId6"/>
+    <p:sldId id="262" r:id="rId7"/>
   </p:sldIdLst>
   <p:sldSz cx="9144000" cy="6858000" type="screen4x3"/>
   <p:notesSz cx="6858000" cy="9144000"/>
@@ -128,7 +129,7 @@
 </file>
 
 <file path=ppt/slideLayouts/slideLayout1.xml><?xml version="1.0" encoding="utf-8"?>
-<p:sldLayout xmlns:a="http://schemas.openxmlformats.org/drawingml/2006/main" xmlns:r="http://schemas.openxmlformats.org/officeDocument/2006/relationships" xmlns:p="http://schemas.openxmlformats.org/presentationml/2006/main" type="title" preserve="1">
+<p:sldLayout xmlns:a="http://schemas.openxmlformats.org/drawingml/2006/main" xmlns:r="http://schemas.openxmlformats.org/officeDocument/2006/relationships" xmlns:p="http://schemas.openxmlformats.org/presentationml/2006/main" showMasterSp="0" type="title" preserve="1">
   <p:cSld name="Title Slide">
     <p:spTree>
       <p:nvGrpSpPr>
@@ -313,7 +314,7 @@
           <a:p>
             <a:fld id="{F86244D8-AB35-4C32-B857-A19335E4DDAB}" type="datetimeFigureOut">
               <a:rPr lang="he-IL" smtClean="0"/>
-              <a:t>כ"ז.אלול.תשע"ט</a:t>
+              <a:t>ה'.טבת.תש"פ</a:t>
             </a:fld>
             <a:endParaRPr lang="he-IL"/>
           </a:p>
@@ -370,7 +371,7 @@
 </file>
 
 <file path=ppt/slideLayouts/slideLayout10.xml><?xml version="1.0" encoding="utf-8"?>
-<p:sldLayout xmlns:a="http://schemas.openxmlformats.org/drawingml/2006/main" xmlns:r="http://schemas.openxmlformats.org/officeDocument/2006/relationships" xmlns:p="http://schemas.openxmlformats.org/presentationml/2006/main" type="vertTx" preserve="1">
+<p:sldLayout xmlns:a="http://schemas.openxmlformats.org/drawingml/2006/main" xmlns:r="http://schemas.openxmlformats.org/officeDocument/2006/relationships" xmlns:p="http://schemas.openxmlformats.org/presentationml/2006/main" showMasterSp="0" type="vertTx" preserve="1">
   <p:cSld name="Title and Vertical Text">
     <p:spTree>
       <p:nvGrpSpPr>
@@ -476,7 +477,7 @@
           <a:p>
             <a:fld id="{F86244D8-AB35-4C32-B857-A19335E4DDAB}" type="datetimeFigureOut">
               <a:rPr lang="he-IL" smtClean="0"/>
-              <a:t>כ"ז.אלול.תשע"ט</a:t>
+              <a:t>ה'.טבת.תש"פ</a:t>
             </a:fld>
             <a:endParaRPr lang="he-IL"/>
           </a:p>
@@ -533,7 +534,7 @@
 </file>
 
 <file path=ppt/slideLayouts/slideLayout11.xml><?xml version="1.0" encoding="utf-8"?>
-<p:sldLayout xmlns:a="http://schemas.openxmlformats.org/drawingml/2006/main" xmlns:r="http://schemas.openxmlformats.org/officeDocument/2006/relationships" xmlns:p="http://schemas.openxmlformats.org/presentationml/2006/main" type="vertTitleAndTx" preserve="1">
+<p:sldLayout xmlns:a="http://schemas.openxmlformats.org/drawingml/2006/main" xmlns:r="http://schemas.openxmlformats.org/officeDocument/2006/relationships" xmlns:p="http://schemas.openxmlformats.org/presentationml/2006/main" showMasterSp="0" type="vertTitleAndTx" preserve="1">
   <p:cSld name="Vertical Title and Text">
     <p:spTree>
       <p:nvGrpSpPr>
@@ -649,7 +650,7 @@
           <a:p>
             <a:fld id="{F86244D8-AB35-4C32-B857-A19335E4DDAB}" type="datetimeFigureOut">
               <a:rPr lang="he-IL" smtClean="0"/>
-              <a:t>כ"ז.אלול.תשע"ט</a:t>
+              <a:t>ה'.טבת.תש"פ</a:t>
             </a:fld>
             <a:endParaRPr lang="he-IL"/>
           </a:p>
@@ -706,7 +707,7 @@
 </file>
 
 <file path=ppt/slideLayouts/slideLayout2.xml><?xml version="1.0" encoding="utf-8"?>
-<p:sldLayout xmlns:a="http://schemas.openxmlformats.org/drawingml/2006/main" xmlns:r="http://schemas.openxmlformats.org/officeDocument/2006/relationships" xmlns:p="http://schemas.openxmlformats.org/presentationml/2006/main" type="obj" preserve="1">
+<p:sldLayout xmlns:a="http://schemas.openxmlformats.org/drawingml/2006/main" xmlns:r="http://schemas.openxmlformats.org/officeDocument/2006/relationships" xmlns:p="http://schemas.openxmlformats.org/presentationml/2006/main" showMasterSp="0" type="obj" preserve="1">
   <p:cSld name="Title and Content">
     <p:spTree>
       <p:nvGrpSpPr>
@@ -813,7 +814,7 @@
           <a:p>
             <a:fld id="{F86244D8-AB35-4C32-B857-A19335E4DDAB}" type="datetimeFigureOut">
               <a:rPr lang="he-IL" smtClean="0"/>
-              <a:t>כ"ז.אלול.תשע"ט</a:t>
+              <a:t>ה'.טבת.תש"פ</a:t>
             </a:fld>
             <a:endParaRPr lang="he-IL"/>
           </a:p>
@@ -870,7 +871,7 @@
 </file>
 
 <file path=ppt/slideLayouts/slideLayout3.xml><?xml version="1.0" encoding="utf-8"?>
-<p:sldLayout xmlns:a="http://schemas.openxmlformats.org/drawingml/2006/main" xmlns:r="http://schemas.openxmlformats.org/officeDocument/2006/relationships" xmlns:p="http://schemas.openxmlformats.org/presentationml/2006/main" type="secHead" preserve="1">
+<p:sldLayout xmlns:a="http://schemas.openxmlformats.org/drawingml/2006/main" xmlns:r="http://schemas.openxmlformats.org/officeDocument/2006/relationships" xmlns:p="http://schemas.openxmlformats.org/presentationml/2006/main" showMasterSp="0" type="secHead" preserve="1">
   <p:cSld name="Section Header">
     <p:spTree>
       <p:nvGrpSpPr>
@@ -1051,7 +1052,7 @@
           <a:p>
             <a:fld id="{F86244D8-AB35-4C32-B857-A19335E4DDAB}" type="datetimeFigureOut">
               <a:rPr lang="he-IL" smtClean="0"/>
-              <a:t>כ"ז.אלול.תשע"ט</a:t>
+              <a:t>ה'.טבת.תש"פ</a:t>
             </a:fld>
             <a:endParaRPr lang="he-IL"/>
           </a:p>
@@ -1108,7 +1109,7 @@
 </file>
 
 <file path=ppt/slideLayouts/slideLayout4.xml><?xml version="1.0" encoding="utf-8"?>
-<p:sldLayout xmlns:a="http://schemas.openxmlformats.org/drawingml/2006/main" xmlns:r="http://schemas.openxmlformats.org/officeDocument/2006/relationships" xmlns:p="http://schemas.openxmlformats.org/presentationml/2006/main" type="twoObj" preserve="1">
+<p:sldLayout xmlns:a="http://schemas.openxmlformats.org/drawingml/2006/main" xmlns:r="http://schemas.openxmlformats.org/officeDocument/2006/relationships" xmlns:p="http://schemas.openxmlformats.org/presentationml/2006/main" showMasterSp="0" type="twoObj" preserve="1">
   <p:cSld name="Two Content">
     <p:spTree>
       <p:nvGrpSpPr>
@@ -1141,7 +1142,7 @@
           <a:p>
             <a:fld id="{F86244D8-AB35-4C32-B857-A19335E4DDAB}" type="datetimeFigureOut">
               <a:rPr lang="he-IL" smtClean="0"/>
-              <a:t>כ"ז.אלול.תשע"ט</a:t>
+              <a:t>ה'.טבת.תש"פ</a:t>
             </a:fld>
             <a:endParaRPr lang="he-IL"/>
           </a:p>
@@ -1337,7 +1338,7 @@
 </file>
 
 <file path=ppt/slideLayouts/slideLayout5.xml><?xml version="1.0" encoding="utf-8"?>
-<p:sldLayout xmlns:a="http://schemas.openxmlformats.org/drawingml/2006/main" xmlns:r="http://schemas.openxmlformats.org/officeDocument/2006/relationships" xmlns:p="http://schemas.openxmlformats.org/presentationml/2006/main" type="twoTxTwoObj" preserve="1">
+<p:sldLayout xmlns:a="http://schemas.openxmlformats.org/drawingml/2006/main" xmlns:r="http://schemas.openxmlformats.org/officeDocument/2006/relationships" xmlns:p="http://schemas.openxmlformats.org/presentationml/2006/main" showMasterSp="0" type="twoTxTwoObj" preserve="1">
   <p:cSld name="Comparison">
     <p:spTree>
       <p:nvGrpSpPr>
@@ -1512,7 +1513,7 @@
           <a:p>
             <a:fld id="{F86244D8-AB35-4C32-B857-A19335E4DDAB}" type="datetimeFigureOut">
               <a:rPr lang="he-IL" smtClean="0"/>
-              <a:t>כ"ז.אלול.תשע"ט</a:t>
+              <a:t>ה'.טבת.תש"פ</a:t>
             </a:fld>
             <a:endParaRPr lang="he-IL"/>
           </a:p>
@@ -1711,7 +1712,7 @@
 </file>
 
 <file path=ppt/slideLayouts/slideLayout6.xml><?xml version="1.0" encoding="utf-8"?>
-<p:sldLayout xmlns:a="http://schemas.openxmlformats.org/drawingml/2006/main" xmlns:r="http://schemas.openxmlformats.org/officeDocument/2006/relationships" xmlns:p="http://schemas.openxmlformats.org/presentationml/2006/main" type="titleOnly" preserve="1">
+<p:sldLayout xmlns:a="http://schemas.openxmlformats.org/drawingml/2006/main" xmlns:r="http://schemas.openxmlformats.org/officeDocument/2006/relationships" xmlns:p="http://schemas.openxmlformats.org/presentationml/2006/main" showMasterSp="0" type="titleOnly" preserve="1">
   <p:cSld name="Title Only">
     <p:spTree>
       <p:nvGrpSpPr>
@@ -1766,7 +1767,7 @@
           <a:p>
             <a:fld id="{F86244D8-AB35-4C32-B857-A19335E4DDAB}" type="datetimeFigureOut">
               <a:rPr lang="he-IL" smtClean="0"/>
-              <a:t>כ"ז.אלול.תשע"ט</a:t>
+              <a:t>ה'.טבת.תש"פ</a:t>
             </a:fld>
             <a:endParaRPr lang="he-IL"/>
           </a:p>
@@ -1823,7 +1824,7 @@
 </file>
 
 <file path=ppt/slideLayouts/slideLayout7.xml><?xml version="1.0" encoding="utf-8"?>
-<p:sldLayout xmlns:a="http://schemas.openxmlformats.org/drawingml/2006/main" xmlns:r="http://schemas.openxmlformats.org/officeDocument/2006/relationships" xmlns:p="http://schemas.openxmlformats.org/presentationml/2006/main" type="blank" preserve="1">
+<p:sldLayout xmlns:a="http://schemas.openxmlformats.org/drawingml/2006/main" xmlns:r="http://schemas.openxmlformats.org/officeDocument/2006/relationships" xmlns:p="http://schemas.openxmlformats.org/presentationml/2006/main" showMasterSp="0" type="blank" preserve="1">
   <p:cSld name="Blank">
     <p:spTree>
       <p:nvGrpSpPr>
@@ -1856,7 +1857,7 @@
           <a:p>
             <a:fld id="{F86244D8-AB35-4C32-B857-A19335E4DDAB}" type="datetimeFigureOut">
               <a:rPr lang="he-IL" smtClean="0"/>
-              <a:t>כ"ז.אלול.תשע"ט</a:t>
+              <a:t>ה'.טבת.תש"פ</a:t>
             </a:fld>
             <a:endParaRPr lang="he-IL"/>
           </a:p>
@@ -1913,7 +1914,7 @@
 </file>
 
 <file path=ppt/slideLayouts/slideLayout8.xml><?xml version="1.0" encoding="utf-8"?>
-<p:sldLayout xmlns:a="http://schemas.openxmlformats.org/drawingml/2006/main" xmlns:r="http://schemas.openxmlformats.org/officeDocument/2006/relationships" xmlns:p="http://schemas.openxmlformats.org/presentationml/2006/main" type="objTx" preserve="1">
+<p:sldLayout xmlns:a="http://schemas.openxmlformats.org/drawingml/2006/main" xmlns:r="http://schemas.openxmlformats.org/officeDocument/2006/relationships" xmlns:p="http://schemas.openxmlformats.org/presentationml/2006/main" showMasterSp="0" type="objTx" preserve="1">
   <p:cSld name="Content with Caption">
     <p:spTree>
       <p:nvGrpSpPr>
@@ -2130,7 +2131,7 @@
           <a:p>
             <a:fld id="{F86244D8-AB35-4C32-B857-A19335E4DDAB}" type="datetimeFigureOut">
               <a:rPr lang="he-IL" smtClean="0"/>
-              <a:t>כ"ז.אלול.תשע"ט</a:t>
+              <a:t>ה'.טבת.תש"פ</a:t>
             </a:fld>
             <a:endParaRPr lang="he-IL"/>
           </a:p>
@@ -2187,7 +2188,7 @@
 </file>
 
 <file path=ppt/slideLayouts/slideLayout9.xml><?xml version="1.0" encoding="utf-8"?>
-<p:sldLayout xmlns:a="http://schemas.openxmlformats.org/drawingml/2006/main" xmlns:r="http://schemas.openxmlformats.org/officeDocument/2006/relationships" xmlns:p="http://schemas.openxmlformats.org/presentationml/2006/main" type="picTx" preserve="1">
+<p:sldLayout xmlns:a="http://schemas.openxmlformats.org/drawingml/2006/main" xmlns:r="http://schemas.openxmlformats.org/officeDocument/2006/relationships" xmlns:p="http://schemas.openxmlformats.org/presentationml/2006/main" showMasterSp="0" type="picTx" preserve="1">
   <p:cSld name="Picture with Caption">
     <p:spTree>
       <p:nvGrpSpPr>
@@ -2402,7 +2403,7 @@
           <a:p>
             <a:fld id="{F86244D8-AB35-4C32-B857-A19335E4DDAB}" type="datetimeFigureOut">
               <a:rPr lang="he-IL" smtClean="0"/>
-              <a:t>כ"ז.אלול.תשע"ט</a:t>
+              <a:t>ה'.טבת.תש"פ</a:t>
             </a:fld>
             <a:endParaRPr lang="he-IL"/>
           </a:p>
@@ -2462,9 +2463,37 @@
 <p:sldMaster xmlns:a="http://schemas.openxmlformats.org/drawingml/2006/main" xmlns:r="http://schemas.openxmlformats.org/officeDocument/2006/relationships" xmlns:p="http://schemas.openxmlformats.org/presentationml/2006/main">
   <p:cSld>
     <p:bg>
-      <p:bgRef idx="1002">
-        <a:schemeClr val="bg2"/>
-      </p:bgRef>
+      <p:bgPr>
+        <a:gradFill flip="none" rotWithShape="1">
+          <a:gsLst>
+            <a:gs pos="0">
+              <a:schemeClr val="bg2">
+                <a:tint val="100000"/>
+                <a:shade val="80000"/>
+                <a:satMod val="100000"/>
+                <a:lumMod val="100000"/>
+              </a:schemeClr>
+            </a:gs>
+            <a:gs pos="65000">
+              <a:schemeClr val="bg2">
+                <a:tint val="100000"/>
+                <a:shade val="95000"/>
+                <a:satMod val="100000"/>
+                <a:lumMod val="100000"/>
+              </a:schemeClr>
+            </a:gs>
+            <a:gs pos="100000">
+              <a:schemeClr val="bg1">
+                <a:lumMod val="85000"/>
+                <a:lumOff val="15000"/>
+              </a:schemeClr>
+            </a:gs>
+          </a:gsLst>
+          <a:lin ang="5400000" scaled="0"/>
+          <a:tileRect/>
+        </a:gradFill>
+        <a:effectLst/>
+      </p:bgPr>
     </p:bg>
     <p:spTree>
       <p:nvGrpSpPr>
@@ -2702,7 +2731,7 @@
           <a:p>
             <a:fld id="{F86244D8-AB35-4C32-B857-A19335E4DDAB}" type="datetimeFigureOut">
               <a:rPr lang="he-IL" smtClean="0"/>
-              <a:t>כ"ז.אלול.תשע"ט</a:t>
+              <a:t>ה'.טבת.תש"פ</a:t>
             </a:fld>
             <a:endParaRPr lang="he-IL"/>
           </a:p>
@@ -3135,7 +3164,7 @@
 </file>
 
 <file path=ppt/slides/slide1.xml><?xml version="1.0" encoding="utf-8"?>
-<p:sld xmlns:a="http://schemas.openxmlformats.org/drawingml/2006/main" xmlns:r="http://schemas.openxmlformats.org/officeDocument/2006/relationships" xmlns:p="http://schemas.openxmlformats.org/presentationml/2006/main">
+<p:sld xmlns:a="http://schemas.openxmlformats.org/drawingml/2006/main" xmlns:r="http://schemas.openxmlformats.org/officeDocument/2006/relationships" xmlns:p="http://schemas.openxmlformats.org/presentationml/2006/main" showMasterSp="0">
   <p:cSld>
     <p:spTree>
       <p:nvGrpSpPr>
@@ -3151,6 +3180,44 @@
           <a:chExt cx="0" cy="0"/>
         </a:xfrm>
       </p:grpSpPr>
+      <p:pic>
+        <p:nvPicPr>
+          <p:cNvPr id="4" name="Picture 3" descr="A close up of a logo&#10;&#10;Description automatically generated">
+            <a:extLst>
+              <a:ext uri="{FF2B5EF4-FFF2-40B4-BE49-F238E27FC236}">
+                <a16:creationId xmlns:a16="http://schemas.microsoft.com/office/drawing/2014/main" id="{113DBB63-2FE1-4249-8A13-F17AEF078087}"/>
+              </a:ext>
+            </a:extLst>
+          </p:cNvPr>
+          <p:cNvPicPr>
+            <a:picLocks noChangeAspect="1"/>
+          </p:cNvPicPr>
+          <p:nvPr/>
+        </p:nvPicPr>
+        <p:blipFill>
+          <a:blip r:embed="rId2">
+            <a:alphaModFix amt="80000"/>
+            <a:extLst>
+              <a:ext uri="{28A0092B-C50C-407E-A947-70E740481C1C}">
+                <a14:useLocalDpi xmlns:a14="http://schemas.microsoft.com/office/drawing/2010/main" val="0"/>
+              </a:ext>
+            </a:extLst>
+          </a:blip>
+          <a:stretch>
+            <a:fillRect/>
+          </a:stretch>
+        </p:blipFill>
+        <p:spPr>
+          <a:xfrm>
+            <a:off x="0" y="0"/>
+            <a:ext cx="9144000" cy="6098507"/>
+          </a:xfrm>
+          <a:prstGeom prst="rect">
+            <a:avLst/>
+          </a:prstGeom>
+          <a:noFill/>
+        </p:spPr>
+      </p:pic>
       <p:sp>
         <p:nvSpPr>
           <p:cNvPr id="2" name="Title 1"/>
@@ -3161,7 +3228,12 @@
             <p:ph type="title"/>
           </p:nvPr>
         </p:nvSpPr>
-        <p:spPr/>
+        <p:spPr>
+          <a:xfrm>
+            <a:off x="914400" y="5517232"/>
+            <a:ext cx="7315200" cy="793932"/>
+          </a:xfrm>
+        </p:spPr>
         <p:txBody>
           <a:bodyPr/>
           <a:lstStyle/>
@@ -3169,9 +3241,153 @@
             <a:pPr rtl="0"/>
             <a:r>
               <a:rPr lang="en-US" dirty="0"/>
-              <a:t>Pub\Sub Messenger</a:t>
+              <a:t>Pub\Sub Messenger for Unity</a:t>
             </a:r>
             <a:endParaRPr lang="he-IL" dirty="0"/>
+          </a:p>
+        </p:txBody>
+      </p:sp>
+      <p:sp>
+        <p:nvSpPr>
+          <p:cNvPr id="5" name="TextBox 4">
+            <a:hlinkClick r:id="rId3" tooltip="Publisher Website"/>
+            <a:extLst>
+              <a:ext uri="{FF2B5EF4-FFF2-40B4-BE49-F238E27FC236}">
+                <a16:creationId xmlns:a16="http://schemas.microsoft.com/office/drawing/2014/main" id="{B3074461-4CEE-FA41-8A73-97B9C26A59BB}"/>
+              </a:ext>
+            </a:extLst>
+          </p:cNvPr>
+          <p:cNvSpPr txBox="1"/>
+          <p:nvPr/>
+        </p:nvSpPr>
+        <p:spPr>
+          <a:xfrm>
+            <a:off x="6804249" y="121188"/>
+            <a:ext cx="2217440" cy="369332"/>
+          </a:xfrm>
+          <a:prstGeom prst="rect">
+            <a:avLst/>
+          </a:prstGeom>
+          <a:noFill/>
+        </p:spPr>
+        <p:txBody>
+          <a:bodyPr wrap="square" rtlCol="0">
+            <a:spAutoFit/>
+          </a:bodyPr>
+          <a:lstStyle/>
+          <a:p>
+            <a:pPr marL="0" defTabSz="914400" rtl="0" eaLnBrk="1" latinLnBrk="0" hangingPunct="1"/>
+            <a:r>
+              <a:rPr lang="en-US" dirty="0" err="1">
+                <a:effectLst>
+                  <a:outerShdw blurRad="50800" dist="38100" dir="2700000" algn="tl" rotWithShape="0">
+                    <a:prstClr val="black">
+                      <a:alpha val="40000"/>
+                    </a:prstClr>
+                  </a:outerShdw>
+                </a:effectLst>
+              </a:rPr>
+              <a:t>SuperMaxim.com</a:t>
+            </a:r>
+            <a:endParaRPr lang="en-US" dirty="0">
+              <a:effectLst>
+                <a:outerShdw blurRad="50800" dist="38100" dir="2700000" algn="tl" rotWithShape="0">
+                  <a:prstClr val="black">
+                    <a:alpha val="40000"/>
+                  </a:prstClr>
+                </a:outerShdw>
+              </a:effectLst>
+            </a:endParaRPr>
+          </a:p>
+        </p:txBody>
+      </p:sp>
+      <p:sp>
+        <p:nvSpPr>
+          <p:cNvPr id="6" name="TextBox 5">
+            <a:hlinkClick r:id="rId4" tooltip="Framework Sources - Github"/>
+            <a:extLst>
+              <a:ext uri="{FF2B5EF4-FFF2-40B4-BE49-F238E27FC236}">
+                <a16:creationId xmlns:a16="http://schemas.microsoft.com/office/drawing/2014/main" id="{F8F02031-F8B1-2140-95E3-9509540AB691}"/>
+              </a:ext>
+            </a:extLst>
+          </p:cNvPr>
+          <p:cNvSpPr txBox="1"/>
+          <p:nvPr/>
+        </p:nvSpPr>
+        <p:spPr>
+          <a:xfrm>
+            <a:off x="122312" y="111598"/>
+            <a:ext cx="3729607" cy="369332"/>
+          </a:xfrm>
+          <a:prstGeom prst="rect">
+            <a:avLst/>
+          </a:prstGeom>
+          <a:noFill/>
+        </p:spPr>
+        <p:txBody>
+          <a:bodyPr wrap="square" rtlCol="0">
+            <a:spAutoFit/>
+          </a:bodyPr>
+          <a:lstStyle/>
+          <a:p>
+            <a:pPr algn="l" rtl="0"/>
+            <a:r>
+              <a:rPr lang="en-US" dirty="0">
+                <a:effectLst>
+                  <a:outerShdw blurRad="50800" dist="38100" dir="2700000" algn="tl" rotWithShape="0">
+                    <a:prstClr val="black">
+                      <a:alpha val="40000"/>
+                    </a:prstClr>
+                  </a:outerShdw>
+                </a:effectLst>
+              </a:rPr>
+              <a:t>https://</a:t>
+            </a:r>
+            <a:r>
+              <a:rPr lang="en-US" dirty="0" err="1">
+                <a:effectLst>
+                  <a:outerShdw blurRad="50800" dist="38100" dir="2700000" algn="tl" rotWithShape="0">
+                    <a:prstClr val="black">
+                      <a:alpha val="40000"/>
+                    </a:prstClr>
+                  </a:outerShdw>
+                </a:effectLst>
+              </a:rPr>
+              <a:t>supermax.github.io</a:t>
+            </a:r>
+            <a:r>
+              <a:rPr lang="en-US" dirty="0">
+                <a:effectLst>
+                  <a:outerShdw blurRad="50800" dist="38100" dir="2700000" algn="tl" rotWithShape="0">
+                    <a:prstClr val="black">
+                      <a:alpha val="40000"/>
+                    </a:prstClr>
+                  </a:outerShdw>
+                </a:effectLst>
+              </a:rPr>
+              <a:t>/</a:t>
+            </a:r>
+            <a:r>
+              <a:rPr lang="en-US" dirty="0" err="1">
+                <a:effectLst>
+                  <a:outerShdw blurRad="50800" dist="38100" dir="2700000" algn="tl" rotWithShape="0">
+                    <a:prstClr val="black">
+                      <a:alpha val="40000"/>
+                    </a:prstClr>
+                  </a:outerShdw>
+                </a:effectLst>
+              </a:rPr>
+              <a:t>pubsub</a:t>
+            </a:r>
+            <a:endParaRPr lang="en-US" dirty="0">
+              <a:effectLst>
+                <a:outerShdw blurRad="50800" dist="38100" dir="2700000" algn="tl" rotWithShape="0">
+                  <a:prstClr val="black">
+                    <a:alpha val="40000"/>
+                  </a:prstClr>
+                </a:outerShdw>
+              </a:effectLst>
+            </a:endParaRPr>
           </a:p>
         </p:txBody>
       </p:sp>
@@ -4169,158 +4385,189 @@
           </a:p>
         </p:txBody>
       </p:sp>
-      <p:sp>
-        <p:nvSpPr>
-          <p:cNvPr id="10" name="Freeform 9"/>
-          <p:cNvSpPr/>
+      <p:grpSp>
+        <p:nvGrpSpPr>
+          <p:cNvPr id="2" name="Group 1">
+            <a:extLst>
+              <a:ext uri="{FF2B5EF4-FFF2-40B4-BE49-F238E27FC236}">
+                <a16:creationId xmlns:a16="http://schemas.microsoft.com/office/drawing/2014/main" id="{1755BF6C-030A-7B47-8EAD-04655E08BE67}"/>
+              </a:ext>
+            </a:extLst>
+          </p:cNvPr>
+          <p:cNvGrpSpPr/>
           <p:nvPr/>
-        </p:nvSpPr>
-        <p:spPr>
+        </p:nvGrpSpPr>
+        <p:grpSpPr>
           <a:xfrm>
-            <a:off x="3851919" y="3140966"/>
-            <a:ext cx="1584396" cy="1369505"/>
+            <a:off x="1835806" y="1376097"/>
+            <a:ext cx="5472388" cy="4825885"/>
+            <a:chOff x="1907813" y="1376097"/>
+            <a:chExt cx="5472388" cy="4825885"/>
           </a:xfrm>
-          <a:custGeom>
-            <a:avLst/>
-            <a:gdLst>
-              <a:gd name="connsiteX0" fmla="*/ 0 w 1584396"/>
-              <a:gd name="connsiteY0" fmla="*/ 228255 h 1369505"/>
-              <a:gd name="connsiteX1" fmla="*/ 228255 w 1584396"/>
-              <a:gd name="connsiteY1" fmla="*/ 0 h 1369505"/>
-              <a:gd name="connsiteX2" fmla="*/ 1356141 w 1584396"/>
-              <a:gd name="connsiteY2" fmla="*/ 0 h 1369505"/>
-              <a:gd name="connsiteX3" fmla="*/ 1584396 w 1584396"/>
-              <a:gd name="connsiteY3" fmla="*/ 228255 h 1369505"/>
-              <a:gd name="connsiteX4" fmla="*/ 1584396 w 1584396"/>
-              <a:gd name="connsiteY4" fmla="*/ 1141250 h 1369505"/>
-              <a:gd name="connsiteX5" fmla="*/ 1356141 w 1584396"/>
-              <a:gd name="connsiteY5" fmla="*/ 1369505 h 1369505"/>
-              <a:gd name="connsiteX6" fmla="*/ 228255 w 1584396"/>
-              <a:gd name="connsiteY6" fmla="*/ 1369505 h 1369505"/>
-              <a:gd name="connsiteX7" fmla="*/ 0 w 1584396"/>
-              <a:gd name="connsiteY7" fmla="*/ 1141250 h 1369505"/>
-              <a:gd name="connsiteX8" fmla="*/ 0 w 1584396"/>
-              <a:gd name="connsiteY8" fmla="*/ 228255 h 1369505"/>
-            </a:gdLst>
-            <a:ahLst/>
-            <a:cxnLst>
-              <a:cxn ang="0">
-                <a:pos x="connsiteX0" y="connsiteY0"/>
-              </a:cxn>
-              <a:cxn ang="0">
-                <a:pos x="connsiteX1" y="connsiteY1"/>
-              </a:cxn>
-              <a:cxn ang="0">
-                <a:pos x="connsiteX2" y="connsiteY2"/>
-              </a:cxn>
-              <a:cxn ang="0">
-                <a:pos x="connsiteX3" y="connsiteY3"/>
-              </a:cxn>
-              <a:cxn ang="0">
-                <a:pos x="connsiteX4" y="connsiteY4"/>
-              </a:cxn>
-              <a:cxn ang="0">
-                <a:pos x="connsiteX5" y="connsiteY5"/>
-              </a:cxn>
-              <a:cxn ang="0">
-                <a:pos x="connsiteX6" y="connsiteY6"/>
-              </a:cxn>
-              <a:cxn ang="0">
-                <a:pos x="connsiteX7" y="connsiteY7"/>
-              </a:cxn>
-              <a:cxn ang="0">
-                <a:pos x="connsiteX8" y="connsiteY8"/>
-              </a:cxn>
-            </a:cxnLst>
-            <a:rect l="l" t="t" r="r" b="b"/>
-            <a:pathLst>
-              <a:path w="1584396" h="1369505">
-                <a:moveTo>
-                  <a:pt x="0" y="228255"/>
-                </a:moveTo>
-                <a:cubicBezTo>
-                  <a:pt x="0" y="102193"/>
-                  <a:pt x="102193" y="0"/>
-                  <a:pt x="228255" y="0"/>
-                </a:cubicBezTo>
-                <a:lnTo>
-                  <a:pt x="1356141" y="0"/>
-                </a:lnTo>
-                <a:cubicBezTo>
-                  <a:pt x="1482203" y="0"/>
-                  <a:pt x="1584396" y="102193"/>
-                  <a:pt x="1584396" y="228255"/>
-                </a:cubicBezTo>
-                <a:lnTo>
-                  <a:pt x="1584396" y="1141250"/>
-                </a:lnTo>
-                <a:cubicBezTo>
-                  <a:pt x="1584396" y="1267312"/>
-                  <a:pt x="1482203" y="1369505"/>
-                  <a:pt x="1356141" y="1369505"/>
-                </a:cubicBezTo>
-                <a:lnTo>
-                  <a:pt x="228255" y="1369505"/>
-                </a:lnTo>
-                <a:cubicBezTo>
-                  <a:pt x="102193" y="1369505"/>
-                  <a:pt x="0" y="1267312"/>
-                  <a:pt x="0" y="1141250"/>
-                </a:cubicBezTo>
-                <a:lnTo>
-                  <a:pt x="0" y="228255"/>
-                </a:lnTo>
-                <a:close/>
-              </a:path>
-            </a:pathLst>
-          </a:custGeom>
-          <a:solidFill>
-            <a:srgbClr val="00B050"/>
-          </a:solidFill>
-        </p:spPr>
-        <p:style>
-          <a:lnRef idx="0">
-            <a:schemeClr val="lt1">
-              <a:hueOff val="0"/>
-              <a:satOff val="0"/>
-              <a:lumOff val="0"/>
-              <a:alphaOff val="0"/>
-            </a:schemeClr>
-          </a:lnRef>
-          <a:fillRef idx="3">
-            <a:scrgbClr r="0" g="0" b="0"/>
-          </a:fillRef>
-          <a:effectRef idx="2">
-            <a:schemeClr val="accent2">
-              <a:hueOff val="0"/>
-              <a:satOff val="0"/>
-              <a:lumOff val="0"/>
-              <a:alphaOff val="0"/>
-            </a:schemeClr>
-          </a:effectRef>
-          <a:fontRef idx="minor">
-            <a:schemeClr val="lt1"/>
-          </a:fontRef>
-        </p:style>
-        <p:txBody>
-          <a:bodyPr spcFirstLastPara="0" vert="horz" wrap="square" lIns="107494" tIns="107494" rIns="107494" bIns="107494" numCol="1" spcCol="1270" anchor="ctr" anchorCtr="0">
-            <a:noAutofit/>
-          </a:bodyPr>
-          <a:lstStyle/>
-          <a:p>
-            <a:pPr lvl="0" algn="ctr" defTabSz="711200" rtl="1">
-              <a:lnSpc>
-                <a:spcPct val="90000"/>
-              </a:lnSpc>
-              <a:spcBef>
-                <a:spcPct val="0"/>
-              </a:spcBef>
-              <a:spcAft>
-                <a:spcPct val="35000"/>
-              </a:spcAft>
-            </a:pPr>
-            <a:r>
-              <a:rPr lang="en-US" sz="1600" b="1" kern="1200" dirty="0">
+        </p:grpSpPr>
+        <p:sp>
+          <p:nvSpPr>
+            <p:cNvPr id="10" name="Freeform 9"/>
+            <p:cNvSpPr/>
+            <p:nvPr/>
+          </p:nvSpPr>
+          <p:spPr>
+            <a:xfrm>
+              <a:off x="3851919" y="3140966"/>
+              <a:ext cx="1584396" cy="1369505"/>
+            </a:xfrm>
+            <a:custGeom>
+              <a:avLst/>
+              <a:gdLst>
+                <a:gd name="connsiteX0" fmla="*/ 0 w 1584396"/>
+                <a:gd name="connsiteY0" fmla="*/ 228255 h 1369505"/>
+                <a:gd name="connsiteX1" fmla="*/ 228255 w 1584396"/>
+                <a:gd name="connsiteY1" fmla="*/ 0 h 1369505"/>
+                <a:gd name="connsiteX2" fmla="*/ 1356141 w 1584396"/>
+                <a:gd name="connsiteY2" fmla="*/ 0 h 1369505"/>
+                <a:gd name="connsiteX3" fmla="*/ 1584396 w 1584396"/>
+                <a:gd name="connsiteY3" fmla="*/ 228255 h 1369505"/>
+                <a:gd name="connsiteX4" fmla="*/ 1584396 w 1584396"/>
+                <a:gd name="connsiteY4" fmla="*/ 1141250 h 1369505"/>
+                <a:gd name="connsiteX5" fmla="*/ 1356141 w 1584396"/>
+                <a:gd name="connsiteY5" fmla="*/ 1369505 h 1369505"/>
+                <a:gd name="connsiteX6" fmla="*/ 228255 w 1584396"/>
+                <a:gd name="connsiteY6" fmla="*/ 1369505 h 1369505"/>
+                <a:gd name="connsiteX7" fmla="*/ 0 w 1584396"/>
+                <a:gd name="connsiteY7" fmla="*/ 1141250 h 1369505"/>
+                <a:gd name="connsiteX8" fmla="*/ 0 w 1584396"/>
+                <a:gd name="connsiteY8" fmla="*/ 228255 h 1369505"/>
+              </a:gdLst>
+              <a:ahLst/>
+              <a:cxnLst>
+                <a:cxn ang="0">
+                  <a:pos x="connsiteX0" y="connsiteY0"/>
+                </a:cxn>
+                <a:cxn ang="0">
+                  <a:pos x="connsiteX1" y="connsiteY1"/>
+                </a:cxn>
+                <a:cxn ang="0">
+                  <a:pos x="connsiteX2" y="connsiteY2"/>
+                </a:cxn>
+                <a:cxn ang="0">
+                  <a:pos x="connsiteX3" y="connsiteY3"/>
+                </a:cxn>
+                <a:cxn ang="0">
+                  <a:pos x="connsiteX4" y="connsiteY4"/>
+                </a:cxn>
+                <a:cxn ang="0">
+                  <a:pos x="connsiteX5" y="connsiteY5"/>
+                </a:cxn>
+                <a:cxn ang="0">
+                  <a:pos x="connsiteX6" y="connsiteY6"/>
+                </a:cxn>
+                <a:cxn ang="0">
+                  <a:pos x="connsiteX7" y="connsiteY7"/>
+                </a:cxn>
+                <a:cxn ang="0">
+                  <a:pos x="connsiteX8" y="connsiteY8"/>
+                </a:cxn>
+              </a:cxnLst>
+              <a:rect l="l" t="t" r="r" b="b"/>
+              <a:pathLst>
+                <a:path w="1584396" h="1369505">
+                  <a:moveTo>
+                    <a:pt x="0" y="228255"/>
+                  </a:moveTo>
+                  <a:cubicBezTo>
+                    <a:pt x="0" y="102193"/>
+                    <a:pt x="102193" y="0"/>
+                    <a:pt x="228255" y="0"/>
+                  </a:cubicBezTo>
+                  <a:lnTo>
+                    <a:pt x="1356141" y="0"/>
+                  </a:lnTo>
+                  <a:cubicBezTo>
+                    <a:pt x="1482203" y="0"/>
+                    <a:pt x="1584396" y="102193"/>
+                    <a:pt x="1584396" y="228255"/>
+                  </a:cubicBezTo>
+                  <a:lnTo>
+                    <a:pt x="1584396" y="1141250"/>
+                  </a:lnTo>
+                  <a:cubicBezTo>
+                    <a:pt x="1584396" y="1267312"/>
+                    <a:pt x="1482203" y="1369505"/>
+                    <a:pt x="1356141" y="1369505"/>
+                  </a:cubicBezTo>
+                  <a:lnTo>
+                    <a:pt x="228255" y="1369505"/>
+                  </a:lnTo>
+                  <a:cubicBezTo>
+                    <a:pt x="102193" y="1369505"/>
+                    <a:pt x="0" y="1267312"/>
+                    <a:pt x="0" y="1141250"/>
+                  </a:cubicBezTo>
+                  <a:lnTo>
+                    <a:pt x="0" y="228255"/>
+                  </a:lnTo>
+                  <a:close/>
+                </a:path>
+              </a:pathLst>
+            </a:custGeom>
+            <a:solidFill>
+              <a:srgbClr val="00B050"/>
+            </a:solidFill>
+          </p:spPr>
+          <p:style>
+            <a:lnRef idx="0">
+              <a:schemeClr val="lt1">
+                <a:hueOff val="0"/>
+                <a:satOff val="0"/>
+                <a:lumOff val="0"/>
+                <a:alphaOff val="0"/>
+              </a:schemeClr>
+            </a:lnRef>
+            <a:fillRef idx="3">
+              <a:scrgbClr r="0" g="0" b="0"/>
+            </a:fillRef>
+            <a:effectRef idx="2">
+              <a:schemeClr val="accent2">
+                <a:hueOff val="0"/>
+                <a:satOff val="0"/>
+                <a:lumOff val="0"/>
+                <a:alphaOff val="0"/>
+              </a:schemeClr>
+            </a:effectRef>
+            <a:fontRef idx="minor">
+              <a:schemeClr val="lt1"/>
+            </a:fontRef>
+          </p:style>
+          <p:txBody>
+            <a:bodyPr spcFirstLastPara="0" vert="horz" wrap="square" lIns="107494" tIns="107494" rIns="107494" bIns="107494" numCol="1" spcCol="1270" anchor="ctr" anchorCtr="0">
+              <a:noAutofit/>
+            </a:bodyPr>
+            <a:lstStyle/>
+            <a:p>
+              <a:pPr lvl="0" algn="ctr" defTabSz="711200" rtl="1">
+                <a:lnSpc>
+                  <a:spcPct val="90000"/>
+                </a:lnSpc>
+                <a:spcBef>
+                  <a:spcPct val="0"/>
+                </a:spcBef>
+                <a:spcAft>
+                  <a:spcPct val="35000"/>
+                </a:spcAft>
+              </a:pPr>
+              <a:r>
+                <a:rPr lang="en-US" sz="1600" b="1" kern="1200" dirty="0">
+                  <a:effectLst>
+                    <a:outerShdw blurRad="38100" dist="38100" dir="2700000" algn="tl">
+                      <a:srgbClr val="000000">
+                        <a:alpha val="43137"/>
+                      </a:srgbClr>
+                    </a:outerShdw>
+                  </a:effectLst>
+                </a:rPr>
+                <a:t>Event Messenger</a:t>
+              </a:r>
+              <a:endParaRPr lang="he-IL" sz="1600" b="1" kern="1200" dirty="0">
                 <a:effectLst>
                   <a:outerShdw blurRad="38100" dist="38100" dir="2700000" algn="tl">
                     <a:srgbClr val="000000">
@@ -4328,236 +4575,236 @@
                     </a:srgbClr>
                   </a:outerShdw>
                 </a:effectLst>
-              </a:rPr>
-              <a:t>Event Messenger</a:t>
-            </a:r>
-            <a:endParaRPr lang="he-IL" sz="1600" b="1" kern="1200" dirty="0">
-              <a:effectLst>
-                <a:outerShdw blurRad="38100" dist="38100" dir="2700000" algn="tl">
-                  <a:srgbClr val="000000">
-                    <a:alpha val="43137"/>
-                  </a:srgbClr>
-                </a:outerShdw>
-              </a:effectLst>
-            </a:endParaRPr>
-          </a:p>
-        </p:txBody>
-      </p:sp>
-      <p:sp>
-        <p:nvSpPr>
-          <p:cNvPr id="11" name="Freeform 10"/>
-          <p:cNvSpPr/>
-          <p:nvPr/>
-        </p:nvSpPr>
-        <p:spPr>
-          <a:xfrm rot="16200000">
-            <a:off x="4140512" y="2637361"/>
-            <a:ext cx="1007210" cy="0"/>
-          </a:xfrm>
-          <a:custGeom>
-            <a:avLst/>
-            <a:gdLst/>
-            <a:ahLst/>
-            <a:cxnLst/>
-            <a:rect l="0" t="0" r="0" b="0"/>
-            <a:pathLst>
-              <a:path>
-                <a:moveTo>
-                  <a:pt x="0" y="0"/>
-                </a:moveTo>
-                <a:lnTo>
-                  <a:pt x="1007210" y="0"/>
-                </a:lnTo>
-              </a:path>
-            </a:pathLst>
-          </a:custGeom>
-          <a:noFill/>
-          <a:ln w="28575">
+              </a:endParaRPr>
+            </a:p>
+          </p:txBody>
+        </p:sp>
+        <p:sp>
+          <p:nvSpPr>
+            <p:cNvPr id="11" name="Freeform 10"/>
+            <p:cNvSpPr/>
+            <p:nvPr/>
+          </p:nvSpPr>
+          <p:spPr>
+            <a:xfrm rot="16200000">
+              <a:off x="4140512" y="2637361"/>
+              <a:ext cx="1007210" cy="0"/>
+            </a:xfrm>
+            <a:custGeom>
+              <a:avLst/>
+              <a:gdLst/>
+              <a:ahLst/>
+              <a:cxnLst/>
+              <a:rect l="0" t="0" r="0" b="0"/>
+              <a:pathLst>
+                <a:path>
+                  <a:moveTo>
+                    <a:pt x="0" y="0"/>
+                  </a:moveTo>
+                  <a:lnTo>
+                    <a:pt x="1007210" y="0"/>
+                  </a:lnTo>
+                </a:path>
+              </a:pathLst>
+            </a:custGeom>
+            <a:noFill/>
+            <a:ln w="28575">
+              <a:solidFill>
+                <a:srgbClr val="FFC000"/>
+              </a:solidFill>
+              <a:headEnd type="triangle" w="med" len="med"/>
+              <a:tailEnd type="none" w="med" len="med"/>
+            </a:ln>
+          </p:spPr>
+          <p:style>
+            <a:lnRef idx="1">
+              <a:scrgbClr r="0" g="0" b="0"/>
+            </a:lnRef>
+            <a:fillRef idx="0">
+              <a:scrgbClr r="0" g="0" b="0"/>
+            </a:fillRef>
+            <a:effectRef idx="0">
+              <a:schemeClr val="accent3">
+                <a:tint val="90000"/>
+                <a:hueOff val="0"/>
+                <a:satOff val="0"/>
+                <a:lumOff val="0"/>
+                <a:alphaOff val="0"/>
+              </a:schemeClr>
+            </a:effectRef>
+            <a:fontRef idx="minor">
+              <a:schemeClr val="tx1">
+                <a:hueOff val="0"/>
+                <a:satOff val="0"/>
+                <a:lumOff val="0"/>
+                <a:alphaOff val="0"/>
+              </a:schemeClr>
+            </a:fontRef>
+          </p:style>
+        </p:sp>
+        <p:sp>
+          <p:nvSpPr>
+            <p:cNvPr id="12" name="Freeform 11"/>
+            <p:cNvSpPr/>
+            <p:nvPr/>
+          </p:nvSpPr>
+          <p:spPr>
+            <a:xfrm>
+              <a:off x="3996155" y="1376097"/>
+              <a:ext cx="1295924" cy="757658"/>
+            </a:xfrm>
+            <a:custGeom>
+              <a:avLst/>
+              <a:gdLst>
+                <a:gd name="connsiteX0" fmla="*/ 0 w 1295924"/>
+                <a:gd name="connsiteY0" fmla="*/ 126279 h 757658"/>
+                <a:gd name="connsiteX1" fmla="*/ 126279 w 1295924"/>
+                <a:gd name="connsiteY1" fmla="*/ 0 h 757658"/>
+                <a:gd name="connsiteX2" fmla="*/ 1169645 w 1295924"/>
+                <a:gd name="connsiteY2" fmla="*/ 0 h 757658"/>
+                <a:gd name="connsiteX3" fmla="*/ 1295924 w 1295924"/>
+                <a:gd name="connsiteY3" fmla="*/ 126279 h 757658"/>
+                <a:gd name="connsiteX4" fmla="*/ 1295924 w 1295924"/>
+                <a:gd name="connsiteY4" fmla="*/ 631379 h 757658"/>
+                <a:gd name="connsiteX5" fmla="*/ 1169645 w 1295924"/>
+                <a:gd name="connsiteY5" fmla="*/ 757658 h 757658"/>
+                <a:gd name="connsiteX6" fmla="*/ 126279 w 1295924"/>
+                <a:gd name="connsiteY6" fmla="*/ 757658 h 757658"/>
+                <a:gd name="connsiteX7" fmla="*/ 0 w 1295924"/>
+                <a:gd name="connsiteY7" fmla="*/ 631379 h 757658"/>
+                <a:gd name="connsiteX8" fmla="*/ 0 w 1295924"/>
+                <a:gd name="connsiteY8" fmla="*/ 126279 h 757658"/>
+              </a:gdLst>
+              <a:ahLst/>
+              <a:cxnLst>
+                <a:cxn ang="0">
+                  <a:pos x="connsiteX0" y="connsiteY0"/>
+                </a:cxn>
+                <a:cxn ang="0">
+                  <a:pos x="connsiteX1" y="connsiteY1"/>
+                </a:cxn>
+                <a:cxn ang="0">
+                  <a:pos x="connsiteX2" y="connsiteY2"/>
+                </a:cxn>
+                <a:cxn ang="0">
+                  <a:pos x="connsiteX3" y="connsiteY3"/>
+                </a:cxn>
+                <a:cxn ang="0">
+                  <a:pos x="connsiteX4" y="connsiteY4"/>
+                </a:cxn>
+                <a:cxn ang="0">
+                  <a:pos x="connsiteX5" y="connsiteY5"/>
+                </a:cxn>
+                <a:cxn ang="0">
+                  <a:pos x="connsiteX6" y="connsiteY6"/>
+                </a:cxn>
+                <a:cxn ang="0">
+                  <a:pos x="connsiteX7" y="connsiteY7"/>
+                </a:cxn>
+                <a:cxn ang="0">
+                  <a:pos x="connsiteX8" y="connsiteY8"/>
+                </a:cxn>
+              </a:cxnLst>
+              <a:rect l="l" t="t" r="r" b="b"/>
+              <a:pathLst>
+                <a:path w="1295924" h="757658">
+                  <a:moveTo>
+                    <a:pt x="0" y="126279"/>
+                  </a:moveTo>
+                  <a:cubicBezTo>
+                    <a:pt x="0" y="56537"/>
+                    <a:pt x="56537" y="0"/>
+                    <a:pt x="126279" y="0"/>
+                  </a:cubicBezTo>
+                  <a:lnTo>
+                    <a:pt x="1169645" y="0"/>
+                  </a:lnTo>
+                  <a:cubicBezTo>
+                    <a:pt x="1239387" y="0"/>
+                    <a:pt x="1295924" y="56537"/>
+                    <a:pt x="1295924" y="126279"/>
+                  </a:cubicBezTo>
+                  <a:lnTo>
+                    <a:pt x="1295924" y="631379"/>
+                  </a:lnTo>
+                  <a:cubicBezTo>
+                    <a:pt x="1295924" y="701121"/>
+                    <a:pt x="1239387" y="757658"/>
+                    <a:pt x="1169645" y="757658"/>
+                  </a:cubicBezTo>
+                  <a:lnTo>
+                    <a:pt x="126279" y="757658"/>
+                  </a:lnTo>
+                  <a:cubicBezTo>
+                    <a:pt x="56537" y="757658"/>
+                    <a:pt x="0" y="701121"/>
+                    <a:pt x="0" y="631379"/>
+                  </a:cubicBezTo>
+                  <a:lnTo>
+                    <a:pt x="0" y="126279"/>
+                  </a:lnTo>
+                  <a:close/>
+                </a:path>
+              </a:pathLst>
+            </a:custGeom>
             <a:solidFill>
-              <a:srgbClr val="FFC000"/>
+              <a:srgbClr val="FF0000"/>
             </a:solidFill>
-            <a:headEnd type="triangle" w="med" len="med"/>
-            <a:tailEnd type="none" w="med" len="med"/>
-          </a:ln>
-        </p:spPr>
-        <p:style>
-          <a:lnRef idx="1">
-            <a:scrgbClr r="0" g="0" b="0"/>
-          </a:lnRef>
-          <a:fillRef idx="0">
-            <a:scrgbClr r="0" g="0" b="0"/>
-          </a:fillRef>
-          <a:effectRef idx="0">
-            <a:schemeClr val="accent3">
-              <a:tint val="90000"/>
-              <a:hueOff val="0"/>
-              <a:satOff val="0"/>
-              <a:lumOff val="0"/>
-              <a:alphaOff val="0"/>
-            </a:schemeClr>
-          </a:effectRef>
-          <a:fontRef idx="minor">
-            <a:schemeClr val="tx1">
-              <a:hueOff val="0"/>
-              <a:satOff val="0"/>
-              <a:lumOff val="0"/>
-              <a:alphaOff val="0"/>
-            </a:schemeClr>
-          </a:fontRef>
-        </p:style>
-      </p:sp>
-      <p:sp>
-        <p:nvSpPr>
-          <p:cNvPr id="12" name="Freeform 11"/>
-          <p:cNvSpPr/>
-          <p:nvPr/>
-        </p:nvSpPr>
-        <p:spPr>
-          <a:xfrm>
-            <a:off x="3996155" y="1376097"/>
-            <a:ext cx="1295924" cy="757658"/>
-          </a:xfrm>
-          <a:custGeom>
-            <a:avLst/>
-            <a:gdLst>
-              <a:gd name="connsiteX0" fmla="*/ 0 w 1295924"/>
-              <a:gd name="connsiteY0" fmla="*/ 126279 h 757658"/>
-              <a:gd name="connsiteX1" fmla="*/ 126279 w 1295924"/>
-              <a:gd name="connsiteY1" fmla="*/ 0 h 757658"/>
-              <a:gd name="connsiteX2" fmla="*/ 1169645 w 1295924"/>
-              <a:gd name="connsiteY2" fmla="*/ 0 h 757658"/>
-              <a:gd name="connsiteX3" fmla="*/ 1295924 w 1295924"/>
-              <a:gd name="connsiteY3" fmla="*/ 126279 h 757658"/>
-              <a:gd name="connsiteX4" fmla="*/ 1295924 w 1295924"/>
-              <a:gd name="connsiteY4" fmla="*/ 631379 h 757658"/>
-              <a:gd name="connsiteX5" fmla="*/ 1169645 w 1295924"/>
-              <a:gd name="connsiteY5" fmla="*/ 757658 h 757658"/>
-              <a:gd name="connsiteX6" fmla="*/ 126279 w 1295924"/>
-              <a:gd name="connsiteY6" fmla="*/ 757658 h 757658"/>
-              <a:gd name="connsiteX7" fmla="*/ 0 w 1295924"/>
-              <a:gd name="connsiteY7" fmla="*/ 631379 h 757658"/>
-              <a:gd name="connsiteX8" fmla="*/ 0 w 1295924"/>
-              <a:gd name="connsiteY8" fmla="*/ 126279 h 757658"/>
-            </a:gdLst>
-            <a:ahLst/>
-            <a:cxnLst>
-              <a:cxn ang="0">
-                <a:pos x="connsiteX0" y="connsiteY0"/>
-              </a:cxn>
-              <a:cxn ang="0">
-                <a:pos x="connsiteX1" y="connsiteY1"/>
-              </a:cxn>
-              <a:cxn ang="0">
-                <a:pos x="connsiteX2" y="connsiteY2"/>
-              </a:cxn>
-              <a:cxn ang="0">
-                <a:pos x="connsiteX3" y="connsiteY3"/>
-              </a:cxn>
-              <a:cxn ang="0">
-                <a:pos x="connsiteX4" y="connsiteY4"/>
-              </a:cxn>
-              <a:cxn ang="0">
-                <a:pos x="connsiteX5" y="connsiteY5"/>
-              </a:cxn>
-              <a:cxn ang="0">
-                <a:pos x="connsiteX6" y="connsiteY6"/>
-              </a:cxn>
-              <a:cxn ang="0">
-                <a:pos x="connsiteX7" y="connsiteY7"/>
-              </a:cxn>
-              <a:cxn ang="0">
-                <a:pos x="connsiteX8" y="connsiteY8"/>
-              </a:cxn>
-            </a:cxnLst>
-            <a:rect l="l" t="t" r="r" b="b"/>
-            <a:pathLst>
-              <a:path w="1295924" h="757658">
-                <a:moveTo>
-                  <a:pt x="0" y="126279"/>
-                </a:moveTo>
-                <a:cubicBezTo>
-                  <a:pt x="0" y="56537"/>
-                  <a:pt x="56537" y="0"/>
-                  <a:pt x="126279" y="0"/>
-                </a:cubicBezTo>
-                <a:lnTo>
-                  <a:pt x="1169645" y="0"/>
-                </a:lnTo>
-                <a:cubicBezTo>
-                  <a:pt x="1239387" y="0"/>
-                  <a:pt x="1295924" y="56537"/>
-                  <a:pt x="1295924" y="126279"/>
-                </a:cubicBezTo>
-                <a:lnTo>
-                  <a:pt x="1295924" y="631379"/>
-                </a:lnTo>
-                <a:cubicBezTo>
-                  <a:pt x="1295924" y="701121"/>
-                  <a:pt x="1239387" y="757658"/>
-                  <a:pt x="1169645" y="757658"/>
-                </a:cubicBezTo>
-                <a:lnTo>
-                  <a:pt x="126279" y="757658"/>
-                </a:lnTo>
-                <a:cubicBezTo>
-                  <a:pt x="56537" y="757658"/>
-                  <a:pt x="0" y="701121"/>
-                  <a:pt x="0" y="631379"/>
-                </a:cubicBezTo>
-                <a:lnTo>
-                  <a:pt x="0" y="126279"/>
-                </a:lnTo>
-                <a:close/>
-              </a:path>
-            </a:pathLst>
-          </a:custGeom>
-          <a:solidFill>
-            <a:srgbClr val="FF0000"/>
-          </a:solidFill>
-        </p:spPr>
-        <p:style>
-          <a:lnRef idx="0">
-            <a:schemeClr val="lt1">
-              <a:hueOff val="0"/>
-              <a:satOff val="0"/>
-              <a:lumOff val="0"/>
-              <a:alphaOff val="0"/>
-            </a:schemeClr>
-          </a:lnRef>
-          <a:fillRef idx="3">
-            <a:scrgbClr r="0" g="0" b="0"/>
-          </a:fillRef>
-          <a:effectRef idx="2">
-            <a:schemeClr val="accent3">
-              <a:hueOff val="0"/>
-              <a:satOff val="0"/>
-              <a:lumOff val="0"/>
-              <a:alphaOff val="0"/>
-            </a:schemeClr>
-          </a:effectRef>
-          <a:fontRef idx="minor">
-            <a:schemeClr val="lt1"/>
-          </a:fontRef>
-        </p:style>
-        <p:txBody>
-          <a:bodyPr spcFirstLastPara="0" vert="horz" wrap="square" lIns="67466" tIns="67466" rIns="67466" bIns="67466" numCol="1" spcCol="1270" anchor="ctr" anchorCtr="0">
-            <a:noAutofit/>
-          </a:bodyPr>
-          <a:lstStyle/>
-          <a:p>
-            <a:pPr lvl="0" algn="ctr" defTabSz="533400" rtl="1">
-              <a:lnSpc>
-                <a:spcPct val="90000"/>
-              </a:lnSpc>
-              <a:spcBef>
-                <a:spcPct val="0"/>
-              </a:spcBef>
-              <a:spcAft>
-                <a:spcPct val="35000"/>
-              </a:spcAft>
-            </a:pPr>
-            <a:r>
-              <a:rPr lang="en-US" sz="1200" b="1" kern="1200" dirty="0">
+          </p:spPr>
+          <p:style>
+            <a:lnRef idx="0">
+              <a:schemeClr val="lt1">
+                <a:hueOff val="0"/>
+                <a:satOff val="0"/>
+                <a:lumOff val="0"/>
+                <a:alphaOff val="0"/>
+              </a:schemeClr>
+            </a:lnRef>
+            <a:fillRef idx="3">
+              <a:scrgbClr r="0" g="0" b="0"/>
+            </a:fillRef>
+            <a:effectRef idx="2">
+              <a:schemeClr val="accent3">
+                <a:hueOff val="0"/>
+                <a:satOff val="0"/>
+                <a:lumOff val="0"/>
+                <a:alphaOff val="0"/>
+              </a:schemeClr>
+            </a:effectRef>
+            <a:fontRef idx="minor">
+              <a:schemeClr val="lt1"/>
+            </a:fontRef>
+          </p:style>
+          <p:txBody>
+            <a:bodyPr spcFirstLastPara="0" vert="horz" wrap="square" lIns="67466" tIns="67466" rIns="67466" bIns="67466" numCol="1" spcCol="1270" anchor="ctr" anchorCtr="0">
+              <a:noAutofit/>
+            </a:bodyPr>
+            <a:lstStyle/>
+            <a:p>
+              <a:pPr lvl="0" algn="ctr" defTabSz="533400" rtl="1">
+                <a:lnSpc>
+                  <a:spcPct val="90000"/>
+                </a:lnSpc>
+                <a:spcBef>
+                  <a:spcPct val="0"/>
+                </a:spcBef>
+                <a:spcAft>
+                  <a:spcPct val="35000"/>
+                </a:spcAft>
+              </a:pPr>
+              <a:r>
+                <a:rPr lang="en-US" sz="1200" b="1" kern="1200" dirty="0">
+                  <a:effectLst>
+                    <a:outerShdw blurRad="38100" dist="38100" dir="2700000" algn="tl">
+                      <a:srgbClr val="000000">
+                        <a:alpha val="43137"/>
+                      </a:srgbClr>
+                    </a:outerShdw>
+                  </a:effectLst>
+                </a:rPr>
+                <a:t>Publisher</a:t>
+              </a:r>
+              <a:endParaRPr lang="he-IL" sz="1200" b="1" kern="1200" dirty="0">
                 <a:effectLst>
                   <a:outerShdw blurRad="38100" dist="38100" dir="2700000" algn="tl">
                     <a:srgbClr val="000000">
@@ -4565,238 +4812,238 @@
                     </a:srgbClr>
                   </a:outerShdw>
                 </a:effectLst>
-              </a:rPr>
-              <a:t>Publisher</a:t>
-            </a:r>
-            <a:endParaRPr lang="he-IL" sz="1200" b="1" kern="1200" dirty="0">
-              <a:effectLst>
-                <a:outerShdw blurRad="38100" dist="38100" dir="2700000" algn="tl">
-                  <a:srgbClr val="000000">
-                    <a:alpha val="43137"/>
-                  </a:srgbClr>
-                </a:outerShdw>
-              </a:effectLst>
-            </a:endParaRPr>
-          </a:p>
-        </p:txBody>
-      </p:sp>
-      <p:sp>
-        <p:nvSpPr>
-          <p:cNvPr id="13" name="Freeform 12"/>
-          <p:cNvSpPr/>
-          <p:nvPr/>
-        </p:nvSpPr>
-        <p:spPr>
-          <a:xfrm>
-            <a:off x="5436315" y="3825719"/>
-            <a:ext cx="613302" cy="0"/>
-          </a:xfrm>
-          <a:custGeom>
-            <a:avLst/>
-            <a:gdLst/>
-            <a:ahLst/>
-            <a:cxnLst/>
-            <a:rect l="0" t="0" r="0" b="0"/>
-            <a:pathLst>
-              <a:path>
-                <a:moveTo>
-                  <a:pt x="0" y="0"/>
-                </a:moveTo>
-                <a:lnTo>
-                  <a:pt x="613302" y="0"/>
-                </a:lnTo>
-              </a:path>
-            </a:pathLst>
-          </a:custGeom>
-          <a:noFill/>
-          <a:ln w="28575">
-            <a:solidFill>
-              <a:srgbClr val="FFC000"/>
-            </a:solidFill>
-            <a:headEnd type="none" w="med" len="med"/>
-            <a:tailEnd type="triangle" w="med" len="med"/>
-          </a:ln>
-        </p:spPr>
-        <p:style>
-          <a:lnRef idx="1">
-            <a:scrgbClr r="0" g="0" b="0"/>
-          </a:lnRef>
-          <a:fillRef idx="0">
-            <a:scrgbClr r="0" g="0" b="0"/>
-          </a:fillRef>
-          <a:effectRef idx="0">
-            <a:schemeClr val="accent3">
-              <a:tint val="90000"/>
-              <a:hueOff val="0"/>
-              <a:satOff val="0"/>
-              <a:lumOff val="0"/>
-              <a:alphaOff val="0"/>
-            </a:schemeClr>
-          </a:effectRef>
-          <a:fontRef idx="minor">
-            <a:schemeClr val="tx1">
-              <a:hueOff val="0"/>
-              <a:satOff val="0"/>
-              <a:lumOff val="0"/>
-              <a:alphaOff val="0"/>
-            </a:schemeClr>
-          </a:fontRef>
-        </p:style>
-      </p:sp>
-      <p:sp>
-        <p:nvSpPr>
-          <p:cNvPr id="14" name="Freeform 13"/>
-          <p:cNvSpPr/>
-          <p:nvPr/>
-        </p:nvSpPr>
-        <p:spPr>
-          <a:xfrm>
-            <a:off x="6049617" y="3502355"/>
-            <a:ext cx="1330584" cy="646727"/>
-          </a:xfrm>
-          <a:custGeom>
-            <a:avLst/>
-            <a:gdLst>
-              <a:gd name="connsiteX0" fmla="*/ 0 w 1330584"/>
-              <a:gd name="connsiteY0" fmla="*/ 107790 h 646727"/>
-              <a:gd name="connsiteX1" fmla="*/ 107790 w 1330584"/>
-              <a:gd name="connsiteY1" fmla="*/ 0 h 646727"/>
-              <a:gd name="connsiteX2" fmla="*/ 1222794 w 1330584"/>
-              <a:gd name="connsiteY2" fmla="*/ 0 h 646727"/>
-              <a:gd name="connsiteX3" fmla="*/ 1330584 w 1330584"/>
-              <a:gd name="connsiteY3" fmla="*/ 107790 h 646727"/>
-              <a:gd name="connsiteX4" fmla="*/ 1330584 w 1330584"/>
-              <a:gd name="connsiteY4" fmla="*/ 538937 h 646727"/>
-              <a:gd name="connsiteX5" fmla="*/ 1222794 w 1330584"/>
-              <a:gd name="connsiteY5" fmla="*/ 646727 h 646727"/>
-              <a:gd name="connsiteX6" fmla="*/ 107790 w 1330584"/>
-              <a:gd name="connsiteY6" fmla="*/ 646727 h 646727"/>
-              <a:gd name="connsiteX7" fmla="*/ 0 w 1330584"/>
-              <a:gd name="connsiteY7" fmla="*/ 538937 h 646727"/>
-              <a:gd name="connsiteX8" fmla="*/ 0 w 1330584"/>
-              <a:gd name="connsiteY8" fmla="*/ 107790 h 646727"/>
-            </a:gdLst>
-            <a:ahLst/>
-            <a:cxnLst>
-              <a:cxn ang="0">
-                <a:pos x="connsiteX0" y="connsiteY0"/>
-              </a:cxn>
-              <a:cxn ang="0">
-                <a:pos x="connsiteX1" y="connsiteY1"/>
-              </a:cxn>
-              <a:cxn ang="0">
-                <a:pos x="connsiteX2" y="connsiteY2"/>
-              </a:cxn>
-              <a:cxn ang="0">
-                <a:pos x="connsiteX3" y="connsiteY3"/>
-              </a:cxn>
-              <a:cxn ang="0">
-                <a:pos x="connsiteX4" y="connsiteY4"/>
-              </a:cxn>
-              <a:cxn ang="0">
-                <a:pos x="connsiteX5" y="connsiteY5"/>
-              </a:cxn>
-              <a:cxn ang="0">
-                <a:pos x="connsiteX6" y="connsiteY6"/>
-              </a:cxn>
-              <a:cxn ang="0">
-                <a:pos x="connsiteX7" y="connsiteY7"/>
-              </a:cxn>
-              <a:cxn ang="0">
-                <a:pos x="connsiteX8" y="connsiteY8"/>
-              </a:cxn>
-            </a:cxnLst>
-            <a:rect l="l" t="t" r="r" b="b"/>
-            <a:pathLst>
-              <a:path w="1330584" h="646727">
-                <a:moveTo>
-                  <a:pt x="0" y="107790"/>
-                </a:moveTo>
-                <a:cubicBezTo>
-                  <a:pt x="0" y="48259"/>
-                  <a:pt x="48259" y="0"/>
-                  <a:pt x="107790" y="0"/>
-                </a:cubicBezTo>
-                <a:lnTo>
-                  <a:pt x="1222794" y="0"/>
-                </a:lnTo>
-                <a:cubicBezTo>
-                  <a:pt x="1282325" y="0"/>
-                  <a:pt x="1330584" y="48259"/>
-                  <a:pt x="1330584" y="107790"/>
-                </a:cubicBezTo>
-                <a:lnTo>
-                  <a:pt x="1330584" y="538937"/>
-                </a:lnTo>
-                <a:cubicBezTo>
-                  <a:pt x="1330584" y="598468"/>
-                  <a:pt x="1282325" y="646727"/>
-                  <a:pt x="1222794" y="646727"/>
-                </a:cubicBezTo>
-                <a:lnTo>
-                  <a:pt x="107790" y="646727"/>
-                </a:lnTo>
-                <a:cubicBezTo>
-                  <a:pt x="48259" y="646727"/>
-                  <a:pt x="0" y="598468"/>
-                  <a:pt x="0" y="538937"/>
-                </a:cubicBezTo>
-                <a:lnTo>
-                  <a:pt x="0" y="107790"/>
-                </a:lnTo>
-                <a:close/>
-              </a:path>
-            </a:pathLst>
-          </a:custGeom>
-        </p:spPr>
-        <p:style>
-          <a:lnRef idx="0">
-            <a:schemeClr val="lt1">
-              <a:hueOff val="0"/>
-              <a:satOff val="0"/>
-              <a:lumOff val="0"/>
-              <a:alphaOff val="0"/>
-            </a:schemeClr>
-          </a:lnRef>
-          <a:fillRef idx="3">
-            <a:schemeClr val="accent4">
-              <a:hueOff val="0"/>
-              <a:satOff val="0"/>
-              <a:lumOff val="0"/>
-              <a:alphaOff val="0"/>
-            </a:schemeClr>
-          </a:fillRef>
-          <a:effectRef idx="2">
-            <a:schemeClr val="accent4">
-              <a:hueOff val="0"/>
-              <a:satOff val="0"/>
-              <a:lumOff val="0"/>
-              <a:alphaOff val="0"/>
-            </a:schemeClr>
-          </a:effectRef>
-          <a:fontRef idx="minor">
-            <a:schemeClr val="lt1"/>
-          </a:fontRef>
-        </p:style>
-        <p:txBody>
-          <a:bodyPr spcFirstLastPara="0" vert="horz" wrap="square" lIns="62051" tIns="62051" rIns="62051" bIns="62051" numCol="1" spcCol="1270" anchor="ctr" anchorCtr="0">
-            <a:noAutofit/>
-          </a:bodyPr>
-          <a:lstStyle/>
-          <a:p>
-            <a:pPr lvl="0" algn="ctr" defTabSz="533400" rtl="1">
-              <a:lnSpc>
-                <a:spcPct val="90000"/>
-              </a:lnSpc>
-              <a:spcBef>
-                <a:spcPct val="0"/>
-              </a:spcBef>
-              <a:spcAft>
-                <a:spcPct val="35000"/>
-              </a:spcAft>
-            </a:pPr>
-            <a:r>
-              <a:rPr lang="en-US" sz="1200" b="1" kern="1200" dirty="0">
+              </a:endParaRPr>
+            </a:p>
+          </p:txBody>
+        </p:sp>
+        <p:sp>
+          <p:nvSpPr>
+            <p:cNvPr id="13" name="Freeform 12"/>
+            <p:cNvSpPr/>
+            <p:nvPr/>
+          </p:nvSpPr>
+          <p:spPr>
+            <a:xfrm>
+              <a:off x="5436315" y="3825719"/>
+              <a:ext cx="613302" cy="0"/>
+            </a:xfrm>
+            <a:custGeom>
+              <a:avLst/>
+              <a:gdLst/>
+              <a:ahLst/>
+              <a:cxnLst/>
+              <a:rect l="0" t="0" r="0" b="0"/>
+              <a:pathLst>
+                <a:path>
+                  <a:moveTo>
+                    <a:pt x="0" y="0"/>
+                  </a:moveTo>
+                  <a:lnTo>
+                    <a:pt x="613302" y="0"/>
+                  </a:lnTo>
+                </a:path>
+              </a:pathLst>
+            </a:custGeom>
+            <a:noFill/>
+            <a:ln w="28575">
+              <a:solidFill>
+                <a:srgbClr val="FFC000"/>
+              </a:solidFill>
+              <a:headEnd type="none" w="med" len="med"/>
+              <a:tailEnd type="triangle" w="med" len="med"/>
+            </a:ln>
+          </p:spPr>
+          <p:style>
+            <a:lnRef idx="1">
+              <a:scrgbClr r="0" g="0" b="0"/>
+            </a:lnRef>
+            <a:fillRef idx="0">
+              <a:scrgbClr r="0" g="0" b="0"/>
+            </a:fillRef>
+            <a:effectRef idx="0">
+              <a:schemeClr val="accent3">
+                <a:tint val="90000"/>
+                <a:hueOff val="0"/>
+                <a:satOff val="0"/>
+                <a:lumOff val="0"/>
+                <a:alphaOff val="0"/>
+              </a:schemeClr>
+            </a:effectRef>
+            <a:fontRef idx="minor">
+              <a:schemeClr val="tx1">
+                <a:hueOff val="0"/>
+                <a:satOff val="0"/>
+                <a:lumOff val="0"/>
+                <a:alphaOff val="0"/>
+              </a:schemeClr>
+            </a:fontRef>
+          </p:style>
+        </p:sp>
+        <p:sp>
+          <p:nvSpPr>
+            <p:cNvPr id="14" name="Freeform 13"/>
+            <p:cNvSpPr/>
+            <p:nvPr/>
+          </p:nvSpPr>
+          <p:spPr>
+            <a:xfrm>
+              <a:off x="6049617" y="3502355"/>
+              <a:ext cx="1330584" cy="646727"/>
+            </a:xfrm>
+            <a:custGeom>
+              <a:avLst/>
+              <a:gdLst>
+                <a:gd name="connsiteX0" fmla="*/ 0 w 1330584"/>
+                <a:gd name="connsiteY0" fmla="*/ 107790 h 646727"/>
+                <a:gd name="connsiteX1" fmla="*/ 107790 w 1330584"/>
+                <a:gd name="connsiteY1" fmla="*/ 0 h 646727"/>
+                <a:gd name="connsiteX2" fmla="*/ 1222794 w 1330584"/>
+                <a:gd name="connsiteY2" fmla="*/ 0 h 646727"/>
+                <a:gd name="connsiteX3" fmla="*/ 1330584 w 1330584"/>
+                <a:gd name="connsiteY3" fmla="*/ 107790 h 646727"/>
+                <a:gd name="connsiteX4" fmla="*/ 1330584 w 1330584"/>
+                <a:gd name="connsiteY4" fmla="*/ 538937 h 646727"/>
+                <a:gd name="connsiteX5" fmla="*/ 1222794 w 1330584"/>
+                <a:gd name="connsiteY5" fmla="*/ 646727 h 646727"/>
+                <a:gd name="connsiteX6" fmla="*/ 107790 w 1330584"/>
+                <a:gd name="connsiteY6" fmla="*/ 646727 h 646727"/>
+                <a:gd name="connsiteX7" fmla="*/ 0 w 1330584"/>
+                <a:gd name="connsiteY7" fmla="*/ 538937 h 646727"/>
+                <a:gd name="connsiteX8" fmla="*/ 0 w 1330584"/>
+                <a:gd name="connsiteY8" fmla="*/ 107790 h 646727"/>
+              </a:gdLst>
+              <a:ahLst/>
+              <a:cxnLst>
+                <a:cxn ang="0">
+                  <a:pos x="connsiteX0" y="connsiteY0"/>
+                </a:cxn>
+                <a:cxn ang="0">
+                  <a:pos x="connsiteX1" y="connsiteY1"/>
+                </a:cxn>
+                <a:cxn ang="0">
+                  <a:pos x="connsiteX2" y="connsiteY2"/>
+                </a:cxn>
+                <a:cxn ang="0">
+                  <a:pos x="connsiteX3" y="connsiteY3"/>
+                </a:cxn>
+                <a:cxn ang="0">
+                  <a:pos x="connsiteX4" y="connsiteY4"/>
+                </a:cxn>
+                <a:cxn ang="0">
+                  <a:pos x="connsiteX5" y="connsiteY5"/>
+                </a:cxn>
+                <a:cxn ang="0">
+                  <a:pos x="connsiteX6" y="connsiteY6"/>
+                </a:cxn>
+                <a:cxn ang="0">
+                  <a:pos x="connsiteX7" y="connsiteY7"/>
+                </a:cxn>
+                <a:cxn ang="0">
+                  <a:pos x="connsiteX8" y="connsiteY8"/>
+                </a:cxn>
+              </a:cxnLst>
+              <a:rect l="l" t="t" r="r" b="b"/>
+              <a:pathLst>
+                <a:path w="1330584" h="646727">
+                  <a:moveTo>
+                    <a:pt x="0" y="107790"/>
+                  </a:moveTo>
+                  <a:cubicBezTo>
+                    <a:pt x="0" y="48259"/>
+                    <a:pt x="48259" y="0"/>
+                    <a:pt x="107790" y="0"/>
+                  </a:cubicBezTo>
+                  <a:lnTo>
+                    <a:pt x="1222794" y="0"/>
+                  </a:lnTo>
+                  <a:cubicBezTo>
+                    <a:pt x="1282325" y="0"/>
+                    <a:pt x="1330584" y="48259"/>
+                    <a:pt x="1330584" y="107790"/>
+                  </a:cubicBezTo>
+                  <a:lnTo>
+                    <a:pt x="1330584" y="538937"/>
+                  </a:lnTo>
+                  <a:cubicBezTo>
+                    <a:pt x="1330584" y="598468"/>
+                    <a:pt x="1282325" y="646727"/>
+                    <a:pt x="1222794" y="646727"/>
+                  </a:cubicBezTo>
+                  <a:lnTo>
+                    <a:pt x="107790" y="646727"/>
+                  </a:lnTo>
+                  <a:cubicBezTo>
+                    <a:pt x="48259" y="646727"/>
+                    <a:pt x="0" y="598468"/>
+                    <a:pt x="0" y="538937"/>
+                  </a:cubicBezTo>
+                  <a:lnTo>
+                    <a:pt x="0" y="107790"/>
+                  </a:lnTo>
+                  <a:close/>
+                </a:path>
+              </a:pathLst>
+            </a:custGeom>
+          </p:spPr>
+          <p:style>
+            <a:lnRef idx="0">
+              <a:schemeClr val="lt1">
+                <a:hueOff val="0"/>
+                <a:satOff val="0"/>
+                <a:lumOff val="0"/>
+                <a:alphaOff val="0"/>
+              </a:schemeClr>
+            </a:lnRef>
+            <a:fillRef idx="3">
+              <a:schemeClr val="accent4">
+                <a:hueOff val="0"/>
+                <a:satOff val="0"/>
+                <a:lumOff val="0"/>
+                <a:alphaOff val="0"/>
+              </a:schemeClr>
+            </a:fillRef>
+            <a:effectRef idx="2">
+              <a:schemeClr val="accent4">
+                <a:hueOff val="0"/>
+                <a:satOff val="0"/>
+                <a:lumOff val="0"/>
+                <a:alphaOff val="0"/>
+              </a:schemeClr>
+            </a:effectRef>
+            <a:fontRef idx="minor">
+              <a:schemeClr val="lt1"/>
+            </a:fontRef>
+          </p:style>
+          <p:txBody>
+            <a:bodyPr spcFirstLastPara="0" vert="horz" wrap="square" lIns="62051" tIns="62051" rIns="62051" bIns="62051" numCol="1" spcCol="1270" anchor="ctr" anchorCtr="0">
+              <a:noAutofit/>
+            </a:bodyPr>
+            <a:lstStyle/>
+            <a:p>
+              <a:pPr lvl="0" algn="ctr" defTabSz="533400" rtl="1">
+                <a:lnSpc>
+                  <a:spcPct val="90000"/>
+                </a:lnSpc>
+                <a:spcBef>
+                  <a:spcPct val="0"/>
+                </a:spcBef>
+                <a:spcAft>
+                  <a:spcPct val="35000"/>
+                </a:spcAft>
+              </a:pPr>
+              <a:r>
+                <a:rPr lang="en-US" sz="1200" b="1" kern="1200" dirty="0">
+                  <a:effectLst>
+                    <a:outerShdw blurRad="38100" dist="38100" dir="2700000" algn="tl">
+                      <a:srgbClr val="000000">
+                        <a:alpha val="43137"/>
+                      </a:srgbClr>
+                    </a:outerShdw>
+                  </a:effectLst>
+                </a:rPr>
+                <a:t>Subscriber 1</a:t>
+              </a:r>
+              <a:endParaRPr lang="he-IL" sz="1200" b="1" kern="1200" dirty="0">
                 <a:effectLst>
                   <a:outerShdw blurRad="38100" dist="38100" dir="2700000" algn="tl">
                     <a:srgbClr val="000000">
@@ -4804,239 +5051,239 @@
                     </a:srgbClr>
                   </a:outerShdw>
                 </a:effectLst>
-              </a:rPr>
-              <a:t>Subscriber 1</a:t>
-            </a:r>
-            <a:endParaRPr lang="he-IL" sz="1200" b="1" kern="1200" dirty="0">
-              <a:effectLst>
-                <a:outerShdw blurRad="38100" dist="38100" dir="2700000" algn="tl">
-                  <a:srgbClr val="000000">
-                    <a:alpha val="43137"/>
-                  </a:srgbClr>
-                </a:outerShdw>
-              </a:effectLst>
-            </a:endParaRPr>
-          </a:p>
-        </p:txBody>
-      </p:sp>
-      <p:sp>
-        <p:nvSpPr>
-          <p:cNvPr id="15" name="Freeform 14"/>
-          <p:cNvSpPr/>
-          <p:nvPr/>
-        </p:nvSpPr>
-        <p:spPr>
-          <a:xfrm rot="5400000">
-            <a:off x="4103832" y="5050756"/>
-            <a:ext cx="1080568" cy="0"/>
-          </a:xfrm>
-          <a:custGeom>
-            <a:avLst/>
-            <a:gdLst/>
-            <a:ahLst/>
-            <a:cxnLst/>
-            <a:rect l="0" t="0" r="0" b="0"/>
-            <a:pathLst>
-              <a:path>
-                <a:moveTo>
-                  <a:pt x="0" y="0"/>
-                </a:moveTo>
-                <a:lnTo>
-                  <a:pt x="1080568" y="0"/>
-                </a:lnTo>
-              </a:path>
-            </a:pathLst>
-          </a:custGeom>
-          <a:noFill/>
-          <a:ln w="28575">
+              </a:endParaRPr>
+            </a:p>
+          </p:txBody>
+        </p:sp>
+        <p:sp>
+          <p:nvSpPr>
+            <p:cNvPr id="15" name="Freeform 14"/>
+            <p:cNvSpPr/>
+            <p:nvPr/>
+          </p:nvSpPr>
+          <p:spPr>
+            <a:xfrm rot="5400000">
+              <a:off x="4103832" y="5050756"/>
+              <a:ext cx="1080568" cy="0"/>
+            </a:xfrm>
+            <a:custGeom>
+              <a:avLst/>
+              <a:gdLst/>
+              <a:ahLst/>
+              <a:cxnLst/>
+              <a:rect l="0" t="0" r="0" b="0"/>
+              <a:pathLst>
+                <a:path>
+                  <a:moveTo>
+                    <a:pt x="0" y="0"/>
+                  </a:moveTo>
+                  <a:lnTo>
+                    <a:pt x="1080568" y="0"/>
+                  </a:lnTo>
+                </a:path>
+              </a:pathLst>
+            </a:custGeom>
+            <a:noFill/>
+            <a:ln w="28575">
+              <a:solidFill>
+                <a:srgbClr val="FFC000"/>
+              </a:solidFill>
+              <a:prstDash val="dash"/>
+              <a:headEnd type="none" w="med" len="med"/>
+              <a:tailEnd type="triangle" w="med" len="med"/>
+            </a:ln>
+          </p:spPr>
+          <p:style>
+            <a:lnRef idx="1">
+              <a:scrgbClr r="0" g="0" b="0"/>
+            </a:lnRef>
+            <a:fillRef idx="0">
+              <a:scrgbClr r="0" g="0" b="0"/>
+            </a:fillRef>
+            <a:effectRef idx="0">
+              <a:schemeClr val="accent3">
+                <a:tint val="90000"/>
+                <a:hueOff val="0"/>
+                <a:satOff val="0"/>
+                <a:lumOff val="0"/>
+                <a:alphaOff val="0"/>
+              </a:schemeClr>
+            </a:effectRef>
+            <a:fontRef idx="minor">
+              <a:schemeClr val="tx1">
+                <a:hueOff val="0"/>
+                <a:satOff val="0"/>
+                <a:lumOff val="0"/>
+                <a:alphaOff val="0"/>
+              </a:schemeClr>
+            </a:fontRef>
+          </p:style>
+        </p:sp>
+        <p:sp>
+          <p:nvSpPr>
+            <p:cNvPr id="16" name="Freeform 15"/>
+            <p:cNvSpPr/>
+            <p:nvPr/>
+          </p:nvSpPr>
+          <p:spPr>
+            <a:xfrm>
+              <a:off x="3996155" y="5591041"/>
+              <a:ext cx="1295924" cy="610941"/>
+            </a:xfrm>
+            <a:custGeom>
+              <a:avLst/>
+              <a:gdLst>
+                <a:gd name="connsiteX0" fmla="*/ 0 w 1295924"/>
+                <a:gd name="connsiteY0" fmla="*/ 101826 h 610941"/>
+                <a:gd name="connsiteX1" fmla="*/ 101826 w 1295924"/>
+                <a:gd name="connsiteY1" fmla="*/ 0 h 610941"/>
+                <a:gd name="connsiteX2" fmla="*/ 1194098 w 1295924"/>
+                <a:gd name="connsiteY2" fmla="*/ 0 h 610941"/>
+                <a:gd name="connsiteX3" fmla="*/ 1295924 w 1295924"/>
+                <a:gd name="connsiteY3" fmla="*/ 101826 h 610941"/>
+                <a:gd name="connsiteX4" fmla="*/ 1295924 w 1295924"/>
+                <a:gd name="connsiteY4" fmla="*/ 509115 h 610941"/>
+                <a:gd name="connsiteX5" fmla="*/ 1194098 w 1295924"/>
+                <a:gd name="connsiteY5" fmla="*/ 610941 h 610941"/>
+                <a:gd name="connsiteX6" fmla="*/ 101826 w 1295924"/>
+                <a:gd name="connsiteY6" fmla="*/ 610941 h 610941"/>
+                <a:gd name="connsiteX7" fmla="*/ 0 w 1295924"/>
+                <a:gd name="connsiteY7" fmla="*/ 509115 h 610941"/>
+                <a:gd name="connsiteX8" fmla="*/ 0 w 1295924"/>
+                <a:gd name="connsiteY8" fmla="*/ 101826 h 610941"/>
+              </a:gdLst>
+              <a:ahLst/>
+              <a:cxnLst>
+                <a:cxn ang="0">
+                  <a:pos x="connsiteX0" y="connsiteY0"/>
+                </a:cxn>
+                <a:cxn ang="0">
+                  <a:pos x="connsiteX1" y="connsiteY1"/>
+                </a:cxn>
+                <a:cxn ang="0">
+                  <a:pos x="connsiteX2" y="connsiteY2"/>
+                </a:cxn>
+                <a:cxn ang="0">
+                  <a:pos x="connsiteX3" y="connsiteY3"/>
+                </a:cxn>
+                <a:cxn ang="0">
+                  <a:pos x="connsiteX4" y="connsiteY4"/>
+                </a:cxn>
+                <a:cxn ang="0">
+                  <a:pos x="connsiteX5" y="connsiteY5"/>
+                </a:cxn>
+                <a:cxn ang="0">
+                  <a:pos x="connsiteX6" y="connsiteY6"/>
+                </a:cxn>
+                <a:cxn ang="0">
+                  <a:pos x="connsiteX7" y="connsiteY7"/>
+                </a:cxn>
+                <a:cxn ang="0">
+                  <a:pos x="connsiteX8" y="connsiteY8"/>
+                </a:cxn>
+              </a:cxnLst>
+              <a:rect l="l" t="t" r="r" b="b"/>
+              <a:pathLst>
+                <a:path w="1295924" h="610941">
+                  <a:moveTo>
+                    <a:pt x="0" y="101826"/>
+                  </a:moveTo>
+                  <a:cubicBezTo>
+                    <a:pt x="0" y="45589"/>
+                    <a:pt x="45589" y="0"/>
+                    <a:pt x="101826" y="0"/>
+                  </a:cubicBezTo>
+                  <a:lnTo>
+                    <a:pt x="1194098" y="0"/>
+                  </a:lnTo>
+                  <a:cubicBezTo>
+                    <a:pt x="1250335" y="0"/>
+                    <a:pt x="1295924" y="45589"/>
+                    <a:pt x="1295924" y="101826"/>
+                  </a:cubicBezTo>
+                  <a:lnTo>
+                    <a:pt x="1295924" y="509115"/>
+                  </a:lnTo>
+                  <a:cubicBezTo>
+                    <a:pt x="1295924" y="565352"/>
+                    <a:pt x="1250335" y="610941"/>
+                    <a:pt x="1194098" y="610941"/>
+                  </a:cubicBezTo>
+                  <a:lnTo>
+                    <a:pt x="101826" y="610941"/>
+                  </a:lnTo>
+                  <a:cubicBezTo>
+                    <a:pt x="45589" y="610941"/>
+                    <a:pt x="0" y="565352"/>
+                    <a:pt x="0" y="509115"/>
+                  </a:cubicBezTo>
+                  <a:lnTo>
+                    <a:pt x="0" y="101826"/>
+                  </a:lnTo>
+                  <a:close/>
+                </a:path>
+              </a:pathLst>
+            </a:custGeom>
             <a:solidFill>
-              <a:srgbClr val="FFC000"/>
+              <a:schemeClr val="tx2">
+                <a:lumMod val="75000"/>
+              </a:schemeClr>
             </a:solidFill>
-            <a:prstDash val="dash"/>
-            <a:headEnd type="none" w="med" len="med"/>
-            <a:tailEnd type="triangle" w="med" len="med"/>
-          </a:ln>
-        </p:spPr>
-        <p:style>
-          <a:lnRef idx="1">
-            <a:scrgbClr r="0" g="0" b="0"/>
-          </a:lnRef>
-          <a:fillRef idx="0">
-            <a:scrgbClr r="0" g="0" b="0"/>
-          </a:fillRef>
-          <a:effectRef idx="0">
-            <a:schemeClr val="accent3">
-              <a:tint val="90000"/>
-              <a:hueOff val="0"/>
-              <a:satOff val="0"/>
-              <a:lumOff val="0"/>
-              <a:alphaOff val="0"/>
-            </a:schemeClr>
-          </a:effectRef>
-          <a:fontRef idx="minor">
-            <a:schemeClr val="tx1">
-              <a:hueOff val="0"/>
-              <a:satOff val="0"/>
-              <a:lumOff val="0"/>
-              <a:alphaOff val="0"/>
-            </a:schemeClr>
-          </a:fontRef>
-        </p:style>
-      </p:sp>
-      <p:sp>
-        <p:nvSpPr>
-          <p:cNvPr id="16" name="Freeform 15"/>
-          <p:cNvSpPr/>
-          <p:nvPr/>
-        </p:nvSpPr>
-        <p:spPr>
-          <a:xfrm>
-            <a:off x="3996155" y="5591041"/>
-            <a:ext cx="1295924" cy="610941"/>
-          </a:xfrm>
-          <a:custGeom>
-            <a:avLst/>
-            <a:gdLst>
-              <a:gd name="connsiteX0" fmla="*/ 0 w 1295924"/>
-              <a:gd name="connsiteY0" fmla="*/ 101826 h 610941"/>
-              <a:gd name="connsiteX1" fmla="*/ 101826 w 1295924"/>
-              <a:gd name="connsiteY1" fmla="*/ 0 h 610941"/>
-              <a:gd name="connsiteX2" fmla="*/ 1194098 w 1295924"/>
-              <a:gd name="connsiteY2" fmla="*/ 0 h 610941"/>
-              <a:gd name="connsiteX3" fmla="*/ 1295924 w 1295924"/>
-              <a:gd name="connsiteY3" fmla="*/ 101826 h 610941"/>
-              <a:gd name="connsiteX4" fmla="*/ 1295924 w 1295924"/>
-              <a:gd name="connsiteY4" fmla="*/ 509115 h 610941"/>
-              <a:gd name="connsiteX5" fmla="*/ 1194098 w 1295924"/>
-              <a:gd name="connsiteY5" fmla="*/ 610941 h 610941"/>
-              <a:gd name="connsiteX6" fmla="*/ 101826 w 1295924"/>
-              <a:gd name="connsiteY6" fmla="*/ 610941 h 610941"/>
-              <a:gd name="connsiteX7" fmla="*/ 0 w 1295924"/>
-              <a:gd name="connsiteY7" fmla="*/ 509115 h 610941"/>
-              <a:gd name="connsiteX8" fmla="*/ 0 w 1295924"/>
-              <a:gd name="connsiteY8" fmla="*/ 101826 h 610941"/>
-            </a:gdLst>
-            <a:ahLst/>
-            <a:cxnLst>
-              <a:cxn ang="0">
-                <a:pos x="connsiteX0" y="connsiteY0"/>
-              </a:cxn>
-              <a:cxn ang="0">
-                <a:pos x="connsiteX1" y="connsiteY1"/>
-              </a:cxn>
-              <a:cxn ang="0">
-                <a:pos x="connsiteX2" y="connsiteY2"/>
-              </a:cxn>
-              <a:cxn ang="0">
-                <a:pos x="connsiteX3" y="connsiteY3"/>
-              </a:cxn>
-              <a:cxn ang="0">
-                <a:pos x="connsiteX4" y="connsiteY4"/>
-              </a:cxn>
-              <a:cxn ang="0">
-                <a:pos x="connsiteX5" y="connsiteY5"/>
-              </a:cxn>
-              <a:cxn ang="0">
-                <a:pos x="connsiteX6" y="connsiteY6"/>
-              </a:cxn>
-              <a:cxn ang="0">
-                <a:pos x="connsiteX7" y="connsiteY7"/>
-              </a:cxn>
-              <a:cxn ang="0">
-                <a:pos x="connsiteX8" y="connsiteY8"/>
-              </a:cxn>
-            </a:cxnLst>
-            <a:rect l="l" t="t" r="r" b="b"/>
-            <a:pathLst>
-              <a:path w="1295924" h="610941">
-                <a:moveTo>
-                  <a:pt x="0" y="101826"/>
-                </a:moveTo>
-                <a:cubicBezTo>
-                  <a:pt x="0" y="45589"/>
-                  <a:pt x="45589" y="0"/>
-                  <a:pt x="101826" y="0"/>
-                </a:cubicBezTo>
-                <a:lnTo>
-                  <a:pt x="1194098" y="0"/>
-                </a:lnTo>
-                <a:cubicBezTo>
-                  <a:pt x="1250335" y="0"/>
-                  <a:pt x="1295924" y="45589"/>
-                  <a:pt x="1295924" y="101826"/>
-                </a:cubicBezTo>
-                <a:lnTo>
-                  <a:pt x="1295924" y="509115"/>
-                </a:lnTo>
-                <a:cubicBezTo>
-                  <a:pt x="1295924" y="565352"/>
-                  <a:pt x="1250335" y="610941"/>
-                  <a:pt x="1194098" y="610941"/>
-                </a:cubicBezTo>
-                <a:lnTo>
-                  <a:pt x="101826" y="610941"/>
-                </a:lnTo>
-                <a:cubicBezTo>
-                  <a:pt x="45589" y="610941"/>
-                  <a:pt x="0" y="565352"/>
-                  <a:pt x="0" y="509115"/>
-                </a:cubicBezTo>
-                <a:lnTo>
-                  <a:pt x="0" y="101826"/>
-                </a:lnTo>
-                <a:close/>
-              </a:path>
-            </a:pathLst>
-          </a:custGeom>
-          <a:solidFill>
-            <a:schemeClr val="tx2">
-              <a:lumMod val="75000"/>
-            </a:schemeClr>
-          </a:solidFill>
-        </p:spPr>
-        <p:style>
-          <a:lnRef idx="0">
-            <a:schemeClr val="lt1">
-              <a:hueOff val="0"/>
-              <a:satOff val="0"/>
-              <a:lumOff val="0"/>
-              <a:alphaOff val="0"/>
-            </a:schemeClr>
-          </a:lnRef>
-          <a:fillRef idx="3">
-            <a:scrgbClr r="0" g="0" b="0"/>
-          </a:fillRef>
-          <a:effectRef idx="2">
-            <a:schemeClr val="accent5">
-              <a:hueOff val="0"/>
-              <a:satOff val="0"/>
-              <a:lumOff val="0"/>
-              <a:alphaOff val="0"/>
-            </a:schemeClr>
-          </a:effectRef>
-          <a:fontRef idx="minor">
-            <a:schemeClr val="lt1"/>
-          </a:fontRef>
-        </p:style>
-        <p:txBody>
-          <a:bodyPr spcFirstLastPara="0" vert="horz" wrap="square" lIns="60304" tIns="60304" rIns="60304" bIns="60304" numCol="1" spcCol="1270" anchor="ctr" anchorCtr="0">
-            <a:noAutofit/>
-          </a:bodyPr>
-          <a:lstStyle/>
-          <a:p>
-            <a:pPr lvl="0" algn="ctr" defTabSz="533400" rtl="1">
-              <a:lnSpc>
-                <a:spcPct val="90000"/>
-              </a:lnSpc>
-              <a:spcBef>
-                <a:spcPct val="0"/>
-              </a:spcBef>
-              <a:spcAft>
-                <a:spcPct val="35000"/>
-              </a:spcAft>
-            </a:pPr>
-            <a:r>
-              <a:rPr lang="en-US" sz="1200" b="1" kern="1200" dirty="0">
+          </p:spPr>
+          <p:style>
+            <a:lnRef idx="0">
+              <a:schemeClr val="lt1">
+                <a:hueOff val="0"/>
+                <a:satOff val="0"/>
+                <a:lumOff val="0"/>
+                <a:alphaOff val="0"/>
+              </a:schemeClr>
+            </a:lnRef>
+            <a:fillRef idx="3">
+              <a:scrgbClr r="0" g="0" b="0"/>
+            </a:fillRef>
+            <a:effectRef idx="2">
+              <a:schemeClr val="accent5">
+                <a:hueOff val="0"/>
+                <a:satOff val="0"/>
+                <a:lumOff val="0"/>
+                <a:alphaOff val="0"/>
+              </a:schemeClr>
+            </a:effectRef>
+            <a:fontRef idx="minor">
+              <a:schemeClr val="lt1"/>
+            </a:fontRef>
+          </p:style>
+          <p:txBody>
+            <a:bodyPr spcFirstLastPara="0" vert="horz" wrap="square" lIns="60304" tIns="60304" rIns="60304" bIns="60304" numCol="1" spcCol="1270" anchor="ctr" anchorCtr="0">
+              <a:noAutofit/>
+            </a:bodyPr>
+            <a:lstStyle/>
+            <a:p>
+              <a:pPr lvl="0" algn="ctr" defTabSz="533400" rtl="1">
+                <a:lnSpc>
+                  <a:spcPct val="90000"/>
+                </a:lnSpc>
+                <a:spcBef>
+                  <a:spcPct val="0"/>
+                </a:spcBef>
+                <a:spcAft>
+                  <a:spcPct val="35000"/>
+                </a:spcAft>
+              </a:pPr>
+              <a:r>
+                <a:rPr lang="en-US" sz="1200" b="1" kern="1200" dirty="0">
+                  <a:effectLst>
+                    <a:outerShdw blurRad="38100" dist="38100" dir="2700000" algn="tl">
+                      <a:srgbClr val="000000">
+                        <a:alpha val="43137"/>
+                      </a:srgbClr>
+                    </a:outerShdw>
+                  </a:effectLst>
+                </a:rPr>
+                <a:t>Subscriber 3</a:t>
+              </a:r>
+              <a:endParaRPr lang="he-IL" sz="1200" b="1" kern="1200" dirty="0">
                 <a:effectLst>
                   <a:outerShdw blurRad="38100" dist="38100" dir="2700000" algn="tl">
                     <a:srgbClr val="000000">
@@ -5044,236 +5291,236 @@
                     </a:srgbClr>
                   </a:outerShdw>
                 </a:effectLst>
-              </a:rPr>
-              <a:t>Subscriber 3</a:t>
-            </a:r>
-            <a:endParaRPr lang="he-IL" sz="1200" b="1" kern="1200" dirty="0">
-              <a:effectLst>
-                <a:outerShdw blurRad="38100" dist="38100" dir="2700000" algn="tl">
-                  <a:srgbClr val="000000">
-                    <a:alpha val="43137"/>
-                  </a:srgbClr>
-                </a:outerShdw>
-              </a:effectLst>
-            </a:endParaRPr>
-          </a:p>
-        </p:txBody>
-      </p:sp>
-      <p:sp>
-        <p:nvSpPr>
-          <p:cNvPr id="17" name="Freeform 16"/>
-          <p:cNvSpPr/>
-          <p:nvPr/>
-        </p:nvSpPr>
-        <p:spPr>
-          <a:xfrm rot="10800000">
-            <a:off x="3238835" y="3825719"/>
-            <a:ext cx="613083" cy="0"/>
-          </a:xfrm>
-          <a:custGeom>
-            <a:avLst/>
-            <a:gdLst/>
-            <a:ahLst/>
-            <a:cxnLst/>
-            <a:rect l="0" t="0" r="0" b="0"/>
-            <a:pathLst>
-              <a:path>
-                <a:moveTo>
-                  <a:pt x="0" y="0"/>
-                </a:moveTo>
-                <a:lnTo>
-                  <a:pt x="613083" y="0"/>
-                </a:lnTo>
-              </a:path>
-            </a:pathLst>
-          </a:custGeom>
-          <a:noFill/>
-          <a:ln w="28575">
+              </a:endParaRPr>
+            </a:p>
+          </p:txBody>
+        </p:sp>
+        <p:sp>
+          <p:nvSpPr>
+            <p:cNvPr id="17" name="Freeform 16"/>
+            <p:cNvSpPr/>
+            <p:nvPr/>
+          </p:nvSpPr>
+          <p:spPr>
+            <a:xfrm rot="10800000">
+              <a:off x="3238835" y="3825719"/>
+              <a:ext cx="613083" cy="0"/>
+            </a:xfrm>
+            <a:custGeom>
+              <a:avLst/>
+              <a:gdLst/>
+              <a:ahLst/>
+              <a:cxnLst/>
+              <a:rect l="0" t="0" r="0" b="0"/>
+              <a:pathLst>
+                <a:path>
+                  <a:moveTo>
+                    <a:pt x="0" y="0"/>
+                  </a:moveTo>
+                  <a:lnTo>
+                    <a:pt x="613083" y="0"/>
+                  </a:lnTo>
+                </a:path>
+              </a:pathLst>
+            </a:custGeom>
+            <a:noFill/>
+            <a:ln w="28575">
+              <a:solidFill>
+                <a:srgbClr val="FFC000"/>
+              </a:solidFill>
+              <a:headEnd type="none" w="med" len="med"/>
+              <a:tailEnd type="triangle" w="med" len="med"/>
+            </a:ln>
+          </p:spPr>
+          <p:style>
+            <a:lnRef idx="1">
+              <a:scrgbClr r="0" g="0" b="0"/>
+            </a:lnRef>
+            <a:fillRef idx="0">
+              <a:scrgbClr r="0" g="0" b="0"/>
+            </a:fillRef>
+            <a:effectRef idx="0">
+              <a:schemeClr val="accent3">
+                <a:tint val="90000"/>
+                <a:hueOff val="0"/>
+                <a:satOff val="0"/>
+                <a:lumOff val="0"/>
+                <a:alphaOff val="0"/>
+              </a:schemeClr>
+            </a:effectRef>
+            <a:fontRef idx="minor">
+              <a:schemeClr val="tx1">
+                <a:hueOff val="0"/>
+                <a:satOff val="0"/>
+                <a:lumOff val="0"/>
+                <a:alphaOff val="0"/>
+              </a:schemeClr>
+            </a:fontRef>
+          </p:style>
+        </p:sp>
+        <p:sp>
+          <p:nvSpPr>
+            <p:cNvPr id="18" name="Freeform 17"/>
+            <p:cNvSpPr/>
+            <p:nvPr/>
+          </p:nvSpPr>
+          <p:spPr>
+            <a:xfrm>
+              <a:off x="1907813" y="3501459"/>
+              <a:ext cx="1331021" cy="648519"/>
+            </a:xfrm>
+            <a:custGeom>
+              <a:avLst/>
+              <a:gdLst>
+                <a:gd name="connsiteX0" fmla="*/ 0 w 1331021"/>
+                <a:gd name="connsiteY0" fmla="*/ 108089 h 648519"/>
+                <a:gd name="connsiteX1" fmla="*/ 108089 w 1331021"/>
+                <a:gd name="connsiteY1" fmla="*/ 0 h 648519"/>
+                <a:gd name="connsiteX2" fmla="*/ 1222932 w 1331021"/>
+                <a:gd name="connsiteY2" fmla="*/ 0 h 648519"/>
+                <a:gd name="connsiteX3" fmla="*/ 1331021 w 1331021"/>
+                <a:gd name="connsiteY3" fmla="*/ 108089 h 648519"/>
+                <a:gd name="connsiteX4" fmla="*/ 1331021 w 1331021"/>
+                <a:gd name="connsiteY4" fmla="*/ 540430 h 648519"/>
+                <a:gd name="connsiteX5" fmla="*/ 1222932 w 1331021"/>
+                <a:gd name="connsiteY5" fmla="*/ 648519 h 648519"/>
+                <a:gd name="connsiteX6" fmla="*/ 108089 w 1331021"/>
+                <a:gd name="connsiteY6" fmla="*/ 648519 h 648519"/>
+                <a:gd name="connsiteX7" fmla="*/ 0 w 1331021"/>
+                <a:gd name="connsiteY7" fmla="*/ 540430 h 648519"/>
+                <a:gd name="connsiteX8" fmla="*/ 0 w 1331021"/>
+                <a:gd name="connsiteY8" fmla="*/ 108089 h 648519"/>
+              </a:gdLst>
+              <a:ahLst/>
+              <a:cxnLst>
+                <a:cxn ang="0">
+                  <a:pos x="connsiteX0" y="connsiteY0"/>
+                </a:cxn>
+                <a:cxn ang="0">
+                  <a:pos x="connsiteX1" y="connsiteY1"/>
+                </a:cxn>
+                <a:cxn ang="0">
+                  <a:pos x="connsiteX2" y="connsiteY2"/>
+                </a:cxn>
+                <a:cxn ang="0">
+                  <a:pos x="connsiteX3" y="connsiteY3"/>
+                </a:cxn>
+                <a:cxn ang="0">
+                  <a:pos x="connsiteX4" y="connsiteY4"/>
+                </a:cxn>
+                <a:cxn ang="0">
+                  <a:pos x="connsiteX5" y="connsiteY5"/>
+                </a:cxn>
+                <a:cxn ang="0">
+                  <a:pos x="connsiteX6" y="connsiteY6"/>
+                </a:cxn>
+                <a:cxn ang="0">
+                  <a:pos x="connsiteX7" y="connsiteY7"/>
+                </a:cxn>
+                <a:cxn ang="0">
+                  <a:pos x="connsiteX8" y="connsiteY8"/>
+                </a:cxn>
+              </a:cxnLst>
+              <a:rect l="l" t="t" r="r" b="b"/>
+              <a:pathLst>
+                <a:path w="1331021" h="648519">
+                  <a:moveTo>
+                    <a:pt x="0" y="108089"/>
+                  </a:moveTo>
+                  <a:cubicBezTo>
+                    <a:pt x="0" y="48393"/>
+                    <a:pt x="48393" y="0"/>
+                    <a:pt x="108089" y="0"/>
+                  </a:cubicBezTo>
+                  <a:lnTo>
+                    <a:pt x="1222932" y="0"/>
+                  </a:lnTo>
+                  <a:cubicBezTo>
+                    <a:pt x="1282628" y="0"/>
+                    <a:pt x="1331021" y="48393"/>
+                    <a:pt x="1331021" y="108089"/>
+                  </a:cubicBezTo>
+                  <a:lnTo>
+                    <a:pt x="1331021" y="540430"/>
+                  </a:lnTo>
+                  <a:cubicBezTo>
+                    <a:pt x="1331021" y="600126"/>
+                    <a:pt x="1282628" y="648519"/>
+                    <a:pt x="1222932" y="648519"/>
+                  </a:cubicBezTo>
+                  <a:lnTo>
+                    <a:pt x="108089" y="648519"/>
+                  </a:lnTo>
+                  <a:cubicBezTo>
+                    <a:pt x="48393" y="648519"/>
+                    <a:pt x="0" y="600126"/>
+                    <a:pt x="0" y="540430"/>
+                  </a:cubicBezTo>
+                  <a:lnTo>
+                    <a:pt x="0" y="108089"/>
+                  </a:lnTo>
+                  <a:close/>
+                </a:path>
+              </a:pathLst>
+            </a:custGeom>
             <a:solidFill>
-              <a:srgbClr val="FFC000"/>
+              <a:srgbClr val="00B0F0"/>
             </a:solidFill>
-            <a:headEnd type="none" w="med" len="med"/>
-            <a:tailEnd type="triangle" w="med" len="med"/>
-          </a:ln>
-        </p:spPr>
-        <p:style>
-          <a:lnRef idx="1">
-            <a:scrgbClr r="0" g="0" b="0"/>
-          </a:lnRef>
-          <a:fillRef idx="0">
-            <a:scrgbClr r="0" g="0" b="0"/>
-          </a:fillRef>
-          <a:effectRef idx="0">
-            <a:schemeClr val="accent3">
-              <a:tint val="90000"/>
-              <a:hueOff val="0"/>
-              <a:satOff val="0"/>
-              <a:lumOff val="0"/>
-              <a:alphaOff val="0"/>
-            </a:schemeClr>
-          </a:effectRef>
-          <a:fontRef idx="minor">
-            <a:schemeClr val="tx1">
-              <a:hueOff val="0"/>
-              <a:satOff val="0"/>
-              <a:lumOff val="0"/>
-              <a:alphaOff val="0"/>
-            </a:schemeClr>
-          </a:fontRef>
-        </p:style>
-      </p:sp>
-      <p:sp>
-        <p:nvSpPr>
-          <p:cNvPr id="18" name="Freeform 17"/>
-          <p:cNvSpPr/>
-          <p:nvPr/>
-        </p:nvSpPr>
-        <p:spPr>
-          <a:xfrm>
-            <a:off x="1907813" y="3501459"/>
-            <a:ext cx="1331021" cy="648519"/>
-          </a:xfrm>
-          <a:custGeom>
-            <a:avLst/>
-            <a:gdLst>
-              <a:gd name="connsiteX0" fmla="*/ 0 w 1331021"/>
-              <a:gd name="connsiteY0" fmla="*/ 108089 h 648519"/>
-              <a:gd name="connsiteX1" fmla="*/ 108089 w 1331021"/>
-              <a:gd name="connsiteY1" fmla="*/ 0 h 648519"/>
-              <a:gd name="connsiteX2" fmla="*/ 1222932 w 1331021"/>
-              <a:gd name="connsiteY2" fmla="*/ 0 h 648519"/>
-              <a:gd name="connsiteX3" fmla="*/ 1331021 w 1331021"/>
-              <a:gd name="connsiteY3" fmla="*/ 108089 h 648519"/>
-              <a:gd name="connsiteX4" fmla="*/ 1331021 w 1331021"/>
-              <a:gd name="connsiteY4" fmla="*/ 540430 h 648519"/>
-              <a:gd name="connsiteX5" fmla="*/ 1222932 w 1331021"/>
-              <a:gd name="connsiteY5" fmla="*/ 648519 h 648519"/>
-              <a:gd name="connsiteX6" fmla="*/ 108089 w 1331021"/>
-              <a:gd name="connsiteY6" fmla="*/ 648519 h 648519"/>
-              <a:gd name="connsiteX7" fmla="*/ 0 w 1331021"/>
-              <a:gd name="connsiteY7" fmla="*/ 540430 h 648519"/>
-              <a:gd name="connsiteX8" fmla="*/ 0 w 1331021"/>
-              <a:gd name="connsiteY8" fmla="*/ 108089 h 648519"/>
-            </a:gdLst>
-            <a:ahLst/>
-            <a:cxnLst>
-              <a:cxn ang="0">
-                <a:pos x="connsiteX0" y="connsiteY0"/>
-              </a:cxn>
-              <a:cxn ang="0">
-                <a:pos x="connsiteX1" y="connsiteY1"/>
-              </a:cxn>
-              <a:cxn ang="0">
-                <a:pos x="connsiteX2" y="connsiteY2"/>
-              </a:cxn>
-              <a:cxn ang="0">
-                <a:pos x="connsiteX3" y="connsiteY3"/>
-              </a:cxn>
-              <a:cxn ang="0">
-                <a:pos x="connsiteX4" y="connsiteY4"/>
-              </a:cxn>
-              <a:cxn ang="0">
-                <a:pos x="connsiteX5" y="connsiteY5"/>
-              </a:cxn>
-              <a:cxn ang="0">
-                <a:pos x="connsiteX6" y="connsiteY6"/>
-              </a:cxn>
-              <a:cxn ang="0">
-                <a:pos x="connsiteX7" y="connsiteY7"/>
-              </a:cxn>
-              <a:cxn ang="0">
-                <a:pos x="connsiteX8" y="connsiteY8"/>
-              </a:cxn>
-            </a:cxnLst>
-            <a:rect l="l" t="t" r="r" b="b"/>
-            <a:pathLst>
-              <a:path w="1331021" h="648519">
-                <a:moveTo>
-                  <a:pt x="0" y="108089"/>
-                </a:moveTo>
-                <a:cubicBezTo>
-                  <a:pt x="0" y="48393"/>
-                  <a:pt x="48393" y="0"/>
-                  <a:pt x="108089" y="0"/>
-                </a:cubicBezTo>
-                <a:lnTo>
-                  <a:pt x="1222932" y="0"/>
-                </a:lnTo>
-                <a:cubicBezTo>
-                  <a:pt x="1282628" y="0"/>
-                  <a:pt x="1331021" y="48393"/>
-                  <a:pt x="1331021" y="108089"/>
-                </a:cubicBezTo>
-                <a:lnTo>
-                  <a:pt x="1331021" y="540430"/>
-                </a:lnTo>
-                <a:cubicBezTo>
-                  <a:pt x="1331021" y="600126"/>
-                  <a:pt x="1282628" y="648519"/>
-                  <a:pt x="1222932" y="648519"/>
-                </a:cubicBezTo>
-                <a:lnTo>
-                  <a:pt x="108089" y="648519"/>
-                </a:lnTo>
-                <a:cubicBezTo>
-                  <a:pt x="48393" y="648519"/>
-                  <a:pt x="0" y="600126"/>
-                  <a:pt x="0" y="540430"/>
-                </a:cubicBezTo>
-                <a:lnTo>
-                  <a:pt x="0" y="108089"/>
-                </a:lnTo>
-                <a:close/>
-              </a:path>
-            </a:pathLst>
-          </a:custGeom>
-          <a:solidFill>
-            <a:srgbClr val="00B0F0"/>
-          </a:solidFill>
-        </p:spPr>
-        <p:style>
-          <a:lnRef idx="0">
-            <a:schemeClr val="lt1">
-              <a:hueOff val="0"/>
-              <a:satOff val="0"/>
-              <a:lumOff val="0"/>
-              <a:alphaOff val="0"/>
-            </a:schemeClr>
-          </a:lnRef>
-          <a:fillRef idx="3">
-            <a:scrgbClr r="0" g="0" b="0"/>
-          </a:fillRef>
-          <a:effectRef idx="2">
-            <a:schemeClr val="accent6">
-              <a:hueOff val="0"/>
-              <a:satOff val="0"/>
-              <a:lumOff val="0"/>
-              <a:alphaOff val="0"/>
-            </a:schemeClr>
-          </a:effectRef>
-          <a:fontRef idx="minor">
-            <a:schemeClr val="lt1"/>
-          </a:fontRef>
-        </p:style>
-        <p:txBody>
-          <a:bodyPr spcFirstLastPara="0" vert="horz" wrap="square" lIns="62138" tIns="62138" rIns="62138" bIns="62138" numCol="1" spcCol="1270" anchor="ctr" anchorCtr="0">
-            <a:noAutofit/>
-          </a:bodyPr>
-          <a:lstStyle/>
-          <a:p>
-            <a:pPr lvl="0" algn="ctr" defTabSz="533400" rtl="1">
-              <a:lnSpc>
-                <a:spcPct val="90000"/>
-              </a:lnSpc>
-              <a:spcBef>
-                <a:spcPct val="0"/>
-              </a:spcBef>
-              <a:spcAft>
-                <a:spcPct val="35000"/>
-              </a:spcAft>
-            </a:pPr>
-            <a:r>
-              <a:rPr lang="en-US" sz="1200" b="1" kern="1200" dirty="0">
+          </p:spPr>
+          <p:style>
+            <a:lnRef idx="0">
+              <a:schemeClr val="lt1">
+                <a:hueOff val="0"/>
+                <a:satOff val="0"/>
+                <a:lumOff val="0"/>
+                <a:alphaOff val="0"/>
+              </a:schemeClr>
+            </a:lnRef>
+            <a:fillRef idx="3">
+              <a:scrgbClr r="0" g="0" b="0"/>
+            </a:fillRef>
+            <a:effectRef idx="2">
+              <a:schemeClr val="accent6">
+                <a:hueOff val="0"/>
+                <a:satOff val="0"/>
+                <a:lumOff val="0"/>
+                <a:alphaOff val="0"/>
+              </a:schemeClr>
+            </a:effectRef>
+            <a:fontRef idx="minor">
+              <a:schemeClr val="lt1"/>
+            </a:fontRef>
+          </p:style>
+          <p:txBody>
+            <a:bodyPr spcFirstLastPara="0" vert="horz" wrap="square" lIns="62138" tIns="62138" rIns="62138" bIns="62138" numCol="1" spcCol="1270" anchor="ctr" anchorCtr="0">
+              <a:noAutofit/>
+            </a:bodyPr>
+            <a:lstStyle/>
+            <a:p>
+              <a:pPr lvl="0" algn="ctr" defTabSz="533400" rtl="1">
+                <a:lnSpc>
+                  <a:spcPct val="90000"/>
+                </a:lnSpc>
+                <a:spcBef>
+                  <a:spcPct val="0"/>
+                </a:spcBef>
+                <a:spcAft>
+                  <a:spcPct val="35000"/>
+                </a:spcAft>
+              </a:pPr>
+              <a:r>
+                <a:rPr lang="en-US" sz="1200" b="1" kern="1200" dirty="0">
+                  <a:effectLst>
+                    <a:outerShdw blurRad="38100" dist="38100" dir="2700000" algn="tl">
+                      <a:srgbClr val="000000">
+                        <a:alpha val="43137"/>
+                      </a:srgbClr>
+                    </a:outerShdw>
+                  </a:effectLst>
+                </a:rPr>
+                <a:t>Subscriber 2</a:t>
+              </a:r>
+              <a:endParaRPr lang="he-IL" sz="1200" b="1" kern="1200" dirty="0">
                 <a:effectLst>
                   <a:outerShdw blurRad="38100" dist="38100" dir="2700000" algn="tl">
                     <a:srgbClr val="000000">
@@ -5281,68 +5528,139 @@
                     </a:srgbClr>
                   </a:outerShdw>
                 </a:effectLst>
-              </a:rPr>
-              <a:t>Subscriber 2</a:t>
-            </a:r>
-            <a:endParaRPr lang="he-IL" sz="1200" b="1" kern="1200" dirty="0">
-              <a:effectLst>
-                <a:outerShdw blurRad="38100" dist="38100" dir="2700000" algn="tl">
-                  <a:srgbClr val="000000">
-                    <a:alpha val="43137"/>
-                  </a:srgbClr>
-                </a:outerShdw>
-              </a:effectLst>
-            </a:endParaRPr>
-          </a:p>
-        </p:txBody>
-      </p:sp>
-      <p:grpSp>
-        <p:nvGrpSpPr>
-          <p:cNvPr id="8" name="Group 7"/>
-          <p:cNvGrpSpPr/>
-          <p:nvPr/>
-        </p:nvGrpSpPr>
-        <p:grpSpPr>
-          <a:xfrm>
-            <a:off x="4436148" y="4725144"/>
-            <a:ext cx="412372" cy="456050"/>
-            <a:chOff x="755576" y="4149080"/>
-            <a:chExt cx="1008112" cy="1728192"/>
-          </a:xfrm>
-          <a:solidFill>
-            <a:schemeClr val="accent1">
-              <a:alpha val="80000"/>
-            </a:schemeClr>
-          </a:solidFill>
-        </p:grpSpPr>
+              </a:endParaRPr>
+            </a:p>
+          </p:txBody>
+        </p:sp>
+        <p:grpSp>
+          <p:nvGrpSpPr>
+            <p:cNvPr id="8" name="Group 7"/>
+            <p:cNvGrpSpPr/>
+            <p:nvPr/>
+          </p:nvGrpSpPr>
+          <p:grpSpPr>
+            <a:xfrm>
+              <a:off x="4436148" y="4725144"/>
+              <a:ext cx="412372" cy="456050"/>
+              <a:chOff x="755576" y="4149080"/>
+              <a:chExt cx="1008112" cy="1728192"/>
+            </a:xfrm>
+            <a:solidFill>
+              <a:schemeClr val="accent1">
+                <a:alpha val="80000"/>
+              </a:schemeClr>
+            </a:solidFill>
+          </p:grpSpPr>
+          <p:sp>
+            <p:nvSpPr>
+              <p:cNvPr id="6" name="Flowchart: Manual Operation 5"/>
+              <p:cNvSpPr/>
+              <p:nvPr/>
+            </p:nvSpPr>
+            <p:spPr>
+              <a:xfrm>
+                <a:off x="755576" y="4149080"/>
+                <a:ext cx="1008112" cy="1008112"/>
+              </a:xfrm>
+              <a:prstGeom prst="flowChartManualOperation">
+                <a:avLst/>
+              </a:prstGeom>
+              <a:grpFill/>
+            </p:spPr>
+            <p:style>
+              <a:lnRef idx="1">
+                <a:schemeClr val="accent6"/>
+              </a:lnRef>
+              <a:fillRef idx="3">
+                <a:schemeClr val="accent6"/>
+              </a:fillRef>
+              <a:effectRef idx="2">
+                <a:schemeClr val="accent6"/>
+              </a:effectRef>
+              <a:fontRef idx="minor">
+                <a:schemeClr val="lt1"/>
+              </a:fontRef>
+            </p:style>
+            <p:txBody>
+              <a:bodyPr rtlCol="1" anchor="ctr"/>
+              <a:lstStyle/>
+              <a:p>
+                <a:pPr algn="ctr"/>
+                <a:endParaRPr lang="he-IL"/>
+              </a:p>
+            </p:txBody>
+          </p:sp>
+          <p:sp>
+            <p:nvSpPr>
+              <p:cNvPr id="7" name="Rectangle 6"/>
+              <p:cNvSpPr/>
+              <p:nvPr/>
+            </p:nvSpPr>
+            <p:spPr>
+              <a:xfrm>
+                <a:off x="1076264" y="5157192"/>
+                <a:ext cx="360040" cy="720080"/>
+              </a:xfrm>
+              <a:prstGeom prst="rect">
+                <a:avLst/>
+              </a:prstGeom>
+              <a:grpFill/>
+            </p:spPr>
+            <p:style>
+              <a:lnRef idx="1">
+                <a:schemeClr val="accent6"/>
+              </a:lnRef>
+              <a:fillRef idx="3">
+                <a:schemeClr val="accent6"/>
+              </a:fillRef>
+              <a:effectRef idx="2">
+                <a:schemeClr val="accent6"/>
+              </a:effectRef>
+              <a:fontRef idx="minor">
+                <a:schemeClr val="lt1"/>
+              </a:fontRef>
+            </p:style>
+            <p:txBody>
+              <a:bodyPr rtlCol="1" anchor="ctr"/>
+              <a:lstStyle/>
+              <a:p>
+                <a:pPr algn="ctr"/>
+                <a:endParaRPr lang="he-IL"/>
+              </a:p>
+            </p:txBody>
+          </p:sp>
+        </p:grpSp>
         <p:sp>
           <p:nvSpPr>
-            <p:cNvPr id="6" name="Flowchart: Manual Operation 5"/>
+            <p:cNvPr id="19" name="Rounded Rectangular Callout 18"/>
             <p:cNvSpPr/>
             <p:nvPr/>
           </p:nvSpPr>
           <p:spPr>
             <a:xfrm>
-              <a:off x="755576" y="4149080"/>
-              <a:ext cx="1008112" cy="1008112"/>
+              <a:off x="5652120" y="5321446"/>
+              <a:ext cx="1656184" cy="575065"/>
             </a:xfrm>
-            <a:prstGeom prst="flowChartManualOperation">
-              <a:avLst/>
+            <a:prstGeom prst="wedgeRoundRectCallout">
+              <a:avLst>
+                <a:gd name="adj1" fmla="val -108087"/>
+                <a:gd name="adj2" fmla="val -130581"/>
+                <a:gd name="adj3" fmla="val 16667"/>
+              </a:avLst>
             </a:prstGeom>
-            <a:grpFill/>
           </p:spPr>
           <p:style>
             <a:lnRef idx="1">
-              <a:schemeClr val="accent6"/>
+              <a:schemeClr val="accent2"/>
             </a:lnRef>
-            <a:fillRef idx="3">
-              <a:schemeClr val="accent6"/>
+            <a:fillRef idx="2">
+              <a:schemeClr val="accent2"/>
             </a:fillRef>
-            <a:effectRef idx="2">
-              <a:schemeClr val="accent6"/>
+            <a:effectRef idx="1">
+              <a:schemeClr val="accent2"/>
             </a:effectRef>
             <a:fontRef idx="minor">
-              <a:schemeClr val="lt1"/>
+              <a:schemeClr val="dk1"/>
             </a:fontRef>
           </p:style>
           <p:txBody>
@@ -5350,90 +5668,19 @@
             <a:lstStyle/>
             <a:p>
               <a:pPr algn="ctr"/>
-              <a:endParaRPr lang="he-IL"/>
-            </a:p>
-          </p:txBody>
-        </p:sp>
-        <p:sp>
-          <p:nvSpPr>
-            <p:cNvPr id="7" name="Rectangle 6"/>
-            <p:cNvSpPr/>
-            <p:nvPr/>
-          </p:nvSpPr>
-          <p:spPr>
-            <a:xfrm>
-              <a:off x="1076264" y="5157192"/>
-              <a:ext cx="360040" cy="720080"/>
-            </a:xfrm>
-            <a:prstGeom prst="rect">
-              <a:avLst/>
-            </a:prstGeom>
-            <a:grpFill/>
-          </p:spPr>
-          <p:style>
-            <a:lnRef idx="1">
-              <a:schemeClr val="accent6"/>
-            </a:lnRef>
-            <a:fillRef idx="3">
-              <a:schemeClr val="accent6"/>
-            </a:fillRef>
-            <a:effectRef idx="2">
-              <a:schemeClr val="accent6"/>
-            </a:effectRef>
-            <a:fontRef idx="minor">
-              <a:schemeClr val="lt1"/>
-            </a:fontRef>
-          </p:style>
-          <p:txBody>
-            <a:bodyPr rtlCol="1" anchor="ctr"/>
-            <a:lstStyle/>
-            <a:p>
-              <a:pPr algn="ctr"/>
-              <a:endParaRPr lang="he-IL"/>
-            </a:p>
-          </p:txBody>
-        </p:sp>
-      </p:grpSp>
-      <p:sp>
-        <p:nvSpPr>
-          <p:cNvPr id="19" name="Rounded Rectangular Callout 18"/>
-          <p:cNvSpPr/>
-          <p:nvPr/>
-        </p:nvSpPr>
-        <p:spPr>
-          <a:xfrm>
-            <a:off x="5652120" y="5321446"/>
-            <a:ext cx="1656184" cy="575065"/>
-          </a:xfrm>
-          <a:prstGeom prst="wedgeRoundRectCallout">
-            <a:avLst>
-              <a:gd name="adj1" fmla="val -108087"/>
-              <a:gd name="adj2" fmla="val -130581"/>
-              <a:gd name="adj3" fmla="val 16667"/>
-            </a:avLst>
-          </a:prstGeom>
-        </p:spPr>
-        <p:style>
-          <a:lnRef idx="1">
-            <a:schemeClr val="accent2"/>
-          </a:lnRef>
-          <a:fillRef idx="2">
-            <a:schemeClr val="accent2"/>
-          </a:fillRef>
-          <a:effectRef idx="1">
-            <a:schemeClr val="accent2"/>
-          </a:effectRef>
-          <a:fontRef idx="minor">
-            <a:schemeClr val="dk1"/>
-          </a:fontRef>
-        </p:style>
-        <p:txBody>
-          <a:bodyPr rtlCol="1" anchor="ctr"/>
-          <a:lstStyle/>
-          <a:p>
-            <a:pPr algn="ctr"/>
-            <a:r>
-              <a:rPr lang="en-US" sz="1200" dirty="0">
+              <a:r>
+                <a:rPr lang="en-US" sz="1200" dirty="0">
+                  <a:effectLst>
+                    <a:outerShdw blurRad="38100" dist="38100" dir="2700000" algn="tl">
+                      <a:srgbClr val="000000">
+                        <a:alpha val="43137"/>
+                      </a:srgbClr>
+                    </a:outerShdw>
+                  </a:effectLst>
+                </a:rPr>
+                <a:t>Filtered Subscription</a:t>
+              </a:r>
+              <a:endParaRPr lang="he-IL" sz="1200" dirty="0">
                 <a:effectLst>
                   <a:outerShdw blurRad="38100" dist="38100" dir="2700000" algn="tl">
                     <a:srgbClr val="000000">
@@ -5441,261 +5688,11 @@
                     </a:srgbClr>
                   </a:outerShdw>
                 </a:effectLst>
-              </a:rPr>
-              <a:t>Filtered Subscription</a:t>
-            </a:r>
-            <a:endParaRPr lang="he-IL" sz="1200" dirty="0">
-              <a:effectLst>
-                <a:outerShdw blurRad="38100" dist="38100" dir="2700000" algn="tl">
-                  <a:srgbClr val="000000">
-                    <a:alpha val="43137"/>
-                  </a:srgbClr>
-                </a:outerShdw>
-              </a:effectLst>
-            </a:endParaRPr>
-          </a:p>
-        </p:txBody>
-      </p:sp>
-      <p:sp>
-        <p:nvSpPr>
-          <p:cNvPr id="21" name="Vertical Scroll 20"/>
-          <p:cNvSpPr/>
-          <p:nvPr/>
-        </p:nvSpPr>
-        <p:spPr>
-          <a:xfrm>
-            <a:off x="4316929" y="3609694"/>
-            <a:ext cx="648072" cy="432048"/>
-          </a:xfrm>
-          <a:prstGeom prst="verticalScroll">
-            <a:avLst/>
-          </a:prstGeom>
-        </p:spPr>
-        <p:style>
-          <a:lnRef idx="2">
-            <a:schemeClr val="accent6"/>
-          </a:lnRef>
-          <a:fillRef idx="1">
-            <a:schemeClr val="lt1"/>
-          </a:fillRef>
-          <a:effectRef idx="0">
-            <a:schemeClr val="accent6"/>
-          </a:effectRef>
-          <a:fontRef idx="minor">
-            <a:schemeClr val="dk1"/>
-          </a:fontRef>
-        </p:style>
-        <p:txBody>
-          <a:bodyPr rtlCol="1" anchor="ctr"/>
-          <a:lstStyle/>
-          <a:p>
-            <a:pPr algn="ctr"/>
-            <a:r>
-              <a:rPr lang="en-US" sz="1000" b="1" dirty="0">
-                <a:effectLst>
-                  <a:outerShdw blurRad="38100" dist="38100" dir="2700000" algn="tl">
-                    <a:srgbClr val="000000">
-                      <a:alpha val="43137"/>
-                    </a:srgbClr>
-                  </a:outerShdw>
-                </a:effectLst>
-                <a:latin typeface="Arial Black" pitchFamily="34" charset="0"/>
-              </a:rPr>
-              <a:t>MSG</a:t>
-            </a:r>
-            <a:endParaRPr lang="he-IL" sz="1000" b="1" dirty="0">
-              <a:effectLst>
-                <a:outerShdw blurRad="38100" dist="38100" dir="2700000" algn="tl">
-                  <a:srgbClr val="000000">
-                    <a:alpha val="43137"/>
-                  </a:srgbClr>
-                </a:outerShdw>
-              </a:effectLst>
-              <a:latin typeface="Arial Black" pitchFamily="34" charset="0"/>
-            </a:endParaRPr>
-          </a:p>
-        </p:txBody>
-      </p:sp>
-      <p:sp>
-        <p:nvSpPr>
-          <p:cNvPr id="23" name="Vertical Scroll 22"/>
-          <p:cNvSpPr/>
-          <p:nvPr/>
-        </p:nvSpPr>
-        <p:spPr>
-          <a:xfrm>
-            <a:off x="6390873" y="3613294"/>
-            <a:ext cx="648072" cy="432048"/>
-          </a:xfrm>
-          <a:prstGeom prst="verticalScroll">
-            <a:avLst/>
-          </a:prstGeom>
-        </p:spPr>
-        <p:style>
-          <a:lnRef idx="2">
-            <a:schemeClr val="accent6"/>
-          </a:lnRef>
-          <a:fillRef idx="1">
-            <a:schemeClr val="lt1"/>
-          </a:fillRef>
-          <a:effectRef idx="0">
-            <a:schemeClr val="accent6"/>
-          </a:effectRef>
-          <a:fontRef idx="minor">
-            <a:schemeClr val="dk1"/>
-          </a:fontRef>
-        </p:style>
-        <p:txBody>
-          <a:bodyPr rtlCol="1" anchor="ctr"/>
-          <a:lstStyle/>
-          <a:p>
-            <a:pPr algn="ctr"/>
-            <a:r>
-              <a:rPr lang="en-US" sz="1000" b="1" dirty="0">
-                <a:effectLst>
-                  <a:outerShdw blurRad="38100" dist="38100" dir="2700000" algn="tl">
-                    <a:srgbClr val="000000">
-                      <a:alpha val="43137"/>
-                    </a:srgbClr>
-                  </a:outerShdw>
-                </a:effectLst>
-                <a:latin typeface="Arial Black" pitchFamily="34" charset="0"/>
-              </a:rPr>
-              <a:t>MSG</a:t>
-            </a:r>
-            <a:endParaRPr lang="he-IL" sz="1000" b="1" dirty="0">
-              <a:effectLst>
-                <a:outerShdw blurRad="38100" dist="38100" dir="2700000" algn="tl">
-                  <a:srgbClr val="000000">
-                    <a:alpha val="43137"/>
-                  </a:srgbClr>
-                </a:outerShdw>
-              </a:effectLst>
-              <a:latin typeface="Arial Black" pitchFamily="34" charset="0"/>
-            </a:endParaRPr>
-          </a:p>
-        </p:txBody>
-      </p:sp>
-      <p:sp>
-        <p:nvSpPr>
-          <p:cNvPr id="24" name="Vertical Scroll 23"/>
-          <p:cNvSpPr/>
-          <p:nvPr/>
-        </p:nvSpPr>
-        <p:spPr>
-          <a:xfrm>
-            <a:off x="2249287" y="3609696"/>
-            <a:ext cx="648072" cy="432048"/>
-          </a:xfrm>
-          <a:prstGeom prst="verticalScroll">
-            <a:avLst/>
-          </a:prstGeom>
-        </p:spPr>
-        <p:style>
-          <a:lnRef idx="2">
-            <a:schemeClr val="accent6"/>
-          </a:lnRef>
-          <a:fillRef idx="1">
-            <a:schemeClr val="lt1"/>
-          </a:fillRef>
-          <a:effectRef idx="0">
-            <a:schemeClr val="accent6"/>
-          </a:effectRef>
-          <a:fontRef idx="minor">
-            <a:schemeClr val="dk1"/>
-          </a:fontRef>
-        </p:style>
-        <p:txBody>
-          <a:bodyPr rtlCol="1" anchor="ctr"/>
-          <a:lstStyle/>
-          <a:p>
-            <a:pPr algn="ctr"/>
-            <a:r>
-              <a:rPr lang="en-US" sz="1000" b="1" dirty="0">
-                <a:effectLst>
-                  <a:outerShdw blurRad="38100" dist="38100" dir="2700000" algn="tl">
-                    <a:srgbClr val="000000">
-                      <a:alpha val="43137"/>
-                    </a:srgbClr>
-                  </a:outerShdw>
-                </a:effectLst>
-                <a:latin typeface="Arial Black" pitchFamily="34" charset="0"/>
-              </a:rPr>
-              <a:t>MSG</a:t>
-            </a:r>
-            <a:endParaRPr lang="he-IL" sz="1000" b="1" dirty="0">
-              <a:effectLst>
-                <a:outerShdw blurRad="38100" dist="38100" dir="2700000" algn="tl">
-                  <a:srgbClr val="000000">
-                    <a:alpha val="43137"/>
-                  </a:srgbClr>
-                </a:outerShdw>
-              </a:effectLst>
-              <a:latin typeface="Arial Black" pitchFamily="34" charset="0"/>
-            </a:endParaRPr>
-          </a:p>
-        </p:txBody>
-      </p:sp>
-      <p:sp>
-        <p:nvSpPr>
-          <p:cNvPr id="25" name="Vertical Scroll 24"/>
-          <p:cNvSpPr/>
-          <p:nvPr/>
-        </p:nvSpPr>
-        <p:spPr>
-          <a:xfrm>
-            <a:off x="4324788" y="4365104"/>
-            <a:ext cx="648072" cy="432048"/>
-          </a:xfrm>
-          <a:prstGeom prst="verticalScroll">
-            <a:avLst/>
-          </a:prstGeom>
-        </p:spPr>
-        <p:style>
-          <a:lnRef idx="2">
-            <a:schemeClr val="accent6"/>
-          </a:lnRef>
-          <a:fillRef idx="1">
-            <a:schemeClr val="lt1"/>
-          </a:fillRef>
-          <a:effectRef idx="0">
-            <a:schemeClr val="accent6"/>
-          </a:effectRef>
-          <a:fontRef idx="minor">
-            <a:schemeClr val="dk1"/>
-          </a:fontRef>
-        </p:style>
-        <p:txBody>
-          <a:bodyPr rtlCol="1" anchor="ctr"/>
-          <a:lstStyle/>
-          <a:p>
-            <a:pPr algn="ctr"/>
-            <a:r>
-              <a:rPr lang="en-US" sz="1000" b="1" dirty="0">
-                <a:effectLst>
-                  <a:outerShdw blurRad="38100" dist="38100" dir="2700000" algn="tl">
-                    <a:srgbClr val="000000">
-                      <a:alpha val="43137"/>
-                    </a:srgbClr>
-                  </a:outerShdw>
-                </a:effectLst>
-                <a:latin typeface="Arial Black" pitchFamily="34" charset="0"/>
-              </a:rPr>
-              <a:t>MSG</a:t>
-            </a:r>
-            <a:endParaRPr lang="he-IL" sz="1000" b="1" dirty="0">
-              <a:effectLst>
-                <a:outerShdw blurRad="38100" dist="38100" dir="2700000" algn="tl">
-                  <a:srgbClr val="000000">
-                    <a:alpha val="43137"/>
-                  </a:srgbClr>
-                </a:outerShdw>
-              </a:effectLst>
-              <a:latin typeface="Arial Black" pitchFamily="34" charset="0"/>
-            </a:endParaRPr>
-          </a:p>
-        </p:txBody>
-      </p:sp>
+              </a:endParaRPr>
+            </a:p>
+          </p:txBody>
+        </p:sp>
+      </p:grpSp>
     </p:spTree>
     <p:extLst>
       <p:ext uri="{BB962C8B-B14F-4D97-AF65-F5344CB8AC3E}">
@@ -5718,1151 +5715,6 @@
       </p:transition>
     </mc:Fallback>
   </mc:AlternateContent>
-  <p:timing>
-    <p:tnLst>
-      <p:par>
-        <p:cTn id="1" dur="indefinite" restart="never" nodeType="tmRoot">
-          <p:childTnLst>
-            <p:seq concurrent="1" nextAc="seek">
-              <p:cTn id="2" dur="indefinite" nodeType="mainSeq">
-                <p:childTnLst>
-                  <p:par>
-                    <p:cTn id="3" fill="hold">
-                      <p:stCondLst>
-                        <p:cond delay="indefinite"/>
-                        <p:cond evt="onBegin" delay="0">
-                          <p:tn val="2"/>
-                        </p:cond>
-                      </p:stCondLst>
-                      <p:childTnLst>
-                        <p:par>
-                          <p:cTn id="4" fill="hold">
-                            <p:stCondLst>
-                              <p:cond delay="0"/>
-                            </p:stCondLst>
-                            <p:childTnLst>
-                              <p:par>
-                                <p:cTn id="5" presetID="53" presetClass="entr" presetSubtype="16" fill="hold" grpId="0" nodeType="afterEffect">
-                                  <p:stCondLst>
-                                    <p:cond delay="0"/>
-                                  </p:stCondLst>
-                                  <p:childTnLst>
-                                    <p:set>
-                                      <p:cBhvr>
-                                        <p:cTn id="6" dur="1" fill="hold">
-                                          <p:stCondLst>
-                                            <p:cond delay="0"/>
-                                          </p:stCondLst>
-                                        </p:cTn>
-                                        <p:tgtEl>
-                                          <p:spTgt spid="10"/>
-                                        </p:tgtEl>
-                                        <p:attrNameLst>
-                                          <p:attrName>style.visibility</p:attrName>
-                                        </p:attrNameLst>
-                                      </p:cBhvr>
-                                      <p:to>
-                                        <p:strVal val="visible"/>
-                                      </p:to>
-                                    </p:set>
-                                    <p:anim calcmode="lin" valueType="num">
-                                      <p:cBhvr>
-                                        <p:cTn id="7" dur="500" fill="hold"/>
-                                        <p:tgtEl>
-                                          <p:spTgt spid="10"/>
-                                        </p:tgtEl>
-                                        <p:attrNameLst>
-                                          <p:attrName>ppt_w</p:attrName>
-                                        </p:attrNameLst>
-                                      </p:cBhvr>
-                                      <p:tavLst>
-                                        <p:tav tm="0">
-                                          <p:val>
-                                            <p:fltVal val="0"/>
-                                          </p:val>
-                                        </p:tav>
-                                        <p:tav tm="100000">
-                                          <p:val>
-                                            <p:strVal val="#ppt_w"/>
-                                          </p:val>
-                                        </p:tav>
-                                      </p:tavLst>
-                                    </p:anim>
-                                    <p:anim calcmode="lin" valueType="num">
-                                      <p:cBhvr>
-                                        <p:cTn id="8" dur="500" fill="hold"/>
-                                        <p:tgtEl>
-                                          <p:spTgt spid="10"/>
-                                        </p:tgtEl>
-                                        <p:attrNameLst>
-                                          <p:attrName>ppt_h</p:attrName>
-                                        </p:attrNameLst>
-                                      </p:cBhvr>
-                                      <p:tavLst>
-                                        <p:tav tm="0">
-                                          <p:val>
-                                            <p:fltVal val="0"/>
-                                          </p:val>
-                                        </p:tav>
-                                        <p:tav tm="100000">
-                                          <p:val>
-                                            <p:strVal val="#ppt_h"/>
-                                          </p:val>
-                                        </p:tav>
-                                      </p:tavLst>
-                                    </p:anim>
-                                    <p:animEffect transition="in" filter="fade">
-                                      <p:cBhvr>
-                                        <p:cTn id="9" dur="500"/>
-                                        <p:tgtEl>
-                                          <p:spTgt spid="10"/>
-                                        </p:tgtEl>
-                                      </p:cBhvr>
-                                    </p:animEffect>
-                                  </p:childTnLst>
-                                </p:cTn>
-                              </p:par>
-                            </p:childTnLst>
-                          </p:cTn>
-                        </p:par>
-                      </p:childTnLst>
-                    </p:cTn>
-                  </p:par>
-                  <p:par>
-                    <p:cTn id="10" fill="hold">
-                      <p:stCondLst>
-                        <p:cond delay="indefinite"/>
-                      </p:stCondLst>
-                      <p:childTnLst>
-                        <p:par>
-                          <p:cTn id="11" fill="hold">
-                            <p:stCondLst>
-                              <p:cond delay="0"/>
-                            </p:stCondLst>
-                            <p:childTnLst>
-                              <p:par>
-                                <p:cTn id="12" presetID="22" presetClass="entr" presetSubtype="2" fill="hold" grpId="0" nodeType="clickEffect">
-                                  <p:stCondLst>
-                                    <p:cond delay="0"/>
-                                  </p:stCondLst>
-                                  <p:childTnLst>
-                                    <p:set>
-                                      <p:cBhvr>
-                                        <p:cTn id="13" dur="1" fill="hold">
-                                          <p:stCondLst>
-                                            <p:cond delay="0"/>
-                                          </p:stCondLst>
-                                        </p:cTn>
-                                        <p:tgtEl>
-                                          <p:spTgt spid="14"/>
-                                        </p:tgtEl>
-                                        <p:attrNameLst>
-                                          <p:attrName>style.visibility</p:attrName>
-                                        </p:attrNameLst>
-                                      </p:cBhvr>
-                                      <p:to>
-                                        <p:strVal val="visible"/>
-                                      </p:to>
-                                    </p:set>
-                                    <p:animEffect transition="in" filter="wipe(right)">
-                                      <p:cBhvr>
-                                        <p:cTn id="14" dur="500"/>
-                                        <p:tgtEl>
-                                          <p:spTgt spid="14"/>
-                                        </p:tgtEl>
-                                      </p:cBhvr>
-                                    </p:animEffect>
-                                  </p:childTnLst>
-                                </p:cTn>
-                              </p:par>
-                            </p:childTnLst>
-                          </p:cTn>
-                        </p:par>
-                        <p:par>
-                          <p:cTn id="15" fill="hold">
-                            <p:stCondLst>
-                              <p:cond delay="500"/>
-                            </p:stCondLst>
-                            <p:childTnLst>
-                              <p:par>
-                                <p:cTn id="16" presetID="22" presetClass="entr" presetSubtype="8" fill="hold" nodeType="afterEffect">
-                                  <p:stCondLst>
-                                    <p:cond delay="0"/>
-                                  </p:stCondLst>
-                                  <p:childTnLst>
-                                    <p:set>
-                                      <p:cBhvr>
-                                        <p:cTn id="17" dur="1" fill="hold">
-                                          <p:stCondLst>
-                                            <p:cond delay="0"/>
-                                          </p:stCondLst>
-                                        </p:cTn>
-                                        <p:tgtEl>
-                                          <p:spTgt spid="13"/>
-                                        </p:tgtEl>
-                                        <p:attrNameLst>
-                                          <p:attrName>style.visibility</p:attrName>
-                                        </p:attrNameLst>
-                                      </p:cBhvr>
-                                      <p:to>
-                                        <p:strVal val="visible"/>
-                                      </p:to>
-                                    </p:set>
-                                    <p:animEffect transition="in" filter="wipe(left)">
-                                      <p:cBhvr>
-                                        <p:cTn id="18" dur="500"/>
-                                        <p:tgtEl>
-                                          <p:spTgt spid="13"/>
-                                        </p:tgtEl>
-                                      </p:cBhvr>
-                                    </p:animEffect>
-                                  </p:childTnLst>
-                                </p:cTn>
-                              </p:par>
-                            </p:childTnLst>
-                          </p:cTn>
-                        </p:par>
-                      </p:childTnLst>
-                    </p:cTn>
-                  </p:par>
-                  <p:par>
-                    <p:cTn id="19" fill="hold">
-                      <p:stCondLst>
-                        <p:cond delay="indefinite"/>
-                      </p:stCondLst>
-                      <p:childTnLst>
-                        <p:par>
-                          <p:cTn id="20" fill="hold">
-                            <p:stCondLst>
-                              <p:cond delay="0"/>
-                            </p:stCondLst>
-                            <p:childTnLst>
-                              <p:par>
-                                <p:cTn id="21" presetID="22" presetClass="entr" presetSubtype="8" fill="hold" grpId="0" nodeType="clickEffect">
-                                  <p:stCondLst>
-                                    <p:cond delay="0"/>
-                                  </p:stCondLst>
-                                  <p:childTnLst>
-                                    <p:set>
-                                      <p:cBhvr>
-                                        <p:cTn id="22" dur="1" fill="hold">
-                                          <p:stCondLst>
-                                            <p:cond delay="0"/>
-                                          </p:stCondLst>
-                                        </p:cTn>
-                                        <p:tgtEl>
-                                          <p:spTgt spid="18"/>
-                                        </p:tgtEl>
-                                        <p:attrNameLst>
-                                          <p:attrName>style.visibility</p:attrName>
-                                        </p:attrNameLst>
-                                      </p:cBhvr>
-                                      <p:to>
-                                        <p:strVal val="visible"/>
-                                      </p:to>
-                                    </p:set>
-                                    <p:animEffect transition="in" filter="wipe(left)">
-                                      <p:cBhvr>
-                                        <p:cTn id="23" dur="500"/>
-                                        <p:tgtEl>
-                                          <p:spTgt spid="18"/>
-                                        </p:tgtEl>
-                                      </p:cBhvr>
-                                    </p:animEffect>
-                                  </p:childTnLst>
-                                </p:cTn>
-                              </p:par>
-                            </p:childTnLst>
-                          </p:cTn>
-                        </p:par>
-                        <p:par>
-                          <p:cTn id="24" fill="hold">
-                            <p:stCondLst>
-                              <p:cond delay="500"/>
-                            </p:stCondLst>
-                            <p:childTnLst>
-                              <p:par>
-                                <p:cTn id="25" presetID="22" presetClass="entr" presetSubtype="2" fill="hold" nodeType="afterEffect">
-                                  <p:stCondLst>
-                                    <p:cond delay="0"/>
-                                  </p:stCondLst>
-                                  <p:childTnLst>
-                                    <p:set>
-                                      <p:cBhvr>
-                                        <p:cTn id="26" dur="1" fill="hold">
-                                          <p:stCondLst>
-                                            <p:cond delay="0"/>
-                                          </p:stCondLst>
-                                        </p:cTn>
-                                        <p:tgtEl>
-                                          <p:spTgt spid="17"/>
-                                        </p:tgtEl>
-                                        <p:attrNameLst>
-                                          <p:attrName>style.visibility</p:attrName>
-                                        </p:attrNameLst>
-                                      </p:cBhvr>
-                                      <p:to>
-                                        <p:strVal val="visible"/>
-                                      </p:to>
-                                    </p:set>
-                                    <p:animEffect transition="in" filter="wipe(right)">
-                                      <p:cBhvr>
-                                        <p:cTn id="27" dur="500"/>
-                                        <p:tgtEl>
-                                          <p:spTgt spid="17"/>
-                                        </p:tgtEl>
-                                      </p:cBhvr>
-                                    </p:animEffect>
-                                  </p:childTnLst>
-                                </p:cTn>
-                              </p:par>
-                            </p:childTnLst>
-                          </p:cTn>
-                        </p:par>
-                      </p:childTnLst>
-                    </p:cTn>
-                  </p:par>
-                  <p:par>
-                    <p:cTn id="28" fill="hold">
-                      <p:stCondLst>
-                        <p:cond delay="indefinite"/>
-                      </p:stCondLst>
-                      <p:childTnLst>
-                        <p:par>
-                          <p:cTn id="29" fill="hold">
-                            <p:stCondLst>
-                              <p:cond delay="0"/>
-                            </p:stCondLst>
-                            <p:childTnLst>
-                              <p:par>
-                                <p:cTn id="30" presetID="22" presetClass="entr" presetSubtype="1" fill="hold" grpId="0" nodeType="clickEffect">
-                                  <p:stCondLst>
-                                    <p:cond delay="0"/>
-                                  </p:stCondLst>
-                                  <p:childTnLst>
-                                    <p:set>
-                                      <p:cBhvr>
-                                        <p:cTn id="31" dur="1" fill="hold">
-                                          <p:stCondLst>
-                                            <p:cond delay="0"/>
-                                          </p:stCondLst>
-                                        </p:cTn>
-                                        <p:tgtEl>
-                                          <p:spTgt spid="16"/>
-                                        </p:tgtEl>
-                                        <p:attrNameLst>
-                                          <p:attrName>style.visibility</p:attrName>
-                                        </p:attrNameLst>
-                                      </p:cBhvr>
-                                      <p:to>
-                                        <p:strVal val="visible"/>
-                                      </p:to>
-                                    </p:set>
-                                    <p:animEffect transition="in" filter="wipe(up)">
-                                      <p:cBhvr>
-                                        <p:cTn id="32" dur="500"/>
-                                        <p:tgtEl>
-                                          <p:spTgt spid="16"/>
-                                        </p:tgtEl>
-                                      </p:cBhvr>
-                                    </p:animEffect>
-                                  </p:childTnLst>
-                                </p:cTn>
-                              </p:par>
-                            </p:childTnLst>
-                          </p:cTn>
-                        </p:par>
-                        <p:par>
-                          <p:cTn id="33" fill="hold">
-                            <p:stCondLst>
-                              <p:cond delay="500"/>
-                            </p:stCondLst>
-                            <p:childTnLst>
-                              <p:par>
-                                <p:cTn id="34" presetID="22" presetClass="entr" presetSubtype="1" fill="hold" nodeType="afterEffect">
-                                  <p:stCondLst>
-                                    <p:cond delay="0"/>
-                                  </p:stCondLst>
-                                  <p:childTnLst>
-                                    <p:set>
-                                      <p:cBhvr>
-                                        <p:cTn id="35" dur="1" fill="hold">
-                                          <p:stCondLst>
-                                            <p:cond delay="0"/>
-                                          </p:stCondLst>
-                                        </p:cTn>
-                                        <p:tgtEl>
-                                          <p:spTgt spid="15"/>
-                                        </p:tgtEl>
-                                        <p:attrNameLst>
-                                          <p:attrName>style.visibility</p:attrName>
-                                        </p:attrNameLst>
-                                      </p:cBhvr>
-                                      <p:to>
-                                        <p:strVal val="visible"/>
-                                      </p:to>
-                                    </p:set>
-                                    <p:animEffect transition="in" filter="wipe(up)">
-                                      <p:cBhvr>
-                                        <p:cTn id="36" dur="500"/>
-                                        <p:tgtEl>
-                                          <p:spTgt spid="15"/>
-                                        </p:tgtEl>
-                                      </p:cBhvr>
-                                    </p:animEffect>
-                                  </p:childTnLst>
-                                </p:cTn>
-                              </p:par>
-                            </p:childTnLst>
-                          </p:cTn>
-                        </p:par>
-                      </p:childTnLst>
-                    </p:cTn>
-                  </p:par>
-                  <p:par>
-                    <p:cTn id="37" fill="hold">
-                      <p:stCondLst>
-                        <p:cond delay="indefinite"/>
-                      </p:stCondLst>
-                      <p:childTnLst>
-                        <p:par>
-                          <p:cTn id="38" fill="hold">
-                            <p:stCondLst>
-                              <p:cond delay="0"/>
-                            </p:stCondLst>
-                            <p:childTnLst>
-                              <p:par>
-                                <p:cTn id="39" presetID="10" presetClass="entr" presetSubtype="0" fill="hold" nodeType="clickEffect">
-                                  <p:stCondLst>
-                                    <p:cond delay="0"/>
-                                  </p:stCondLst>
-                                  <p:childTnLst>
-                                    <p:set>
-                                      <p:cBhvr>
-                                        <p:cTn id="40" dur="1" fill="hold">
-                                          <p:stCondLst>
-                                            <p:cond delay="0"/>
-                                          </p:stCondLst>
-                                        </p:cTn>
-                                        <p:tgtEl>
-                                          <p:spTgt spid="8"/>
-                                        </p:tgtEl>
-                                        <p:attrNameLst>
-                                          <p:attrName>style.visibility</p:attrName>
-                                        </p:attrNameLst>
-                                      </p:cBhvr>
-                                      <p:to>
-                                        <p:strVal val="visible"/>
-                                      </p:to>
-                                    </p:set>
-                                    <p:animEffect transition="in" filter="fade">
-                                      <p:cBhvr>
-                                        <p:cTn id="41" dur="250"/>
-                                        <p:tgtEl>
-                                          <p:spTgt spid="8"/>
-                                        </p:tgtEl>
-                                      </p:cBhvr>
-                                    </p:animEffect>
-                                  </p:childTnLst>
-                                </p:cTn>
-                              </p:par>
-                            </p:childTnLst>
-                          </p:cTn>
-                        </p:par>
-                        <p:par>
-                          <p:cTn id="42" fill="hold">
-                            <p:stCondLst>
-                              <p:cond delay="250"/>
-                            </p:stCondLst>
-                            <p:childTnLst>
-                              <p:par>
-                                <p:cTn id="43" presetID="22" presetClass="entr" presetSubtype="8" fill="hold" grpId="0" nodeType="afterEffect">
-                                  <p:stCondLst>
-                                    <p:cond delay="0"/>
-                                  </p:stCondLst>
-                                  <p:childTnLst>
-                                    <p:set>
-                                      <p:cBhvr>
-                                        <p:cTn id="44" dur="1" fill="hold">
-                                          <p:stCondLst>
-                                            <p:cond delay="0"/>
-                                          </p:stCondLst>
-                                        </p:cTn>
-                                        <p:tgtEl>
-                                          <p:spTgt spid="19"/>
-                                        </p:tgtEl>
-                                        <p:attrNameLst>
-                                          <p:attrName>style.visibility</p:attrName>
-                                        </p:attrNameLst>
-                                      </p:cBhvr>
-                                      <p:to>
-                                        <p:strVal val="visible"/>
-                                      </p:to>
-                                    </p:set>
-                                    <p:animEffect transition="in" filter="wipe(left)">
-                                      <p:cBhvr>
-                                        <p:cTn id="45" dur="500"/>
-                                        <p:tgtEl>
-                                          <p:spTgt spid="19"/>
-                                        </p:tgtEl>
-                                      </p:cBhvr>
-                                    </p:animEffect>
-                                  </p:childTnLst>
-                                </p:cTn>
-                              </p:par>
-                            </p:childTnLst>
-                          </p:cTn>
-                        </p:par>
-                      </p:childTnLst>
-                    </p:cTn>
-                  </p:par>
-                  <p:par>
-                    <p:cTn id="46" fill="hold">
-                      <p:stCondLst>
-                        <p:cond delay="indefinite"/>
-                      </p:stCondLst>
-                      <p:childTnLst>
-                        <p:par>
-                          <p:cTn id="47" fill="hold">
-                            <p:stCondLst>
-                              <p:cond delay="0"/>
-                            </p:stCondLst>
-                            <p:childTnLst>
-                              <p:par>
-                                <p:cTn id="48" presetID="22" presetClass="entr" presetSubtype="1" fill="hold" grpId="0" nodeType="clickEffect">
-                                  <p:stCondLst>
-                                    <p:cond delay="0"/>
-                                  </p:stCondLst>
-                                  <p:childTnLst>
-                                    <p:set>
-                                      <p:cBhvr>
-                                        <p:cTn id="49" dur="1" fill="hold">
-                                          <p:stCondLst>
-                                            <p:cond delay="0"/>
-                                          </p:stCondLst>
-                                        </p:cTn>
-                                        <p:tgtEl>
-                                          <p:spTgt spid="12"/>
-                                        </p:tgtEl>
-                                        <p:attrNameLst>
-                                          <p:attrName>style.visibility</p:attrName>
-                                        </p:attrNameLst>
-                                      </p:cBhvr>
-                                      <p:to>
-                                        <p:strVal val="visible"/>
-                                      </p:to>
-                                    </p:set>
-                                    <p:animEffect transition="in" filter="wipe(up)">
-                                      <p:cBhvr>
-                                        <p:cTn id="50" dur="500"/>
-                                        <p:tgtEl>
-                                          <p:spTgt spid="12"/>
-                                        </p:tgtEl>
-                                      </p:cBhvr>
-                                    </p:animEffect>
-                                  </p:childTnLst>
-                                </p:cTn>
-                              </p:par>
-                            </p:childTnLst>
-                          </p:cTn>
-                        </p:par>
-                        <p:par>
-                          <p:cTn id="51" fill="hold">
-                            <p:stCondLst>
-                              <p:cond delay="500"/>
-                            </p:stCondLst>
-                            <p:childTnLst>
-                              <p:par>
-                                <p:cTn id="52" presetID="22" presetClass="entr" presetSubtype="1" fill="hold" nodeType="afterEffect">
-                                  <p:stCondLst>
-                                    <p:cond delay="0"/>
-                                  </p:stCondLst>
-                                  <p:childTnLst>
-                                    <p:set>
-                                      <p:cBhvr>
-                                        <p:cTn id="53" dur="1" fill="hold">
-                                          <p:stCondLst>
-                                            <p:cond delay="0"/>
-                                          </p:stCondLst>
-                                        </p:cTn>
-                                        <p:tgtEl>
-                                          <p:spTgt spid="11"/>
-                                        </p:tgtEl>
-                                        <p:attrNameLst>
-                                          <p:attrName>style.visibility</p:attrName>
-                                        </p:attrNameLst>
-                                      </p:cBhvr>
-                                      <p:to>
-                                        <p:strVal val="visible"/>
-                                      </p:to>
-                                    </p:set>
-                                    <p:animEffect transition="in" filter="wipe(up)">
-                                      <p:cBhvr>
-                                        <p:cTn id="54" dur="500"/>
-                                        <p:tgtEl>
-                                          <p:spTgt spid="11"/>
-                                        </p:tgtEl>
-                                      </p:cBhvr>
-                                    </p:animEffect>
-                                  </p:childTnLst>
-                                </p:cTn>
-                              </p:par>
-                            </p:childTnLst>
-                          </p:cTn>
-                        </p:par>
-                        <p:par>
-                          <p:cTn id="55" fill="hold">
-                            <p:stCondLst>
-                              <p:cond delay="1000"/>
-                            </p:stCondLst>
-                            <p:childTnLst>
-                              <p:par>
-                                <p:cTn id="56" presetID="10" presetClass="exit" presetSubtype="0" fill="hold" grpId="1" nodeType="afterEffect">
-                                  <p:stCondLst>
-                                    <p:cond delay="0"/>
-                                  </p:stCondLst>
-                                  <p:childTnLst>
-                                    <p:animEffect transition="out" filter="fade">
-                                      <p:cBhvr>
-                                        <p:cTn id="57" dur="250"/>
-                                        <p:tgtEl>
-                                          <p:spTgt spid="19"/>
-                                        </p:tgtEl>
-                                      </p:cBhvr>
-                                    </p:animEffect>
-                                    <p:set>
-                                      <p:cBhvr>
-                                        <p:cTn id="58" dur="1" fill="hold">
-                                          <p:stCondLst>
-                                            <p:cond delay="249"/>
-                                          </p:stCondLst>
-                                        </p:cTn>
-                                        <p:tgtEl>
-                                          <p:spTgt spid="19"/>
-                                        </p:tgtEl>
-                                        <p:attrNameLst>
-                                          <p:attrName>style.visibility</p:attrName>
-                                        </p:attrNameLst>
-                                      </p:cBhvr>
-                                      <p:to>
-                                        <p:strVal val="hidden"/>
-                                      </p:to>
-                                    </p:set>
-                                  </p:childTnLst>
-                                </p:cTn>
-                              </p:par>
-                            </p:childTnLst>
-                          </p:cTn>
-                        </p:par>
-                      </p:childTnLst>
-                    </p:cTn>
-                  </p:par>
-                  <p:par>
-                    <p:cTn id="59" fill="hold">
-                      <p:stCondLst>
-                        <p:cond delay="indefinite"/>
-                      </p:stCondLst>
-                      <p:childTnLst>
-                        <p:par>
-                          <p:cTn id="60" fill="hold">
-                            <p:stCondLst>
-                              <p:cond delay="0"/>
-                            </p:stCondLst>
-                            <p:childTnLst>
-                              <p:par>
-                                <p:cTn id="61" presetID="1" presetClass="entr" presetSubtype="0" fill="hold" grpId="1" nodeType="clickEffect">
-                                  <p:stCondLst>
-                                    <p:cond delay="0"/>
-                                  </p:stCondLst>
-                                  <p:childTnLst>
-                                    <p:set>
-                                      <p:cBhvr>
-                                        <p:cTn id="62" dur="1" fill="hold">
-                                          <p:stCondLst>
-                                            <p:cond delay="0"/>
-                                          </p:stCondLst>
-                                        </p:cTn>
-                                        <p:tgtEl>
-                                          <p:spTgt spid="21"/>
-                                        </p:tgtEl>
-                                        <p:attrNameLst>
-                                          <p:attrName>style.visibility</p:attrName>
-                                        </p:attrNameLst>
-                                      </p:cBhvr>
-                                      <p:to>
-                                        <p:strVal val="visible"/>
-                                      </p:to>
-                                    </p:set>
-                                  </p:childTnLst>
-                                </p:cTn>
-                              </p:par>
-                            </p:childTnLst>
-                          </p:cTn>
-                        </p:par>
-                        <p:par>
-                          <p:cTn id="63" fill="hold">
-                            <p:stCondLst>
-                              <p:cond delay="0"/>
-                            </p:stCondLst>
-                            <p:childTnLst>
-                              <p:par>
-                                <p:cTn id="64" presetID="42" presetClass="path" presetSubtype="0" accel="50000" decel="50000" fill="hold" grpId="0" nodeType="afterEffect">
-                                  <p:stCondLst>
-                                    <p:cond delay="0"/>
-                                  </p:stCondLst>
-                                  <p:childTnLst>
-                                    <p:animMotion origin="layout" path="M 4.72222E-6 -0.3044 L 4.72222E-6 -2.96296E-6 " pathEditMode="relative" rAng="0" ptsTypes="AA">
-                                      <p:cBhvr>
-                                        <p:cTn id="65" dur="2000" fill="hold"/>
-                                        <p:tgtEl>
-                                          <p:spTgt spid="21"/>
-                                        </p:tgtEl>
-                                        <p:attrNameLst>
-                                          <p:attrName>ppt_x</p:attrName>
-                                          <p:attrName>ppt_y</p:attrName>
-                                        </p:attrNameLst>
-                                      </p:cBhvr>
-                                      <p:rCtr x="0" y="15208"/>
-                                    </p:animMotion>
-                                  </p:childTnLst>
-                                </p:cTn>
-                              </p:par>
-                            </p:childTnLst>
-                          </p:cTn>
-                        </p:par>
-                      </p:childTnLst>
-                    </p:cTn>
-                  </p:par>
-                  <p:par>
-                    <p:cTn id="66" fill="hold">
-                      <p:stCondLst>
-                        <p:cond delay="indefinite"/>
-                      </p:stCondLst>
-                      <p:childTnLst>
-                        <p:par>
-                          <p:cTn id="67" fill="hold">
-                            <p:stCondLst>
-                              <p:cond delay="0"/>
-                            </p:stCondLst>
-                            <p:childTnLst>
-                              <p:par>
-                                <p:cTn id="68" presetID="1" presetClass="entr" presetSubtype="0" fill="hold" grpId="1" nodeType="clickEffect">
-                                  <p:stCondLst>
-                                    <p:cond delay="0"/>
-                                  </p:stCondLst>
-                                  <p:childTnLst>
-                                    <p:set>
-                                      <p:cBhvr>
-                                        <p:cTn id="69" dur="1" fill="hold">
-                                          <p:stCondLst>
-                                            <p:cond delay="0"/>
-                                          </p:stCondLst>
-                                        </p:cTn>
-                                        <p:tgtEl>
-                                          <p:spTgt spid="23"/>
-                                        </p:tgtEl>
-                                        <p:attrNameLst>
-                                          <p:attrName>style.visibility</p:attrName>
-                                        </p:attrNameLst>
-                                      </p:cBhvr>
-                                      <p:to>
-                                        <p:strVal val="visible"/>
-                                      </p:to>
-                                    </p:set>
-                                  </p:childTnLst>
-                                </p:cTn>
-                              </p:par>
-                            </p:childTnLst>
-                          </p:cTn>
-                        </p:par>
-                        <p:par>
-                          <p:cTn id="70" fill="hold">
-                            <p:stCondLst>
-                              <p:cond delay="0"/>
-                            </p:stCondLst>
-                            <p:childTnLst>
-                              <p:par>
-                                <p:cTn id="71" presetID="42" presetClass="path" presetSubtype="0" accel="50000" decel="50000" fill="hold" grpId="0" nodeType="afterEffect">
-                                  <p:stCondLst>
-                                    <p:cond delay="0"/>
-                                  </p:stCondLst>
-                                  <p:childTnLst>
-                                    <p:animMotion origin="layout" path="M -0.22691 -0.00047 L -0.00034 -0.00047 " pathEditMode="relative" rAng="0" ptsTypes="AA">
-                                      <p:cBhvr>
-                                        <p:cTn id="72" dur="2000" fill="hold"/>
-                                        <p:tgtEl>
-                                          <p:spTgt spid="23"/>
-                                        </p:tgtEl>
-                                        <p:attrNameLst>
-                                          <p:attrName>ppt_x</p:attrName>
-                                          <p:attrName>ppt_y</p:attrName>
-                                        </p:attrNameLst>
-                                      </p:cBhvr>
-                                      <p:rCtr x="11319" y="0"/>
-                                    </p:animMotion>
-                                  </p:childTnLst>
-                                </p:cTn>
-                              </p:par>
-                            </p:childTnLst>
-                          </p:cTn>
-                        </p:par>
-                        <p:par>
-                          <p:cTn id="73" fill="hold">
-                            <p:stCondLst>
-                              <p:cond delay="2000"/>
-                            </p:stCondLst>
-                            <p:childTnLst>
-                              <p:par>
-                                <p:cTn id="74" presetID="1" presetClass="entr" presetSubtype="0" fill="hold" grpId="1" nodeType="afterEffect">
-                                  <p:stCondLst>
-                                    <p:cond delay="0"/>
-                                  </p:stCondLst>
-                                  <p:childTnLst>
-                                    <p:set>
-                                      <p:cBhvr>
-                                        <p:cTn id="75" dur="1" fill="hold">
-                                          <p:stCondLst>
-                                            <p:cond delay="0"/>
-                                          </p:stCondLst>
-                                        </p:cTn>
-                                        <p:tgtEl>
-                                          <p:spTgt spid="24"/>
-                                        </p:tgtEl>
-                                        <p:attrNameLst>
-                                          <p:attrName>style.visibility</p:attrName>
-                                        </p:attrNameLst>
-                                      </p:cBhvr>
-                                      <p:to>
-                                        <p:strVal val="visible"/>
-                                      </p:to>
-                                    </p:set>
-                                  </p:childTnLst>
-                                </p:cTn>
-                              </p:par>
-                            </p:childTnLst>
-                          </p:cTn>
-                        </p:par>
-                        <p:par>
-                          <p:cTn id="76" fill="hold">
-                            <p:stCondLst>
-                              <p:cond delay="2000"/>
-                            </p:stCondLst>
-                            <p:childTnLst>
-                              <p:par>
-                                <p:cTn id="77" presetID="42" presetClass="path" presetSubtype="0" accel="50000" decel="50000" fill="hold" grpId="0" nodeType="afterEffect">
-                                  <p:stCondLst>
-                                    <p:cond delay="0"/>
-                                  </p:stCondLst>
-                                  <p:childTnLst>
-                                    <p:animMotion origin="layout" path="M 0.22604 2.59259E-6 L -0.00069 2.59259E-6 " pathEditMode="relative" rAng="0" ptsTypes="AA">
-                                      <p:cBhvr>
-                                        <p:cTn id="78" dur="2000" fill="hold"/>
-                                        <p:tgtEl>
-                                          <p:spTgt spid="24"/>
-                                        </p:tgtEl>
-                                        <p:attrNameLst>
-                                          <p:attrName>ppt_x</p:attrName>
-                                          <p:attrName>ppt_y</p:attrName>
-                                        </p:attrNameLst>
-                                      </p:cBhvr>
-                                      <p:rCtr x="-11337" y="0"/>
-                                    </p:animMotion>
-                                  </p:childTnLst>
-                                </p:cTn>
-                              </p:par>
-                            </p:childTnLst>
-                          </p:cTn>
-                        </p:par>
-                      </p:childTnLst>
-                    </p:cTn>
-                  </p:par>
-                  <p:par>
-                    <p:cTn id="79" fill="hold">
-                      <p:stCondLst>
-                        <p:cond delay="indefinite"/>
-                      </p:stCondLst>
-                      <p:childTnLst>
-                        <p:par>
-                          <p:cTn id="80" fill="hold">
-                            <p:stCondLst>
-                              <p:cond delay="0"/>
-                            </p:stCondLst>
-                            <p:childTnLst>
-                              <p:par>
-                                <p:cTn id="81" presetID="1" presetClass="entr" presetSubtype="0" fill="hold" grpId="1" nodeType="clickEffect">
-                                  <p:stCondLst>
-                                    <p:cond delay="0"/>
-                                  </p:stCondLst>
-                                  <p:childTnLst>
-                                    <p:set>
-                                      <p:cBhvr>
-                                        <p:cTn id="82" dur="1" fill="hold">
-                                          <p:stCondLst>
-                                            <p:cond delay="0"/>
-                                          </p:stCondLst>
-                                        </p:cTn>
-                                        <p:tgtEl>
-                                          <p:spTgt spid="25"/>
-                                        </p:tgtEl>
-                                        <p:attrNameLst>
-                                          <p:attrName>style.visibility</p:attrName>
-                                        </p:attrNameLst>
-                                      </p:cBhvr>
-                                      <p:to>
-                                        <p:strVal val="visible"/>
-                                      </p:to>
-                                    </p:set>
-                                  </p:childTnLst>
-                                </p:cTn>
-                              </p:par>
-                            </p:childTnLst>
-                          </p:cTn>
-                        </p:par>
-                        <p:par>
-                          <p:cTn id="83" fill="hold">
-                            <p:stCondLst>
-                              <p:cond delay="0"/>
-                            </p:stCondLst>
-                            <p:childTnLst>
-                              <p:par>
-                                <p:cTn id="84" presetID="42" presetClass="path" presetSubtype="0" accel="50000" decel="50000" fill="hold" grpId="0" nodeType="afterEffect">
-                                  <p:stCondLst>
-                                    <p:cond delay="0"/>
-                                  </p:stCondLst>
-                                  <p:childTnLst>
-                                    <p:animMotion origin="layout" path="M -0.00087 -0.11019 L -0.00087 -0.00509 " pathEditMode="relative" rAng="0" ptsTypes="AA">
-                                      <p:cBhvr>
-                                        <p:cTn id="85" dur="2000" fill="hold"/>
-                                        <p:tgtEl>
-                                          <p:spTgt spid="25"/>
-                                        </p:tgtEl>
-                                        <p:attrNameLst>
-                                          <p:attrName>ppt_x</p:attrName>
-                                          <p:attrName>ppt_y</p:attrName>
-                                        </p:attrNameLst>
-                                      </p:cBhvr>
-                                      <p:rCtr x="0" y="5255"/>
-                                    </p:animMotion>
-                                  </p:childTnLst>
-                                </p:cTn>
-                              </p:par>
-                            </p:childTnLst>
-                          </p:cTn>
-                        </p:par>
-                        <p:par>
-                          <p:cTn id="86" fill="hold">
-                            <p:stCondLst>
-                              <p:cond delay="2000"/>
-                            </p:stCondLst>
-                            <p:childTnLst>
-                              <p:par>
-                                <p:cTn id="87" presetID="10" presetClass="exit" presetSubtype="0" fill="hold" grpId="2" nodeType="afterEffect">
-                                  <p:stCondLst>
-                                    <p:cond delay="0"/>
-                                  </p:stCondLst>
-                                  <p:childTnLst>
-                                    <p:animEffect transition="out" filter="fade">
-                                      <p:cBhvr>
-                                        <p:cTn id="88" dur="500"/>
-                                        <p:tgtEl>
-                                          <p:spTgt spid="21"/>
-                                        </p:tgtEl>
-                                      </p:cBhvr>
-                                    </p:animEffect>
-                                    <p:set>
-                                      <p:cBhvr>
-                                        <p:cTn id="89" dur="1" fill="hold">
-                                          <p:stCondLst>
-                                            <p:cond delay="499"/>
-                                          </p:stCondLst>
-                                        </p:cTn>
-                                        <p:tgtEl>
-                                          <p:spTgt spid="21"/>
-                                        </p:tgtEl>
-                                        <p:attrNameLst>
-                                          <p:attrName>style.visibility</p:attrName>
-                                        </p:attrNameLst>
-                                      </p:cBhvr>
-                                      <p:to>
-                                        <p:strVal val="hidden"/>
-                                      </p:to>
-                                    </p:set>
-                                  </p:childTnLst>
-                                </p:cTn>
-                              </p:par>
-                            </p:childTnLst>
-                          </p:cTn>
-                        </p:par>
-                      </p:childTnLst>
-                    </p:cTn>
-                  </p:par>
-                  <p:par>
-                    <p:cTn id="90" fill="hold">
-                      <p:stCondLst>
-                        <p:cond delay="indefinite"/>
-                      </p:stCondLst>
-                      <p:childTnLst>
-                        <p:par>
-                          <p:cTn id="91" fill="hold">
-                            <p:stCondLst>
-                              <p:cond delay="0"/>
-                            </p:stCondLst>
-                            <p:childTnLst>
-                              <p:par>
-                                <p:cTn id="92" presetID="6" presetClass="emph" presetSubtype="0" accel="20000" decel="20000" fill="hold" nodeType="clickEffect">
-                                  <p:stCondLst>
-                                    <p:cond delay="0"/>
-                                  </p:stCondLst>
-                                  <p:childTnLst>
-                                    <p:animScale>
-                                      <p:cBhvr>
-                                        <p:cTn id="93" dur="500" fill="hold"/>
-                                        <p:tgtEl>
-                                          <p:spTgt spid="8"/>
-                                        </p:tgtEl>
-                                      </p:cBhvr>
-                                      <p:by x="150000" y="150000"/>
-                                    </p:animScale>
-                                  </p:childTnLst>
-                                </p:cTn>
-                              </p:par>
-                            </p:childTnLst>
-                          </p:cTn>
-                        </p:par>
-                        <p:par>
-                          <p:cTn id="94" fill="hold">
-                            <p:stCondLst>
-                              <p:cond delay="500"/>
-                            </p:stCondLst>
-                            <p:childTnLst>
-                              <p:par>
-                                <p:cTn id="95" presetID="42" presetClass="exit" presetSubtype="0" fill="hold" grpId="2" nodeType="afterEffect">
-                                  <p:stCondLst>
-                                    <p:cond delay="0"/>
-                                  </p:stCondLst>
-                                  <p:childTnLst>
-                                    <p:animEffect transition="out" filter="fade">
-                                      <p:cBhvr>
-                                        <p:cTn id="96" dur="500"/>
-                                        <p:tgtEl>
-                                          <p:spTgt spid="25"/>
-                                        </p:tgtEl>
-                                      </p:cBhvr>
-                                    </p:animEffect>
-                                    <p:anim calcmode="lin" valueType="num">
-                                      <p:cBhvr>
-                                        <p:cTn id="97" dur="500"/>
-                                        <p:tgtEl>
-                                          <p:spTgt spid="25"/>
-                                        </p:tgtEl>
-                                        <p:attrNameLst>
-                                          <p:attrName>ppt_x</p:attrName>
-                                        </p:attrNameLst>
-                                      </p:cBhvr>
-                                      <p:tavLst>
-                                        <p:tav tm="0">
-                                          <p:val>
-                                            <p:strVal val="ppt_x"/>
-                                          </p:val>
-                                        </p:tav>
-                                        <p:tav tm="100000">
-                                          <p:val>
-                                            <p:strVal val="ppt_x"/>
-                                          </p:val>
-                                        </p:tav>
-                                      </p:tavLst>
-                                    </p:anim>
-                                    <p:anim calcmode="lin" valueType="num">
-                                      <p:cBhvr>
-                                        <p:cTn id="98" dur="500"/>
-                                        <p:tgtEl>
-                                          <p:spTgt spid="25"/>
-                                        </p:tgtEl>
-                                        <p:attrNameLst>
-                                          <p:attrName>ppt_y</p:attrName>
-                                        </p:attrNameLst>
-                                      </p:cBhvr>
-                                      <p:tavLst>
-                                        <p:tav tm="0">
-                                          <p:val>
-                                            <p:strVal val="ppt_y"/>
-                                          </p:val>
-                                        </p:tav>
-                                        <p:tav tm="100000">
-                                          <p:val>
-                                            <p:strVal val="ppt_y+.1"/>
-                                          </p:val>
-                                        </p:tav>
-                                      </p:tavLst>
-                                    </p:anim>
-                                    <p:set>
-                                      <p:cBhvr>
-                                        <p:cTn id="99" dur="1" fill="hold">
-                                          <p:stCondLst>
-                                            <p:cond delay="499"/>
-                                          </p:stCondLst>
-                                        </p:cTn>
-                                        <p:tgtEl>
-                                          <p:spTgt spid="25"/>
-                                        </p:tgtEl>
-                                        <p:attrNameLst>
-                                          <p:attrName>style.visibility</p:attrName>
-                                        </p:attrNameLst>
-                                      </p:cBhvr>
-                                      <p:to>
-                                        <p:strVal val="hidden"/>
-                                      </p:to>
-                                    </p:set>
-                                  </p:childTnLst>
-                                </p:cTn>
-                              </p:par>
-                            </p:childTnLst>
-                          </p:cTn>
-                        </p:par>
-                      </p:childTnLst>
-                    </p:cTn>
-                  </p:par>
-                </p:childTnLst>
-              </p:cTn>
-              <p:prevCondLst>
-                <p:cond evt="onPrev" delay="0">
-                  <p:tgtEl>
-                    <p:sldTgt/>
-                  </p:tgtEl>
-                </p:cond>
-              </p:prevCondLst>
-              <p:nextCondLst>
-                <p:cond evt="onNext" delay="0">
-                  <p:tgtEl>
-                    <p:sldTgt/>
-                  </p:tgtEl>
-                </p:cond>
-              </p:nextCondLst>
-            </p:seq>
-          </p:childTnLst>
-        </p:cTn>
-      </p:par>
-    </p:tnLst>
-    <p:bldLst>
-      <p:bldP spid="10" grpId="0" animBg="1"/>
-      <p:bldP spid="12" grpId="0" animBg="1"/>
-      <p:bldP spid="14" grpId="0" animBg="1"/>
-      <p:bldP spid="16" grpId="0" animBg="1"/>
-      <p:bldP spid="18" grpId="0" animBg="1"/>
-      <p:bldP spid="19" grpId="0" animBg="1"/>
-      <p:bldP spid="19" grpId="1" animBg="1"/>
-      <p:bldP spid="21" grpId="0" animBg="1"/>
-      <p:bldP spid="21" grpId="1" animBg="1"/>
-      <p:bldP spid="21" grpId="2" animBg="1"/>
-      <p:bldP spid="23" grpId="0" animBg="1"/>
-      <p:bldP spid="23" grpId="1" animBg="1"/>
-      <p:bldP spid="24" grpId="0" animBg="1"/>
-      <p:bldP spid="24" grpId="1" animBg="1"/>
-      <p:bldP spid="25" grpId="0" animBg="1"/>
-      <p:bldP spid="25" grpId="1" animBg="1"/>
-      <p:bldP spid="25" grpId="2" animBg="1"/>
-    </p:bldLst>
-  </p:timing>
 </p:sld>
 </file>
 
@@ -7545,7 +6397,7 @@
             </a:r>
             <a:r>
               <a:rPr lang="en-US" sz="2400" dirty="0"/>
-              <a:t>use Messenger if you have quick access to shared code parts to invoke events/commands;</a:t>
+              <a:t>use Messenger if you have quick access to shared code parts to invoke events/methods in same module/class;</a:t>
             </a:r>
           </a:p>
           <a:p>
@@ -7598,59 +6450,6 @@
               <a:rPr lang="en-US" sz="2400" dirty="0"/>
               <a:t> using Filtered subscriptions;</a:t>
             </a:r>
-          </a:p>
-          <a:p>
-            <a:pPr algn="l" rtl="0">
-              <a:spcAft>
-                <a:spcPts val="1200"/>
-              </a:spcAft>
-              <a:buFont typeface="Wingdings" pitchFamily="2" charset="2"/>
-              <a:buChar char="ü"/>
-            </a:pPr>
-            <a:r>
-              <a:rPr lang="en-US" sz="2400" b="1" dirty="0"/>
-              <a:t>USE</a:t>
-            </a:r>
-            <a:r>
-              <a:rPr lang="en-US" sz="2400" dirty="0"/>
-              <a:t> “</a:t>
-            </a:r>
-            <a:r>
-              <a:rPr lang="en-US" sz="2400" dirty="0" err="1"/>
-              <a:t>ThreadOption</a:t>
-            </a:r>
-            <a:r>
-              <a:rPr lang="en-US" sz="2400" dirty="0"/>
-              <a:t>” enum to define sync/</a:t>
-            </a:r>
-            <a:r>
-              <a:rPr lang="en-US" sz="2400" dirty="0" err="1"/>
-              <a:t>async</a:t>
-            </a:r>
-            <a:r>
-              <a:rPr lang="en-US" sz="2400" dirty="0"/>
-              <a:t> invocations’ behavior;</a:t>
-            </a:r>
-          </a:p>
-          <a:p>
-            <a:pPr algn="l" rtl="0">
-              <a:spcAft>
-                <a:spcPts val="1200"/>
-              </a:spcAft>
-              <a:buFont typeface="Wingdings" pitchFamily="2" charset="2"/>
-              <a:buChar char="ü"/>
-            </a:pPr>
-            <a:endParaRPr lang="en-US" sz="2400" dirty="0"/>
-          </a:p>
-          <a:p>
-            <a:pPr algn="l" rtl="0">
-              <a:spcAft>
-                <a:spcPts val="1200"/>
-              </a:spcAft>
-              <a:buFont typeface="Wingdings" pitchFamily="2" charset="2"/>
-              <a:buChar char="ü"/>
-            </a:pPr>
-            <a:endParaRPr lang="he-IL" sz="2400" dirty="0"/>
           </a:p>
         </p:txBody>
       </p:sp>
@@ -7984,27 +6783,228 @@
                       </p:childTnLst>
                     </p:cTn>
                   </p:par>
+                </p:childTnLst>
+              </p:cTn>
+              <p:prevCondLst>
+                <p:cond evt="onPrev" delay="0">
+                  <p:tgtEl>
+                    <p:sldTgt/>
+                  </p:tgtEl>
+                </p:cond>
+              </p:prevCondLst>
+              <p:nextCondLst>
+                <p:cond evt="onNext" delay="0">
+                  <p:tgtEl>
+                    <p:sldTgt/>
+                  </p:tgtEl>
+                </p:cond>
+              </p:nextCondLst>
+            </p:seq>
+          </p:childTnLst>
+        </p:cTn>
+      </p:par>
+    </p:tnLst>
+    <p:bldLst>
+      <p:bldP spid="4" grpId="0"/>
+      <p:bldP spid="5" grpId="0" build="p"/>
+    </p:bldLst>
+  </p:timing>
+</p:sld>
+</file>
+
+<file path=ppt/slides/slide6.xml><?xml version="1.0" encoding="utf-8"?>
+<p:sld xmlns:a="http://schemas.openxmlformats.org/drawingml/2006/main" xmlns:r="http://schemas.openxmlformats.org/officeDocument/2006/relationships" xmlns:p="http://schemas.openxmlformats.org/presentationml/2006/main" showMasterSp="0">
+  <p:cSld>
+    <p:spTree>
+      <p:nvGrpSpPr>
+        <p:cNvPr id="1" name=""/>
+        <p:cNvGrpSpPr/>
+        <p:nvPr/>
+      </p:nvGrpSpPr>
+      <p:grpSpPr>
+        <a:xfrm>
+          <a:off x="0" y="0"/>
+          <a:ext cx="0" cy="0"/>
+          <a:chOff x="0" y="0"/>
+          <a:chExt cx="0" cy="0"/>
+        </a:xfrm>
+      </p:grpSpPr>
+      <p:sp>
+        <p:nvSpPr>
+          <p:cNvPr id="4" name="Title 3"/>
+          <p:cNvSpPr>
+            <a:spLocks noGrp="1"/>
+          </p:cNvSpPr>
+          <p:nvPr>
+            <p:ph type="title"/>
+          </p:nvPr>
+        </p:nvSpPr>
+        <p:spPr>
+          <a:xfrm>
+            <a:off x="914400" y="332656"/>
+            <a:ext cx="7315200" cy="660149"/>
+          </a:xfrm>
+        </p:spPr>
+        <p:txBody>
+          <a:bodyPr anchor="t">
+            <a:normAutofit fontScale="90000"/>
+          </a:bodyPr>
+          <a:lstStyle/>
+          <a:p>
+            <a:pPr rtl="0"/>
+            <a:r>
+              <a:rPr lang="en-US" dirty="0"/>
+              <a:t>Messenger API:</a:t>
+            </a:r>
+            <a:endParaRPr lang="he-IL" dirty="0"/>
+          </a:p>
+        </p:txBody>
+      </p:sp>
+      <p:sp>
+        <p:nvSpPr>
+          <p:cNvPr id="5" name="Content Placeholder 4"/>
+          <p:cNvSpPr>
+            <a:spLocks noGrp="1"/>
+          </p:cNvSpPr>
+          <p:nvPr>
+            <p:ph idx="1"/>
+          </p:nvPr>
+        </p:nvSpPr>
+        <p:spPr>
+          <a:xfrm>
+            <a:off x="914400" y="1340767"/>
+            <a:ext cx="7315200" cy="4968593"/>
+          </a:xfrm>
+        </p:spPr>
+        <p:txBody>
+          <a:bodyPr tIns="72000" bIns="72000">
+            <a:noAutofit/>
+          </a:bodyPr>
+          <a:lstStyle/>
+          <a:p>
+            <a:pPr algn="l" rtl="0">
+              <a:spcAft>
+                <a:spcPts val="1200"/>
+              </a:spcAft>
+              <a:buFont typeface="Wingdings" pitchFamily="2" charset="2"/>
+              <a:buChar char="ü"/>
+            </a:pPr>
+            <a:endParaRPr lang="en-US" sz="2400" dirty="0"/>
+          </a:p>
+        </p:txBody>
+      </p:sp>
+    </p:spTree>
+    <p:extLst>
+      <p:ext uri="{BB962C8B-B14F-4D97-AF65-F5344CB8AC3E}">
+        <p14:creationId xmlns:p14="http://schemas.microsoft.com/office/powerpoint/2010/main" val="4192422307"/>
+      </p:ext>
+    </p:extLst>
+  </p:cSld>
+  <p:clrMapOvr>
+    <a:masterClrMapping/>
+  </p:clrMapOvr>
+  <mc:AlternateContent xmlns:mc="http://schemas.openxmlformats.org/markup-compatibility/2006" xmlns:p14="http://schemas.microsoft.com/office/powerpoint/2010/main">
+    <mc:Choice Requires="p14">
+      <p:transition p14:dur="250">
+        <p:fade/>
+      </p:transition>
+    </mc:Choice>
+    <mc:Fallback xmlns="">
+      <p:transition>
+        <p:fade/>
+      </p:transition>
+    </mc:Fallback>
+  </mc:AlternateContent>
+  <p:timing>
+    <p:tnLst>
+      <p:par>
+        <p:cTn id="1" dur="indefinite" restart="never" nodeType="tmRoot">
+          <p:childTnLst>
+            <p:seq concurrent="1" nextAc="seek">
+              <p:cTn id="2" dur="indefinite" nodeType="mainSeq">
+                <p:childTnLst>
                   <p:par>
-                    <p:cTn id="28" fill="hold">
+                    <p:cTn id="3" fill="hold">
                       <p:stCondLst>
                         <p:cond delay="indefinite"/>
+                        <p:cond evt="onBegin" delay="0">
+                          <p:tn val="2"/>
+                        </p:cond>
                       </p:stCondLst>
                       <p:childTnLst>
                         <p:par>
-                          <p:cTn id="29" fill="hold">
+                          <p:cTn id="4" fill="hold">
                             <p:stCondLst>
                               <p:cond delay="0"/>
                             </p:stCondLst>
                             <p:childTnLst>
                               <p:par>
-                                <p:cTn id="30" presetID="22" presetClass="entr" presetSubtype="8" fill="hold" grpId="0" nodeType="clickEffect">
+                                <p:cTn id="5" presetID="22" presetClass="entr" presetSubtype="1" fill="hold" grpId="0" nodeType="afterEffect">
                                   <p:stCondLst>
                                     <p:cond delay="0"/>
                                   </p:stCondLst>
                                   <p:childTnLst>
                                     <p:set>
                                       <p:cBhvr>
-                                        <p:cTn id="31" dur="1" fill="hold">
+                                        <p:cTn id="6" dur="1" fill="hold">
+                                          <p:stCondLst>
+                                            <p:cond delay="0"/>
+                                          </p:stCondLst>
+                                        </p:cTn>
+                                        <p:tgtEl>
+                                          <p:spTgt spid="4"/>
+                                        </p:tgtEl>
+                                        <p:attrNameLst>
+                                          <p:attrName>style.visibility</p:attrName>
+                                        </p:attrNameLst>
+                                      </p:cBhvr>
+                                      <p:to>
+                                        <p:strVal val="visible"/>
+                                      </p:to>
+                                    </p:set>
+                                    <p:animEffect transition="in" filter="wipe(up)">
+                                      <p:cBhvr>
+                                        <p:cTn id="7" dur="500"/>
+                                        <p:tgtEl>
+                                          <p:spTgt spid="4"/>
+                                        </p:tgtEl>
+                                      </p:cBhvr>
+                                    </p:animEffect>
+                                  </p:childTnLst>
+                                </p:cTn>
+                              </p:par>
+                            </p:childTnLst>
+                          </p:cTn>
+                        </p:par>
+                      </p:childTnLst>
+                    </p:cTn>
+                  </p:par>
+                  <p:par>
+                    <p:cTn id="8" fill="hold">
+                      <p:stCondLst>
+                        <p:cond delay="indefinite"/>
+                      </p:stCondLst>
+                      <p:childTnLst>
+                        <p:par>
+                          <p:cTn id="9" fill="hold">
+                            <p:stCondLst>
+                              <p:cond delay="0"/>
+                            </p:stCondLst>
+                            <p:childTnLst>
+                              <p:par>
+                                <p:cTn id="10" presetID="22" presetClass="entr" presetSubtype="8" fill="hold" grpId="0" nodeType="clickEffect" nodePh="1">
+                                  <p:stCondLst>
+                                    <p:cond delay="0"/>
+                                  </p:stCondLst>
+                                  <p:endCondLst>
+                                    <p:cond evt="begin" delay="0">
+                                      <p:tn val="10"/>
+                                    </p:cond>
+                                  </p:endCondLst>
+                                  <p:childTnLst>
+                                    <p:set>
+                                      <p:cBhvr>
+                                        <p:cTn id="11" dur="1" fill="hold">
                                           <p:stCondLst>
                                             <p:cond delay="0"/>
                                           </p:stCondLst>
@@ -8012,7 +7012,7 @@
                                         <p:tgtEl>
                                           <p:spTgt spid="5">
                                             <p:txEl>
-                                              <p:pRg st="4" end="4"/>
+                                              <p:pRg st="0" end="0"/>
                                             </p:txEl>
                                           </p:spTgt>
                                         </p:tgtEl>
@@ -8026,11 +7026,11 @@
                                     </p:set>
                                     <p:animEffect transition="in" filter="wipe(left)">
                                       <p:cBhvr>
-                                        <p:cTn id="32" dur="250"/>
+                                        <p:cTn id="12" dur="250"/>
                                         <p:tgtEl>
                                           <p:spTgt spid="5">
                                             <p:txEl>
-                                              <p:pRg st="4" end="4"/>
+                                              <p:pRg st="0" end="0"/>
                                             </p:txEl>
                                           </p:spTgt>
                                         </p:tgtEl>

</xml_diff>

<commit_message>
doc update + demo scene refinement
</commit_message>
<xml_diff>
--- a/docs/PubSub Messenger.pptx
+++ b/docs/PubSub Messenger.pptx
@@ -4875,7 +4875,7 @@
                         <a14:saturation sat="200000"/>
                       </a14:imgEffect>
                       <a14:imgEffect>
-                        <a14:brightnessContrast bright="-20000"/>
+                        <a14:brightnessContrast contrast="20000"/>
                       </a14:imgEffect>
                     </a14:imgLayer>
                   </a14:imgProps>
@@ -6554,6 +6554,9 @@
                       <a14:imgEffect>
                         <a14:saturation sat="200000"/>
                       </a14:imgEffect>
+                      <a14:imgEffect>
+                        <a14:brightnessContrast contrast="20000"/>
+                      </a14:imgEffect>
                     </a14:imgLayer>
                   </a14:imgProps>
                 </a:ext>
@@ -7061,36 +7064,6 @@
           <a:chExt cx="0" cy="0"/>
         </a:xfrm>
       </p:grpSpPr>
-      <p:pic>
-        <p:nvPicPr>
-          <p:cNvPr id="2" name="Picture 1">
-            <a:extLst>
-              <a:ext uri="{FF2B5EF4-FFF2-40B4-BE49-F238E27FC236}">
-                <a16:creationId xmlns:a16="http://schemas.microsoft.com/office/drawing/2014/main" id="{96F0D5C6-28DC-5E4D-88CE-7C0A714404E0}"/>
-              </a:ext>
-            </a:extLst>
-          </p:cNvPr>
-          <p:cNvPicPr>
-            <a:picLocks noChangeAspect="1"/>
-          </p:cNvPicPr>
-          <p:nvPr/>
-        </p:nvPicPr>
-        <p:blipFill>
-          <a:blip r:embed="rId2"/>
-          <a:stretch>
-            <a:fillRect/>
-          </a:stretch>
-        </p:blipFill>
-        <p:spPr>
-          <a:xfrm>
-            <a:off x="305064" y="1292643"/>
-            <a:ext cx="2895965" cy="2373497"/>
-          </a:xfrm>
-          <a:prstGeom prst="rect">
-            <a:avLst/>
-          </a:prstGeom>
-        </p:spPr>
-      </p:pic>
       <p:sp>
         <p:nvSpPr>
           <p:cNvPr id="4" name="Title 3"/>
@@ -7109,16 +7082,16 @@
         </p:spPr>
         <p:txBody>
           <a:bodyPr anchor="t">
-            <a:normAutofit fontScale="90000"/>
+            <a:normAutofit/>
           </a:bodyPr>
           <a:lstStyle/>
           <a:p>
             <a:pPr rtl="0"/>
             <a:r>
-              <a:rPr lang="en-US" dirty="0"/>
+              <a:rPr lang="en-US" sz="3200" dirty="0"/>
               <a:t>Demo Structure:</a:t>
             </a:r>
-            <a:endParaRPr lang="he-IL" dirty="0"/>
+            <a:endParaRPr lang="he-IL" sz="3200" dirty="0"/>
           </a:p>
         </p:txBody>
       </p:sp>
@@ -7136,8 +7109,8 @@
         </p:nvSpPr>
         <p:spPr>
           <a:xfrm>
-            <a:off x="64845" y="783311"/>
-            <a:ext cx="2584362" cy="369332"/>
+            <a:off x="64845" y="675543"/>
+            <a:ext cx="1007007" cy="369332"/>
           </a:xfrm>
           <a:prstGeom prst="rect">
             <a:avLst/>
@@ -7158,7 +7131,7 @@
             </a:pPr>
             <a:r>
               <a:rPr lang="en-US" b="1" dirty="0"/>
-              <a:t>Plugins / Messaging</a:t>
+              <a:t>Demo</a:t>
             </a:r>
           </a:p>
         </p:txBody>
@@ -7212,14 +7185,14 @@
           <p:nvPr>
             <p:extLst>
               <p:ext uri="{D42A27DB-BD31-4B8C-83A1-F6EECF244321}">
-                <p14:modId xmlns:p14="http://schemas.microsoft.com/office/powerpoint/2010/main" val="992868064"/>
+                <p14:modId xmlns:p14="http://schemas.microsoft.com/office/powerpoint/2010/main" val="919046535"/>
               </p:ext>
             </p:extLst>
           </p:nvPr>
         </p:nvGraphicFramePr>
         <p:xfrm>
-          <a:off x="3275856" y="1292643"/>
-          <a:ext cx="5688632" cy="3406168"/>
+          <a:off x="3005314" y="1109604"/>
+          <a:ext cx="5959174" cy="2607428"/>
         </p:xfrm>
         <a:graphic>
           <a:graphicData uri="http://schemas.openxmlformats.org/drawingml/2006/table">
@@ -7228,21 +7201,21 @@
                 <a:tableStyleId>{D03447BB-5D67-496B-8E87-E561075AD55C}</a:tableStyleId>
               </a:tblPr>
               <a:tblGrid>
-                <a:gridCol w="1080120">
+                <a:gridCol w="1131489">
                   <a:extLst>
                     <a:ext uri="{9D8B030D-6E8A-4147-A177-3AD203B41FA5}">
                       <a16:colId xmlns:a16="http://schemas.microsoft.com/office/drawing/2014/main" val="349504628"/>
                     </a:ext>
                   </a:extLst>
                 </a:gridCol>
-                <a:gridCol w="1944216">
+                <a:gridCol w="1565762">
                   <a:extLst>
                     <a:ext uri="{9D8B030D-6E8A-4147-A177-3AD203B41FA5}">
                       <a16:colId xmlns:a16="http://schemas.microsoft.com/office/drawing/2014/main" val="125230570"/>
                     </a:ext>
                   </a:extLst>
                 </a:gridCol>
-                <a:gridCol w="2664296">
+                <a:gridCol w="3261923">
                   <a:extLst>
                     <a:ext uri="{9D8B030D-6E8A-4147-A177-3AD203B41FA5}">
                       <a16:colId xmlns:a16="http://schemas.microsoft.com/office/drawing/2014/main" val="2383567160"/>
@@ -7250,7 +7223,7 @@
                   </a:extLst>
                 </a:gridCol>
               </a:tblGrid>
-              <a:tr h="358461">
+              <a:tr h="340938">
                 <a:tc>
                   <a:txBody>
                     <a:bodyPr/>
@@ -7258,7 +7231,7 @@
                     <a:p>
                       <a:pPr marL="0" algn="l" defTabSz="914400" rtl="0" eaLnBrk="1" latinLnBrk="0" hangingPunct="1"/>
                       <a:r>
-                        <a:rPr lang="en-US" sz="1000" b="0" dirty="0"/>
+                        <a:rPr lang="en-US" sz="900" b="0" dirty="0"/>
                         <a:t>Folder</a:t>
                       </a:r>
                     </a:p>
@@ -7279,7 +7252,7 @@
                     <a:p>
                       <a:pPr marL="0" algn="l" defTabSz="914400" rtl="0" eaLnBrk="1" latinLnBrk="0" hangingPunct="1"/>
                       <a:r>
-                        <a:rPr lang="en-US" sz="1000" b="0" dirty="0"/>
+                        <a:rPr lang="en-US" sz="900" b="0" dirty="0"/>
                         <a:t>File/Class/Script</a:t>
                       </a:r>
                     </a:p>
@@ -7300,7 +7273,7 @@
                     <a:p>
                       <a:pPr marL="0" algn="l" defTabSz="914400" rtl="0" eaLnBrk="1" latinLnBrk="0" hangingPunct="1"/>
                       <a:r>
-                        <a:rPr lang="en-US" sz="1000" b="0" dirty="0"/>
+                        <a:rPr lang="en-US" sz="900" b="0" dirty="0"/>
                         <a:t>Description</a:t>
                       </a:r>
                     </a:p>
@@ -7320,14 +7293,17 @@
                   </a:ext>
                 </a:extLst>
               </a:tr>
-              <a:tr h="358461">
+              <a:tr h="347880">
                 <a:tc>
                   <a:txBody>
                     <a:bodyPr/>
                     <a:lstStyle/>
                     <a:p>
                       <a:pPr marL="0" algn="l" defTabSz="914400" rtl="0" eaLnBrk="1" latinLnBrk="0" hangingPunct="1"/>
-                      <a:endParaRPr lang="en-US" sz="1000" b="0" dirty="0"/>
+                      <a:r>
+                        <a:rPr lang="en-US" sz="900" b="0" dirty="0"/>
+                        <a:t>Prefabs</a:t>
+                      </a:r>
                     </a:p>
                   </a:txBody>
                   <a:tcPr/>
@@ -7338,7 +7314,11 @@
                     <a:lstStyle/>
                     <a:p>
                       <a:pPr marL="0" algn="l" defTabSz="914400" rtl="0" eaLnBrk="1" latinLnBrk="0" hangingPunct="1"/>
-                      <a:endParaRPr lang="en-US" sz="1000" b="0" dirty="0"/>
+                      <a:r>
+                        <a:rPr lang="en-US" sz="900" b="0" dirty="0" err="1"/>
+                        <a:t>ChatPanelPrefab</a:t>
+                      </a:r>
+                      <a:endParaRPr lang="en-US" sz="900" b="0" dirty="0"/>
                     </a:p>
                   </a:txBody>
                   <a:tcPr/>
@@ -7349,7 +7329,10 @@
                     <a:lstStyle/>
                     <a:p>
                       <a:pPr marL="0" algn="l" defTabSz="914400" rtl="0" eaLnBrk="1" latinLnBrk="0" hangingPunct="1"/>
-                      <a:endParaRPr lang="en-US" sz="1000" b="0" dirty="0"/>
+                      <a:r>
+                        <a:rPr lang="en-US" sz="900" b="0" dirty="0"/>
+                        <a:t>Prefab that contains all elements for player chat UI (see prefab in editor)</a:t>
+                      </a:r>
                     </a:p>
                   </a:txBody>
                   <a:tcPr/>
@@ -7360,14 +7343,17 @@
                   </a:ext>
                 </a:extLst>
               </a:tr>
-              <a:tr h="358461">
+              <a:tr h="340938">
                 <a:tc>
                   <a:txBody>
                     <a:bodyPr/>
                     <a:lstStyle/>
                     <a:p>
                       <a:pPr marL="0" algn="l" defTabSz="914400" rtl="0" eaLnBrk="1" latinLnBrk="0" hangingPunct="1"/>
-                      <a:endParaRPr lang="en-US" sz="1000" b="0" dirty="0"/>
+                      <a:r>
+                        <a:rPr lang="en-US" sz="900" b="0" dirty="0"/>
+                        <a:t>Prefabs</a:t>
+                      </a:r>
                     </a:p>
                   </a:txBody>
                   <a:tcPr/>
@@ -7378,7 +7364,11 @@
                     <a:lstStyle/>
                     <a:p>
                       <a:pPr marL="0" algn="l" defTabSz="914400" rtl="0" eaLnBrk="1" latinLnBrk="0" hangingPunct="1"/>
-                      <a:endParaRPr lang="en-US" sz="1000" b="0" dirty="0"/>
+                      <a:r>
+                        <a:rPr lang="en-US" sz="900" b="0" dirty="0" err="1"/>
+                        <a:t>HubPanelPrefab</a:t>
+                      </a:r>
+                      <a:endParaRPr lang="en-US" sz="900" b="0" dirty="0"/>
                     </a:p>
                   </a:txBody>
                   <a:tcPr/>
@@ -7389,7 +7379,10 @@
                     <a:lstStyle/>
                     <a:p>
                       <a:pPr marL="0" algn="l" defTabSz="914400" rtl="0" eaLnBrk="1" latinLnBrk="0" hangingPunct="1"/>
-                      <a:endParaRPr lang="en-US" sz="1000" b="0" dirty="0"/>
+                      <a:r>
+                        <a:rPr lang="en-US" sz="900" b="0" dirty="0"/>
+                        <a:t>Prefab that contains top HUD elements (see prefab in editor)</a:t>
+                      </a:r>
                     </a:p>
                   </a:txBody>
                   <a:tcPr/>
@@ -7400,14 +7393,17 @@
                   </a:ext>
                 </a:extLst>
               </a:tr>
-              <a:tr h="358461">
+              <a:tr h="340938">
                 <a:tc>
                   <a:txBody>
                     <a:bodyPr/>
                     <a:lstStyle/>
                     <a:p>
                       <a:pPr marL="0" algn="l" defTabSz="914400" rtl="0" eaLnBrk="1" latinLnBrk="0" hangingPunct="1"/>
-                      <a:endParaRPr lang="en-US" sz="1000" b="0" dirty="0"/>
+                      <a:r>
+                        <a:rPr lang="en-US" sz="900" b="0" dirty="0"/>
+                        <a:t>Scenes</a:t>
+                      </a:r>
                     </a:p>
                   </a:txBody>
                   <a:tcPr/>
@@ -7418,7 +7414,11 @@
                     <a:lstStyle/>
                     <a:p>
                       <a:pPr marL="0" algn="l" defTabSz="914400" rtl="0" eaLnBrk="1" latinLnBrk="0" hangingPunct="1"/>
-                      <a:endParaRPr lang="en-US" sz="1000" b="0" dirty="0"/>
+                      <a:r>
+                        <a:rPr lang="en-US" sz="900" b="0" dirty="0" err="1"/>
+                        <a:t>ChatExampleScene</a:t>
+                      </a:r>
+                      <a:endParaRPr lang="en-US" sz="900" b="0" dirty="0"/>
                     </a:p>
                   </a:txBody>
                   <a:tcPr/>
@@ -7429,7 +7429,10 @@
                     <a:lstStyle/>
                     <a:p>
                       <a:pPr marL="0" algn="l" defTabSz="914400" rtl="0" eaLnBrk="1" latinLnBrk="0" hangingPunct="1"/>
-                      <a:endParaRPr lang="en-US" sz="1000" b="0" dirty="0"/>
+                      <a:r>
+                        <a:rPr lang="en-US" sz="900" b="0" dirty="0"/>
+                        <a:t>Example scene with chat UI (see scene in editor)</a:t>
+                      </a:r>
                     </a:p>
                   </a:txBody>
                   <a:tcPr/>
@@ -7440,14 +7443,17 @@
                   </a:ext>
                 </a:extLst>
               </a:tr>
-              <a:tr h="358461">
+              <a:tr h="347880">
                 <a:tc>
                   <a:txBody>
                     <a:bodyPr/>
                     <a:lstStyle/>
                     <a:p>
                       <a:pPr marL="0" algn="l" defTabSz="914400" rtl="0" eaLnBrk="1" latinLnBrk="0" hangingPunct="1"/>
-                      <a:endParaRPr lang="en-US" sz="1000" b="0" dirty="0"/>
+                      <a:r>
+                        <a:rPr lang="en-US" sz="900" b="0" dirty="0"/>
+                        <a:t>Scripts</a:t>
+                      </a:r>
                     </a:p>
                   </a:txBody>
                   <a:tcPr/>
@@ -7458,7 +7464,11 @@
                     <a:lstStyle/>
                     <a:p>
                       <a:pPr marL="0" algn="l" defTabSz="914400" rtl="0" eaLnBrk="1" latinLnBrk="0" hangingPunct="1"/>
-                      <a:endParaRPr lang="en-US" sz="1000" b="0" dirty="0"/>
+                      <a:r>
+                        <a:rPr lang="en-US" sz="900" b="0" dirty="0" err="1"/>
+                        <a:t>ChatController</a:t>
+                      </a:r>
+                      <a:endParaRPr lang="en-US" sz="900" b="0" dirty="0"/>
                     </a:p>
                   </a:txBody>
                   <a:tcPr/>
@@ -7469,7 +7479,18 @@
                     <a:lstStyle/>
                     <a:p>
                       <a:pPr marL="0" algn="l" defTabSz="914400" rtl="0" eaLnBrk="1" latinLnBrk="0" hangingPunct="1"/>
-                      <a:endParaRPr lang="en-US" sz="1000" b="0" dirty="0"/>
+                      <a:r>
+                        <a:rPr lang="en-US" sz="900" b="0" dirty="0"/>
+                        <a:t>Script that controls </a:t>
+                      </a:r>
+                      <a:r>
+                        <a:rPr lang="en-US" sz="900" b="0" dirty="0" err="1"/>
+                        <a:t>ChatPanelPrefab</a:t>
+                      </a:r>
+                      <a:r>
+                        <a:rPr lang="en-US" sz="900" b="0" dirty="0"/>
+                        <a:t> (message input, publish and subscribe)</a:t>
+                      </a:r>
                     </a:p>
                   </a:txBody>
                   <a:tcPr/>
@@ -7480,14 +7501,17 @@
                   </a:ext>
                 </a:extLst>
               </a:tr>
-              <a:tr h="462494">
+              <a:tr h="439885">
                 <a:tc>
                   <a:txBody>
                     <a:bodyPr/>
                     <a:lstStyle/>
                     <a:p>
                       <a:pPr marL="0" algn="l" defTabSz="914400" rtl="0" eaLnBrk="1" latinLnBrk="0" hangingPunct="1"/>
-                      <a:endParaRPr lang="en-US" sz="1000" b="0" dirty="0"/>
+                      <a:r>
+                        <a:rPr lang="en-US" sz="900" b="0" dirty="0"/>
+                        <a:t>Scripts</a:t>
+                      </a:r>
                     </a:p>
                   </a:txBody>
                   <a:tcPr/>
@@ -7514,7 +7538,11 @@
                         <a:tabLst/>
                         <a:defRPr/>
                       </a:pPr>
-                      <a:endParaRPr lang="en-US" sz="1000" b="0" i="0" dirty="0"/>
+                      <a:r>
+                        <a:rPr lang="en-US" sz="900" b="0" i="0" dirty="0" err="1"/>
+                        <a:t>ChatMsgCountController</a:t>
+                      </a:r>
+                      <a:endParaRPr lang="en-US" sz="900" b="0" i="0" dirty="0"/>
                     </a:p>
                   </a:txBody>
                   <a:tcPr/>
@@ -7525,7 +7553,10 @@
                     <a:lstStyle/>
                     <a:p>
                       <a:pPr marL="0" algn="l" defTabSz="914400" rtl="0" eaLnBrk="1" latinLnBrk="0" hangingPunct="1"/>
-                      <a:endParaRPr lang="en-US" sz="1000" b="0" dirty="0"/>
+                      <a:r>
+                        <a:rPr lang="en-US" sz="900" b="0" dirty="0"/>
+                        <a:t>Scripts that ‘listens’ to chat messages, counts them and displays count in HUD</a:t>
+                      </a:r>
                     </a:p>
                   </a:txBody>
                   <a:tcPr/>
@@ -7536,14 +7567,17 @@
                   </a:ext>
                 </a:extLst>
               </a:tr>
-              <a:tr h="434447">
+              <a:tr h="413209">
                 <a:tc>
                   <a:txBody>
                     <a:bodyPr/>
                     <a:lstStyle/>
                     <a:p>
                       <a:pPr marL="0" algn="l" defTabSz="914400" rtl="0" eaLnBrk="1" latinLnBrk="0" hangingPunct="1"/>
-                      <a:endParaRPr lang="en-US" sz="1000" b="0" dirty="0"/>
+                      <a:r>
+                        <a:rPr lang="en-US" sz="900" b="0" dirty="0"/>
+                        <a:t>Scripts</a:t>
+                      </a:r>
                     </a:p>
                   </a:txBody>
                   <a:tcPr/>
@@ -7554,7 +7588,11 @@
                     <a:lstStyle/>
                     <a:p>
                       <a:pPr algn="l" rtl="0"/>
-                      <a:endParaRPr lang="en-US" sz="1000" b="0" dirty="0"/>
+                      <a:r>
+                        <a:rPr lang="en-US" sz="900" b="0" dirty="0" err="1"/>
+                        <a:t>ChatPayload</a:t>
+                      </a:r>
+                      <a:endParaRPr lang="en-US" sz="900" b="0" dirty="0"/>
                     </a:p>
                   </a:txBody>
                   <a:tcPr/>
@@ -7565,7 +7603,10 @@
                     <a:lstStyle/>
                     <a:p>
                       <a:pPr algn="l" rtl="0"/>
-                      <a:endParaRPr lang="en-US" sz="1000" b="0" dirty="0"/>
+                      <a:r>
+                        <a:rPr lang="en-US" sz="900" b="0" dirty="0"/>
+                        <a:t>Payload class that is used to pass messages between chat panels</a:t>
+                      </a:r>
                     </a:p>
                   </a:txBody>
                   <a:tcPr/>
@@ -7576,322 +7617,458 @@
                   </a:ext>
                 </a:extLst>
               </a:tr>
-              <a:tr h="358461">
-                <a:tc>
-                  <a:txBody>
-                    <a:bodyPr/>
-                    <a:lstStyle/>
-                    <a:p>
-                      <a:pPr marL="0" algn="l" defTabSz="914400" rtl="0" eaLnBrk="1" latinLnBrk="0" hangingPunct="1"/>
-                      <a:endParaRPr lang="en-US" sz="1000" b="0" dirty="0"/>
-                    </a:p>
-                  </a:txBody>
-                  <a:tcPr/>
-                </a:tc>
-                <a:tc>
-                  <a:txBody>
-                    <a:bodyPr/>
-                    <a:lstStyle/>
-                    <a:p>
-                      <a:pPr marL="0" algn="l" defTabSz="914400" rtl="0" eaLnBrk="1" latinLnBrk="0" hangingPunct="1"/>
-                      <a:endParaRPr lang="en-US" sz="1000" b="0" dirty="0"/>
-                    </a:p>
-                  </a:txBody>
-                  <a:tcPr/>
-                </a:tc>
-                <a:tc>
-                  <a:txBody>
-                    <a:bodyPr/>
-                    <a:lstStyle/>
-                    <a:p>
-                      <a:pPr marL="0" algn="l" defTabSz="914400" rtl="0" eaLnBrk="1" latinLnBrk="0" hangingPunct="1"/>
-                      <a:endParaRPr lang="en-US" sz="1000" b="0" dirty="0"/>
-                    </a:p>
-                  </a:txBody>
-                  <a:tcPr/>
-                </a:tc>
-                <a:extLst>
-                  <a:ext uri="{0D108BD9-81ED-4DB2-BD59-A6C34878D82A}">
-                    <a16:rowId xmlns:a16="http://schemas.microsoft.com/office/drawing/2014/main" val="1625701481"/>
-                  </a:ext>
-                </a:extLst>
-              </a:tr>
-              <a:tr h="358461">
-                <a:tc>
-                  <a:txBody>
-                    <a:bodyPr/>
-                    <a:lstStyle/>
-                    <a:p>
-                      <a:pPr marL="0" algn="l" defTabSz="914400" rtl="0" eaLnBrk="1" latinLnBrk="0" hangingPunct="1"/>
-                      <a:endParaRPr lang="en-US" sz="1000" b="0" dirty="0"/>
-                    </a:p>
-                  </a:txBody>
-                  <a:tcPr/>
-                </a:tc>
-                <a:tc>
-                  <a:txBody>
-                    <a:bodyPr/>
-                    <a:lstStyle/>
-                    <a:p>
-                      <a:pPr marL="0" algn="l" defTabSz="914400" rtl="0" eaLnBrk="1" latinLnBrk="0" hangingPunct="1"/>
-                      <a:endParaRPr lang="en-US" sz="1000" b="0" dirty="0"/>
-                    </a:p>
-                  </a:txBody>
-                  <a:tcPr/>
-                </a:tc>
-                <a:tc>
-                  <a:txBody>
-                    <a:bodyPr/>
-                    <a:lstStyle/>
-                    <a:p>
-                      <a:pPr marL="0" marR="0" lvl="0" indent="0" algn="l" defTabSz="914400" rtl="0" eaLnBrk="1" fontAlgn="auto" latinLnBrk="0" hangingPunct="1">
-                        <a:lnSpc>
-                          <a:spcPct val="100000"/>
-                        </a:lnSpc>
-                        <a:spcBef>
-                          <a:spcPts val="0"/>
-                        </a:spcBef>
-                        <a:spcAft>
-                          <a:spcPts val="0"/>
-                        </a:spcAft>
-                        <a:buClrTx/>
-                        <a:buSzTx/>
-                        <a:buFontTx/>
-                        <a:buNone/>
-                        <a:tabLst/>
-                        <a:defRPr/>
-                      </a:pPr>
-                      <a:endParaRPr lang="en-US" sz="1000" b="0" dirty="0"/>
-                    </a:p>
-                  </a:txBody>
-                  <a:tcPr/>
-                </a:tc>
-                <a:extLst>
-                  <a:ext uri="{0D108BD9-81ED-4DB2-BD59-A6C34878D82A}">
-                    <a16:rowId xmlns:a16="http://schemas.microsoft.com/office/drawing/2014/main" val="1921921488"/>
-                  </a:ext>
-                </a:extLst>
-              </a:tr>
             </a:tbl>
           </a:graphicData>
         </a:graphic>
       </p:graphicFrame>
-      <p:sp>
-        <p:nvSpPr>
-          <p:cNvPr id="27" name="Rectangle 26">
+      <p:grpSp>
+        <p:nvGrpSpPr>
+          <p:cNvPr id="10" name="Group 9">
             <a:extLst>
               <a:ext uri="{FF2B5EF4-FFF2-40B4-BE49-F238E27FC236}">
-                <a16:creationId xmlns:a16="http://schemas.microsoft.com/office/drawing/2014/main" id="{CC95507C-107B-4141-BC5A-539349DE5039}"/>
+                <a16:creationId xmlns:a16="http://schemas.microsoft.com/office/drawing/2014/main" id="{1457132A-28BB-3D4C-9977-F2F700679BC3}"/>
               </a:ext>
             </a:extLst>
           </p:cNvPr>
-          <p:cNvSpPr/>
+          <p:cNvGrpSpPr/>
           <p:nvPr/>
-        </p:nvSpPr>
-        <p:spPr>
+        </p:nvGrpSpPr>
+        <p:grpSpPr>
           <a:xfrm>
-            <a:off x="484285" y="1499354"/>
-            <a:ext cx="2716744" cy="705510"/>
+            <a:off x="287455" y="1109604"/>
+            <a:ext cx="2625679" cy="2140938"/>
+            <a:chOff x="290137" y="1292643"/>
+            <a:chExt cx="2910892" cy="2373496"/>
           </a:xfrm>
-          <a:prstGeom prst="rect">
-            <a:avLst/>
-          </a:prstGeom>
-          <a:noFill/>
-          <a:ln w="12700"/>
-        </p:spPr>
-        <p:style>
-          <a:lnRef idx="2">
-            <a:schemeClr val="accent1">
-              <a:shade val="50000"/>
-            </a:schemeClr>
-          </a:lnRef>
-          <a:fillRef idx="1">
-            <a:schemeClr val="accent1"/>
-          </a:fillRef>
-          <a:effectRef idx="0">
-            <a:schemeClr val="accent1"/>
-          </a:effectRef>
-          <a:fontRef idx="minor">
-            <a:schemeClr val="lt1"/>
-          </a:fontRef>
-        </p:style>
-        <p:txBody>
-          <a:bodyPr rtlCol="0" anchor="ctr"/>
-          <a:lstStyle/>
-          <a:p>
-            <a:pPr marL="0" algn="ctr" defTabSz="914400" rtl="0" eaLnBrk="1" latinLnBrk="0" hangingPunct="1"/>
-            <a:endParaRPr lang="en-US"/>
-          </a:p>
-        </p:txBody>
-      </p:sp>
-      <p:sp>
-        <p:nvSpPr>
-          <p:cNvPr id="17" name="TextBox 16">
+        </p:grpSpPr>
+        <p:pic>
+          <p:nvPicPr>
+            <p:cNvPr id="8" name="Picture 7">
+              <a:extLst>
+                <a:ext uri="{FF2B5EF4-FFF2-40B4-BE49-F238E27FC236}">
+                  <a16:creationId xmlns:a16="http://schemas.microsoft.com/office/drawing/2014/main" id="{A4842D0D-C245-654B-877D-C0645977AD16}"/>
+                </a:ext>
+              </a:extLst>
+            </p:cNvPr>
+            <p:cNvPicPr>
+              <a:picLocks noChangeAspect="1"/>
+            </p:cNvPicPr>
+            <p:nvPr/>
+          </p:nvPicPr>
+          <p:blipFill>
+            <a:blip r:embed="rId2">
+              <a:extLst>
+                <a:ext uri="{BEBA8EAE-BF5A-486C-A8C5-ECC9F3942E4B}">
+                  <a14:imgProps xmlns:a14="http://schemas.microsoft.com/office/drawing/2010/main">
+                    <a14:imgLayer r:embed="rId3">
+                      <a14:imgEffect>
+                        <a14:brightnessContrast contrast="20000"/>
+                      </a14:imgEffect>
+                    </a14:imgLayer>
+                  </a14:imgProps>
+                </a:ext>
+              </a:extLst>
+            </a:blip>
+            <a:stretch>
+              <a:fillRect/>
+            </a:stretch>
+          </p:blipFill>
+          <p:spPr>
+            <a:xfrm>
+              <a:off x="290137" y="1292643"/>
+              <a:ext cx="2910891" cy="2373496"/>
+            </a:xfrm>
+            <a:prstGeom prst="rect">
+              <a:avLst/>
+            </a:prstGeom>
+          </p:spPr>
+        </p:pic>
+        <p:sp>
+          <p:nvSpPr>
+            <p:cNvPr id="27" name="Rectangle 26">
+              <a:extLst>
+                <a:ext uri="{FF2B5EF4-FFF2-40B4-BE49-F238E27FC236}">
+                  <a16:creationId xmlns:a16="http://schemas.microsoft.com/office/drawing/2014/main" id="{CC95507C-107B-4141-BC5A-539349DE5039}"/>
+                </a:ext>
+              </a:extLst>
+            </p:cNvPr>
+            <p:cNvSpPr/>
+            <p:nvPr/>
+          </p:nvSpPr>
+          <p:spPr>
+            <a:xfrm>
+              <a:off x="484285" y="1499354"/>
+              <a:ext cx="2716744" cy="705510"/>
+            </a:xfrm>
+            <a:prstGeom prst="rect">
+              <a:avLst/>
+            </a:prstGeom>
+            <a:noFill/>
+            <a:ln w="12700"/>
+          </p:spPr>
+          <p:style>
+            <a:lnRef idx="2">
+              <a:schemeClr val="accent1">
+                <a:shade val="50000"/>
+              </a:schemeClr>
+            </a:lnRef>
+            <a:fillRef idx="1">
+              <a:schemeClr val="accent1"/>
+            </a:fillRef>
+            <a:effectRef idx="0">
+              <a:schemeClr val="accent1"/>
+            </a:effectRef>
+            <a:fontRef idx="minor">
+              <a:schemeClr val="lt1"/>
+            </a:fontRef>
+          </p:style>
+          <p:txBody>
+            <a:bodyPr rtlCol="0" anchor="ctr"/>
+            <a:lstStyle/>
+            <a:p>
+              <a:pPr marL="0" algn="ctr" defTabSz="914400" rtl="0" eaLnBrk="1" latinLnBrk="0" hangingPunct="1"/>
+              <a:endParaRPr lang="en-US"/>
+            </a:p>
+          </p:txBody>
+        </p:sp>
+        <p:sp>
+          <p:nvSpPr>
+            <p:cNvPr id="15" name="Rectangle 14">
+              <a:extLst>
+                <a:ext uri="{FF2B5EF4-FFF2-40B4-BE49-F238E27FC236}">
+                  <a16:creationId xmlns:a16="http://schemas.microsoft.com/office/drawing/2014/main" id="{BECEA12C-6EA2-494D-8420-BD8E95540B8A}"/>
+                </a:ext>
+              </a:extLst>
+            </p:cNvPr>
+            <p:cNvSpPr/>
+            <p:nvPr/>
+          </p:nvSpPr>
+          <p:spPr>
+            <a:xfrm>
+              <a:off x="484285" y="2204864"/>
+              <a:ext cx="2716744" cy="504056"/>
+            </a:xfrm>
+            <a:prstGeom prst="rect">
+              <a:avLst/>
+            </a:prstGeom>
+            <a:noFill/>
+            <a:ln w="12700"/>
+          </p:spPr>
+          <p:style>
+            <a:lnRef idx="2">
+              <a:schemeClr val="accent1">
+                <a:shade val="50000"/>
+              </a:schemeClr>
+            </a:lnRef>
+            <a:fillRef idx="1">
+              <a:schemeClr val="accent1"/>
+            </a:fillRef>
+            <a:effectRef idx="0">
+              <a:schemeClr val="accent1"/>
+            </a:effectRef>
+            <a:fontRef idx="minor">
+              <a:schemeClr val="lt1"/>
+            </a:fontRef>
+          </p:style>
+          <p:txBody>
+            <a:bodyPr rtlCol="0" anchor="ctr"/>
+            <a:lstStyle/>
+            <a:p>
+              <a:pPr marL="0" algn="ctr" defTabSz="914400" rtl="0" eaLnBrk="1" latinLnBrk="0" hangingPunct="1"/>
+              <a:endParaRPr lang="en-US"/>
+            </a:p>
+          </p:txBody>
+        </p:sp>
+        <p:sp>
+          <p:nvSpPr>
+            <p:cNvPr id="19" name="Rectangle 18">
+              <a:extLst>
+                <a:ext uri="{FF2B5EF4-FFF2-40B4-BE49-F238E27FC236}">
+                  <a16:creationId xmlns:a16="http://schemas.microsoft.com/office/drawing/2014/main" id="{321F39DD-D666-274C-9F65-05CFFA521922}"/>
+                </a:ext>
+              </a:extLst>
+            </p:cNvPr>
+            <p:cNvSpPr/>
+            <p:nvPr/>
+          </p:nvSpPr>
+          <p:spPr>
+            <a:xfrm>
+              <a:off x="484284" y="2708042"/>
+              <a:ext cx="2716744" cy="958097"/>
+            </a:xfrm>
+            <a:prstGeom prst="rect">
+              <a:avLst/>
+            </a:prstGeom>
+            <a:noFill/>
+            <a:ln w="12700"/>
+          </p:spPr>
+          <p:style>
+            <a:lnRef idx="2">
+              <a:schemeClr val="accent1">
+                <a:shade val="50000"/>
+              </a:schemeClr>
+            </a:lnRef>
+            <a:fillRef idx="1">
+              <a:schemeClr val="accent1"/>
+            </a:fillRef>
+            <a:effectRef idx="0">
+              <a:schemeClr val="accent1"/>
+            </a:effectRef>
+            <a:fontRef idx="minor">
+              <a:schemeClr val="lt1"/>
+            </a:fontRef>
+          </p:style>
+          <p:txBody>
+            <a:bodyPr rtlCol="0" anchor="ctr"/>
+            <a:lstStyle/>
+            <a:p>
+              <a:pPr marL="0" algn="ctr" defTabSz="914400" rtl="0" eaLnBrk="1" latinLnBrk="0" hangingPunct="1"/>
+              <a:endParaRPr lang="en-US"/>
+            </a:p>
+          </p:txBody>
+        </p:sp>
+      </p:grpSp>
+      <p:grpSp>
+        <p:nvGrpSpPr>
+          <p:cNvPr id="11" name="Group 10">
             <a:extLst>
               <a:ext uri="{FF2B5EF4-FFF2-40B4-BE49-F238E27FC236}">
-                <a16:creationId xmlns:a16="http://schemas.microsoft.com/office/drawing/2014/main" id="{C3A43DAE-28F0-5844-9F22-412B272D504C}"/>
+                <a16:creationId xmlns:a16="http://schemas.microsoft.com/office/drawing/2014/main" id="{E97707DA-FC6B-5342-B462-4881514F9377}"/>
               </a:ext>
             </a:extLst>
           </p:cNvPr>
-          <p:cNvSpPr txBox="1"/>
+          <p:cNvGrpSpPr/>
           <p:nvPr/>
-        </p:nvSpPr>
-        <p:spPr>
+        </p:nvGrpSpPr>
+        <p:grpSpPr>
           <a:xfrm>
-            <a:off x="467778" y="6124642"/>
-            <a:ext cx="389850" cy="338554"/>
+            <a:off x="853844" y="3879878"/>
+            <a:ext cx="7888368" cy="2861490"/>
+            <a:chOff x="853844" y="3862520"/>
+            <a:chExt cx="7888368" cy="2861490"/>
           </a:xfrm>
-          <a:prstGeom prst="rect">
-            <a:avLst/>
-          </a:prstGeom>
-          <a:noFill/>
-        </p:spPr>
-        <p:txBody>
-          <a:bodyPr wrap="none" rtlCol="0">
-            <a:spAutoFit/>
-          </a:bodyPr>
-          <a:lstStyle/>
-          <a:p>
-            <a:pPr marL="0" algn="l" defTabSz="914400" rtl="0" eaLnBrk="1" latinLnBrk="0" hangingPunct="1"/>
-            <a:r>
-              <a:rPr lang="en-US" sz="1600" dirty="0"/>
-              <a:t>…</a:t>
-            </a:r>
-          </a:p>
-        </p:txBody>
-      </p:sp>
-      <p:sp>
-        <p:nvSpPr>
-          <p:cNvPr id="18" name="TextBox 17">
-            <a:extLst>
-              <a:ext uri="{FF2B5EF4-FFF2-40B4-BE49-F238E27FC236}">
-                <a16:creationId xmlns:a16="http://schemas.microsoft.com/office/drawing/2014/main" id="{647EC101-915F-BE4F-920A-05BE1F88DA88}"/>
-              </a:ext>
-            </a:extLst>
-          </p:cNvPr>
-          <p:cNvSpPr txBox="1"/>
-          <p:nvPr/>
-        </p:nvSpPr>
-        <p:spPr>
-          <a:xfrm>
-            <a:off x="107504" y="5817779"/>
-            <a:ext cx="1018227" cy="369332"/>
-          </a:xfrm>
-          <a:prstGeom prst="rect">
-            <a:avLst/>
-          </a:prstGeom>
-          <a:noFill/>
-        </p:spPr>
-        <p:txBody>
-          <a:bodyPr wrap="none" rtlCol="0">
-            <a:spAutoFit/>
-          </a:bodyPr>
-          <a:lstStyle/>
-          <a:p>
-            <a:pPr algn="l" rtl="0"/>
-            <a:r>
-              <a:rPr lang="en-US" dirty="0"/>
-              <a:t>Folders:</a:t>
-            </a:r>
-          </a:p>
-        </p:txBody>
-      </p:sp>
-      <p:sp>
-        <p:nvSpPr>
-          <p:cNvPr id="15" name="Rectangle 14">
-            <a:extLst>
-              <a:ext uri="{FF2B5EF4-FFF2-40B4-BE49-F238E27FC236}">
-                <a16:creationId xmlns:a16="http://schemas.microsoft.com/office/drawing/2014/main" id="{BECEA12C-6EA2-494D-8420-BD8E95540B8A}"/>
-              </a:ext>
-            </a:extLst>
-          </p:cNvPr>
-          <p:cNvSpPr/>
-          <p:nvPr/>
-        </p:nvSpPr>
-        <p:spPr>
-          <a:xfrm>
-            <a:off x="484285" y="2204864"/>
-            <a:ext cx="2716744" cy="504056"/>
-          </a:xfrm>
-          <a:prstGeom prst="rect">
-            <a:avLst/>
-          </a:prstGeom>
-          <a:noFill/>
-          <a:ln w="12700"/>
-        </p:spPr>
-        <p:style>
-          <a:lnRef idx="2">
-            <a:schemeClr val="accent1">
-              <a:shade val="50000"/>
-            </a:schemeClr>
-          </a:lnRef>
-          <a:fillRef idx="1">
-            <a:schemeClr val="accent1"/>
-          </a:fillRef>
-          <a:effectRef idx="0">
-            <a:schemeClr val="accent1"/>
-          </a:effectRef>
-          <a:fontRef idx="minor">
-            <a:schemeClr val="lt1"/>
-          </a:fontRef>
-        </p:style>
-        <p:txBody>
-          <a:bodyPr rtlCol="0" anchor="ctr"/>
-          <a:lstStyle/>
-          <a:p>
-            <a:pPr marL="0" algn="ctr" defTabSz="914400" rtl="0" eaLnBrk="1" latinLnBrk="0" hangingPunct="1"/>
-            <a:endParaRPr lang="en-US"/>
-          </a:p>
-        </p:txBody>
-      </p:sp>
-      <p:sp>
-        <p:nvSpPr>
-          <p:cNvPr id="19" name="Rectangle 18">
-            <a:extLst>
-              <a:ext uri="{FF2B5EF4-FFF2-40B4-BE49-F238E27FC236}">
-                <a16:creationId xmlns:a16="http://schemas.microsoft.com/office/drawing/2014/main" id="{321F39DD-D666-274C-9F65-05CFFA521922}"/>
-              </a:ext>
-            </a:extLst>
-          </p:cNvPr>
-          <p:cNvSpPr/>
-          <p:nvPr/>
-        </p:nvSpPr>
-        <p:spPr>
-          <a:xfrm>
-            <a:off x="484284" y="2708042"/>
-            <a:ext cx="2716744" cy="958097"/>
-          </a:xfrm>
-          <a:prstGeom prst="rect">
-            <a:avLst/>
-          </a:prstGeom>
-          <a:noFill/>
-          <a:ln w="12700"/>
-        </p:spPr>
-        <p:style>
-          <a:lnRef idx="2">
-            <a:schemeClr val="accent1">
-              <a:shade val="50000"/>
-            </a:schemeClr>
-          </a:lnRef>
-          <a:fillRef idx="1">
-            <a:schemeClr val="accent1"/>
-          </a:fillRef>
-          <a:effectRef idx="0">
-            <a:schemeClr val="accent1"/>
-          </a:effectRef>
-          <a:fontRef idx="minor">
-            <a:schemeClr val="lt1"/>
-          </a:fontRef>
-        </p:style>
-        <p:txBody>
-          <a:bodyPr rtlCol="0" anchor="ctr"/>
-          <a:lstStyle/>
-          <a:p>
-            <a:pPr marL="0" algn="ctr" defTabSz="914400" rtl="0" eaLnBrk="1" latinLnBrk="0" hangingPunct="1"/>
-            <a:endParaRPr lang="en-US"/>
-          </a:p>
-        </p:txBody>
-      </p:sp>
+        </p:grpSpPr>
+        <p:pic>
+          <p:nvPicPr>
+            <p:cNvPr id="20" name="Picture 19">
+              <a:extLst>
+                <a:ext uri="{FF2B5EF4-FFF2-40B4-BE49-F238E27FC236}">
+                  <a16:creationId xmlns:a16="http://schemas.microsoft.com/office/drawing/2014/main" id="{3D37B620-5166-D944-817C-C17EBC5AE3AF}"/>
+                </a:ext>
+              </a:extLst>
+            </p:cNvPr>
+            <p:cNvPicPr>
+              <a:picLocks noChangeAspect="1"/>
+            </p:cNvPicPr>
+            <p:nvPr/>
+          </p:nvPicPr>
+          <p:blipFill>
+            <a:blip r:embed="rId4"/>
+            <a:stretch>
+              <a:fillRect/>
+            </a:stretch>
+          </p:blipFill>
+          <p:spPr>
+            <a:xfrm>
+              <a:off x="2314485" y="3918881"/>
+              <a:ext cx="4515029" cy="2805129"/>
+            </a:xfrm>
+            <a:prstGeom prst="rect">
+              <a:avLst/>
+            </a:prstGeom>
+          </p:spPr>
+        </p:pic>
+        <p:sp>
+          <p:nvSpPr>
+            <p:cNvPr id="23" name="Right Brace 22">
+              <a:extLst>
+                <a:ext uri="{FF2B5EF4-FFF2-40B4-BE49-F238E27FC236}">
+                  <a16:creationId xmlns:a16="http://schemas.microsoft.com/office/drawing/2014/main" id="{6247221F-1E67-974E-AE9E-B06B88C19EFD}"/>
+                </a:ext>
+              </a:extLst>
+            </p:cNvPr>
+            <p:cNvSpPr/>
+            <p:nvPr/>
+          </p:nvSpPr>
+          <p:spPr>
+            <a:xfrm>
+              <a:off x="6829514" y="4149080"/>
+              <a:ext cx="363876" cy="2574930"/>
+            </a:xfrm>
+            <a:prstGeom prst="rightBrace">
+              <a:avLst/>
+            </a:prstGeom>
+          </p:spPr>
+          <p:style>
+            <a:lnRef idx="1">
+              <a:schemeClr val="accent1"/>
+            </a:lnRef>
+            <a:fillRef idx="0">
+              <a:schemeClr val="accent1"/>
+            </a:fillRef>
+            <a:effectRef idx="0">
+              <a:schemeClr val="accent1"/>
+            </a:effectRef>
+            <a:fontRef idx="minor">
+              <a:schemeClr val="tx1"/>
+            </a:fontRef>
+          </p:style>
+          <p:txBody>
+            <a:bodyPr rtlCol="0" anchor="ctr"/>
+            <a:lstStyle/>
+            <a:p>
+              <a:pPr marL="0" algn="ctr" defTabSz="914400" rtl="0" eaLnBrk="1" latinLnBrk="0" hangingPunct="1"/>
+              <a:endParaRPr lang="en-US"/>
+            </a:p>
+          </p:txBody>
+        </p:sp>
+        <p:sp>
+          <p:nvSpPr>
+            <p:cNvPr id="24" name="TextBox 23">
+              <a:extLst>
+                <a:ext uri="{FF2B5EF4-FFF2-40B4-BE49-F238E27FC236}">
+                  <a16:creationId xmlns:a16="http://schemas.microsoft.com/office/drawing/2014/main" id="{AA170B80-8478-7647-B1C8-589C9D25507A}"/>
+                </a:ext>
+              </a:extLst>
+            </p:cNvPr>
+            <p:cNvSpPr txBox="1"/>
+            <p:nvPr/>
+          </p:nvSpPr>
+          <p:spPr>
+            <a:xfrm>
+              <a:off x="7193390" y="5282656"/>
+              <a:ext cx="1548822" cy="307777"/>
+            </a:xfrm>
+            <a:prstGeom prst="rect">
+              <a:avLst/>
+            </a:prstGeom>
+            <a:noFill/>
+          </p:spPr>
+          <p:txBody>
+            <a:bodyPr wrap="none" rtlCol="0">
+              <a:spAutoFit/>
+            </a:bodyPr>
+            <a:lstStyle/>
+            <a:p>
+              <a:pPr marL="0" algn="l" defTabSz="914400" rtl="0" eaLnBrk="1" latinLnBrk="0" hangingPunct="1"/>
+              <a:r>
+                <a:rPr lang="en-US" sz="1400" dirty="0" err="1">
+                  <a:solidFill>
+                    <a:schemeClr val="accent6">
+                      <a:lumMod val="60000"/>
+                      <a:lumOff val="40000"/>
+                    </a:schemeClr>
+                  </a:solidFill>
+                </a:rPr>
+                <a:t>ChatPanelPrefab</a:t>
+              </a:r>
+              <a:endParaRPr lang="en-US" sz="1400" dirty="0">
+                <a:solidFill>
+                  <a:schemeClr val="accent6">
+                    <a:lumMod val="60000"/>
+                    <a:lumOff val="40000"/>
+                  </a:schemeClr>
+                </a:solidFill>
+              </a:endParaRPr>
+            </a:p>
+          </p:txBody>
+        </p:sp>
+        <p:sp>
+          <p:nvSpPr>
+            <p:cNvPr id="25" name="Left Brace 24">
+              <a:extLst>
+                <a:ext uri="{FF2B5EF4-FFF2-40B4-BE49-F238E27FC236}">
+                  <a16:creationId xmlns:a16="http://schemas.microsoft.com/office/drawing/2014/main" id="{B70002D2-1120-F54D-9584-B85F26CF58C6}"/>
+                </a:ext>
+              </a:extLst>
+            </p:cNvPr>
+            <p:cNvSpPr/>
+            <p:nvPr/>
+          </p:nvSpPr>
+          <p:spPr>
+            <a:xfrm>
+              <a:off x="2123727" y="3915533"/>
+              <a:ext cx="190757" cy="186457"/>
+            </a:xfrm>
+            <a:prstGeom prst="leftBrace">
+              <a:avLst/>
+            </a:prstGeom>
+          </p:spPr>
+          <p:style>
+            <a:lnRef idx="1">
+              <a:schemeClr val="accent1"/>
+            </a:lnRef>
+            <a:fillRef idx="0">
+              <a:schemeClr val="accent1"/>
+            </a:fillRef>
+            <a:effectRef idx="0">
+              <a:schemeClr val="accent1"/>
+            </a:effectRef>
+            <a:fontRef idx="minor">
+              <a:schemeClr val="tx1"/>
+            </a:fontRef>
+          </p:style>
+          <p:txBody>
+            <a:bodyPr rtlCol="0" anchor="ctr"/>
+            <a:lstStyle/>
+            <a:p>
+              <a:pPr marL="0" algn="ctr" defTabSz="914400" rtl="0" eaLnBrk="1" latinLnBrk="0" hangingPunct="1"/>
+              <a:endParaRPr lang="en-US"/>
+            </a:p>
+          </p:txBody>
+        </p:sp>
+        <p:sp>
+          <p:nvSpPr>
+            <p:cNvPr id="26" name="TextBox 25">
+              <a:extLst>
+                <a:ext uri="{FF2B5EF4-FFF2-40B4-BE49-F238E27FC236}">
+                  <a16:creationId xmlns:a16="http://schemas.microsoft.com/office/drawing/2014/main" id="{DA058B56-4EF4-994E-A2E9-E6BF5A19EBC8}"/>
+                </a:ext>
+              </a:extLst>
+            </p:cNvPr>
+            <p:cNvSpPr txBox="1"/>
+            <p:nvPr/>
+          </p:nvSpPr>
+          <p:spPr>
+            <a:xfrm>
+              <a:off x="853844" y="3862520"/>
+              <a:ext cx="1308371" cy="276999"/>
+            </a:xfrm>
+            <a:prstGeom prst="rect">
+              <a:avLst/>
+            </a:prstGeom>
+            <a:noFill/>
+          </p:spPr>
+          <p:txBody>
+            <a:bodyPr wrap="none" rtlCol="0">
+              <a:spAutoFit/>
+            </a:bodyPr>
+            <a:lstStyle/>
+            <a:p>
+              <a:pPr marL="0" algn="l" defTabSz="914400" rtl="0" eaLnBrk="1" latinLnBrk="0" hangingPunct="1"/>
+              <a:r>
+                <a:rPr lang="en-US" sz="1200" dirty="0" err="1">
+                  <a:solidFill>
+                    <a:schemeClr val="accent6">
+                      <a:lumMod val="60000"/>
+                      <a:lumOff val="40000"/>
+                    </a:schemeClr>
+                  </a:solidFill>
+                </a:rPr>
+                <a:t>HudPanelPrefab</a:t>
+              </a:r>
+              <a:endParaRPr lang="en-US" sz="1200" dirty="0">
+                <a:solidFill>
+                  <a:schemeClr val="accent6">
+                    <a:lumMod val="60000"/>
+                    <a:lumOff val="40000"/>
+                  </a:schemeClr>
+                </a:solidFill>
+              </a:endParaRPr>
+            </a:p>
+          </p:txBody>
+        </p:sp>
+      </p:grpSp>
     </p:spTree>
     <p:extLst>
       <p:ext uri="{BB962C8B-B14F-4D97-AF65-F5344CB8AC3E}">
@@ -7934,31 +8111,89 @@
         </p:nvSpPr>
         <p:spPr>
           <a:xfrm>
-            <a:off x="4120" y="0"/>
-            <a:ext cx="9139880" cy="660149"/>
+            <a:off x="0" y="13874"/>
+            <a:ext cx="9144000" cy="534805"/>
           </a:xfrm>
         </p:spPr>
         <p:txBody>
-          <a:bodyPr anchor="t">
+          <a:bodyPr vert="horz" lIns="91440" tIns="45720" rIns="91440" bIns="45720" rtlCol="0" anchor="t">
             <a:normAutofit fontScale="90000"/>
           </a:bodyPr>
           <a:lstStyle/>
           <a:p>
             <a:pPr rtl="0"/>
             <a:r>
-              <a:rPr lang="en-US" dirty="0"/>
-              <a:t>Demo Scene Structure:</a:t>
-            </a:r>
-            <a:endParaRPr lang="he-IL" dirty="0"/>
+              <a:rPr lang="en-US" sz="3200" dirty="0"/>
+              <a:t>Chat Controller:</a:t>
+            </a:r>
+            <a:endParaRPr lang="he-IL" sz="3200" dirty="0"/>
           </a:p>
         </p:txBody>
       </p:sp>
       <p:sp>
         <p:nvSpPr>
-          <p:cNvPr id="22" name="Slide Number Placeholder 21">
+          <p:cNvPr id="5" name="Content Placeholder 4"/>
+          <p:cNvSpPr>
+            <a:spLocks noGrp="1"/>
+          </p:cNvSpPr>
+          <p:nvPr>
+            <p:ph idx="1"/>
+          </p:nvPr>
+        </p:nvSpPr>
+        <p:spPr>
+          <a:xfrm>
+            <a:off x="107504" y="620688"/>
+            <a:ext cx="8928992" cy="6120680"/>
+          </a:xfrm>
+        </p:spPr>
+        <p:txBody>
+          <a:bodyPr tIns="72000" bIns="72000">
+            <a:noAutofit/>
+          </a:bodyPr>
+          <a:lstStyle/>
+          <a:p>
+            <a:pPr marL="320040" lvl="1" indent="0" algn="l" rtl="0">
+              <a:buNone/>
+            </a:pPr>
+            <a:r>
+              <a:rPr lang="en-GB" sz="1200" dirty="0"/>
+              <a:t>Implements this basic interface:</a:t>
+            </a:r>
+          </a:p>
+          <a:p>
+            <a:pPr marL="45720" indent="0" algn="l" rtl="0">
+              <a:buNone/>
+            </a:pPr>
+            <a:endParaRPr lang="en-GB" sz="1400" dirty="0"/>
+          </a:p>
+          <a:p>
+            <a:pPr marL="502920" lvl="2" indent="0" algn="l" rtl="0">
+              <a:buNone/>
+            </a:pPr>
+            <a:r>
+              <a:rPr lang="en-GB" sz="1050" dirty="0">
+                <a:solidFill>
+                  <a:srgbClr val="6A9955"/>
+                </a:solidFill>
+                <a:latin typeface="Menlo" panose="020B0609030804020204" pitchFamily="49" charset="0"/>
+              </a:rPr>
+              <a:t>TBD</a:t>
+            </a:r>
+            <a:endParaRPr lang="en-GB" sz="1000" dirty="0">
+              <a:solidFill>
+                <a:srgbClr val="D4D4D4"/>
+              </a:solidFill>
+              <a:latin typeface="Menlo" panose="020B0609030804020204" pitchFamily="49" charset="0"/>
+            </a:endParaRPr>
+          </a:p>
+        </p:txBody>
+      </p:sp>
+      <p:sp>
+        <p:nvSpPr>
+          <p:cNvPr id="6" name="Slide Number Placeholder 5">
             <a:extLst>
               <a:ext uri="{FF2B5EF4-FFF2-40B4-BE49-F238E27FC236}">
-                <a16:creationId xmlns:a16="http://schemas.microsoft.com/office/drawing/2014/main" id="{4B215F6A-04DC-9F40-91CD-8F69B55122F5}"/>
+                <a16:creationId xmlns:a16="http://schemas.microsoft.com/office/drawing/2014/main" id="{B0AC3C36-3423-B24D-A5A6-E199B6335F74}"/>
               </a:ext>
             </a:extLst>
           </p:cNvPr>
@@ -7987,40 +8222,10 @@
           </a:p>
         </p:txBody>
       </p:sp>
-      <p:pic>
-        <p:nvPicPr>
-          <p:cNvPr id="3" name="Picture 2">
-            <a:extLst>
-              <a:ext uri="{FF2B5EF4-FFF2-40B4-BE49-F238E27FC236}">
-                <a16:creationId xmlns:a16="http://schemas.microsoft.com/office/drawing/2014/main" id="{4667AE02-4E2A-5641-B5DC-8F979063CB87}"/>
-              </a:ext>
-            </a:extLst>
-          </p:cNvPr>
-          <p:cNvPicPr>
-            <a:picLocks noChangeAspect="1"/>
-          </p:cNvPicPr>
-          <p:nvPr/>
-        </p:nvPicPr>
-        <p:blipFill>
-          <a:blip r:embed="rId2"/>
-          <a:stretch>
-            <a:fillRect/>
-          </a:stretch>
-        </p:blipFill>
-        <p:spPr>
-          <a:xfrm>
-            <a:off x="179512" y="908720"/>
-            <a:ext cx="5130800" cy="3187700"/>
-          </a:xfrm>
-          <a:prstGeom prst="rect">
-            <a:avLst/>
-          </a:prstGeom>
-        </p:spPr>
-      </p:pic>
     </p:spTree>
     <p:extLst>
       <p:ext uri="{BB962C8B-B14F-4D97-AF65-F5344CB8AC3E}">
-        <p14:creationId xmlns:p14="http://schemas.microsoft.com/office/powerpoint/2010/main" val="2189356180"/>
+        <p14:creationId xmlns:p14="http://schemas.microsoft.com/office/powerpoint/2010/main" val="2966252774"/>
       </p:ext>
     </p:extLst>
   </p:cSld>

</xml_diff>